<commit_message>
Filled out first half of the lecture.
</commit_message>
<xml_diff>
--- a/Lecture/Big Data with Cloud Computing.pptx
+++ b/Lecture/Big Data with Cloud Computing.pptx
@@ -4,21 +4,25 @@
   <p:sldMasterIdLst>
     <p:sldMasterId id="2147483660" r:id="rId1"/>
   </p:sldMasterIdLst>
+  <p:notesMasterIdLst>
+    <p:notesMasterId r:id="rId17"/>
+  </p:notesMasterIdLst>
   <p:sldIdLst>
     <p:sldId id="256" r:id="rId2"/>
     <p:sldId id="257" r:id="rId3"/>
     <p:sldId id="258" r:id="rId4"/>
-    <p:sldId id="259" r:id="rId5"/>
-    <p:sldId id="260" r:id="rId6"/>
-    <p:sldId id="261" r:id="rId7"/>
-    <p:sldId id="262" r:id="rId8"/>
-    <p:sldId id="263" r:id="rId9"/>
-    <p:sldId id="264" r:id="rId10"/>
-    <p:sldId id="265" r:id="rId11"/>
-    <p:sldId id="266" r:id="rId12"/>
-    <p:sldId id="267" r:id="rId13"/>
-    <p:sldId id="268" r:id="rId14"/>
-    <p:sldId id="269" r:id="rId15"/>
+    <p:sldId id="270" r:id="rId5"/>
+    <p:sldId id="259" r:id="rId6"/>
+    <p:sldId id="260" r:id="rId7"/>
+    <p:sldId id="261" r:id="rId8"/>
+    <p:sldId id="262" r:id="rId9"/>
+    <p:sldId id="263" r:id="rId10"/>
+    <p:sldId id="264" r:id="rId11"/>
+    <p:sldId id="265" r:id="rId12"/>
+    <p:sldId id="266" r:id="rId13"/>
+    <p:sldId id="267" r:id="rId14"/>
+    <p:sldId id="268" r:id="rId15"/>
+    <p:sldId id="269" r:id="rId16"/>
   </p:sldIdLst>
   <p:sldSz cx="12192000" cy="6858000"/>
   <p:notesSz cx="6858000" cy="9144000"/>
@@ -123,6 +127,2069 @@
     </p:ext>
   </p:extLst>
 </p:presentation>
+</file>
+
+<file path=ppt/notesMasters/notesMaster1.xml><?xml version="1.0" encoding="utf-8"?>
+<p:notesMaster xmlns:a="http://schemas.openxmlformats.org/drawingml/2006/main" xmlns:r="http://schemas.openxmlformats.org/officeDocument/2006/relationships" xmlns:p="http://schemas.openxmlformats.org/presentationml/2006/main">
+  <p:cSld>
+    <p:bg>
+      <p:bgRef idx="1001">
+        <a:schemeClr val="bg1"/>
+      </p:bgRef>
+    </p:bg>
+    <p:spTree>
+      <p:nvGrpSpPr>
+        <p:cNvPr id="1" name=""/>
+        <p:cNvGrpSpPr/>
+        <p:nvPr/>
+      </p:nvGrpSpPr>
+      <p:grpSpPr>
+        <a:xfrm>
+          <a:off x="0" y="0"/>
+          <a:ext cx="0" cy="0"/>
+          <a:chOff x="0" y="0"/>
+          <a:chExt cx="0" cy="0"/>
+        </a:xfrm>
+      </p:grpSpPr>
+      <p:sp>
+        <p:nvSpPr>
+          <p:cNvPr id="2" name="Header Placeholder 1"/>
+          <p:cNvSpPr>
+            <a:spLocks noGrp="1"/>
+          </p:cNvSpPr>
+          <p:nvPr>
+            <p:ph type="hdr" sz="quarter"/>
+          </p:nvPr>
+        </p:nvSpPr>
+        <p:spPr>
+          <a:xfrm>
+            <a:off x="0" y="0"/>
+            <a:ext cx="2971800" cy="458788"/>
+          </a:xfrm>
+          <a:prstGeom prst="rect">
+            <a:avLst/>
+          </a:prstGeom>
+        </p:spPr>
+        <p:txBody>
+          <a:bodyPr vert="horz" lIns="91440" tIns="45720" rIns="91440" bIns="45720" rtlCol="0"/>
+          <a:lstStyle>
+            <a:lvl1pPr algn="l">
+              <a:defRPr sz="1200"/>
+            </a:lvl1pPr>
+          </a:lstStyle>
+          <a:p>
+            <a:endParaRPr lang="en-US"/>
+          </a:p>
+        </p:txBody>
+      </p:sp>
+      <p:sp>
+        <p:nvSpPr>
+          <p:cNvPr id="3" name="Date Placeholder 2"/>
+          <p:cNvSpPr>
+            <a:spLocks noGrp="1"/>
+          </p:cNvSpPr>
+          <p:nvPr>
+            <p:ph type="dt" idx="1"/>
+          </p:nvPr>
+        </p:nvSpPr>
+        <p:spPr>
+          <a:xfrm>
+            <a:off x="3884613" y="0"/>
+            <a:ext cx="2971800" cy="458788"/>
+          </a:xfrm>
+          <a:prstGeom prst="rect">
+            <a:avLst/>
+          </a:prstGeom>
+        </p:spPr>
+        <p:txBody>
+          <a:bodyPr vert="horz" lIns="91440" tIns="45720" rIns="91440" bIns="45720" rtlCol="0"/>
+          <a:lstStyle>
+            <a:lvl1pPr algn="r">
+              <a:defRPr sz="1200"/>
+            </a:lvl1pPr>
+          </a:lstStyle>
+          <a:p>
+            <a:fld id="{30F29D08-A590-4298-9786-CA7F81C07FDA}" type="datetimeFigureOut">
+              <a:rPr lang="en-US" smtClean="0"/>
+              <a:t>31-Mar-20</a:t>
+            </a:fld>
+            <a:endParaRPr lang="en-US"/>
+          </a:p>
+        </p:txBody>
+      </p:sp>
+      <p:sp>
+        <p:nvSpPr>
+          <p:cNvPr id="4" name="Slide Image Placeholder 3"/>
+          <p:cNvSpPr>
+            <a:spLocks noGrp="1" noRot="1" noChangeAspect="1"/>
+          </p:cNvSpPr>
+          <p:nvPr>
+            <p:ph type="sldImg" idx="2"/>
+          </p:nvPr>
+        </p:nvSpPr>
+        <p:spPr>
+          <a:xfrm>
+            <a:off x="685800" y="1143000"/>
+            <a:ext cx="5486400" cy="3086100"/>
+          </a:xfrm>
+          <a:prstGeom prst="rect">
+            <a:avLst/>
+          </a:prstGeom>
+          <a:noFill/>
+          <a:ln w="12700">
+            <a:solidFill>
+              <a:prstClr val="black"/>
+            </a:solidFill>
+          </a:ln>
+        </p:spPr>
+        <p:txBody>
+          <a:bodyPr vert="horz" lIns="91440" tIns="45720" rIns="91440" bIns="45720" rtlCol="0" anchor="ctr"/>
+          <a:lstStyle/>
+          <a:p>
+            <a:endParaRPr lang="en-US"/>
+          </a:p>
+        </p:txBody>
+      </p:sp>
+      <p:sp>
+        <p:nvSpPr>
+          <p:cNvPr id="5" name="Notes Placeholder 4"/>
+          <p:cNvSpPr>
+            <a:spLocks noGrp="1"/>
+          </p:cNvSpPr>
+          <p:nvPr>
+            <p:ph type="body" sz="quarter" idx="3"/>
+          </p:nvPr>
+        </p:nvSpPr>
+        <p:spPr>
+          <a:xfrm>
+            <a:off x="685800" y="4400550"/>
+            <a:ext cx="5486400" cy="3600450"/>
+          </a:xfrm>
+          <a:prstGeom prst="rect">
+            <a:avLst/>
+          </a:prstGeom>
+        </p:spPr>
+        <p:txBody>
+          <a:bodyPr vert="horz" lIns="91440" tIns="45720" rIns="91440" bIns="45720" rtlCol="0"/>
+          <a:lstStyle/>
+          <a:p>
+            <a:pPr lvl="0"/>
+            <a:r>
+              <a:rPr lang="en-US"/>
+              <a:t>Click to edit Master text styles</a:t>
+            </a:r>
+          </a:p>
+          <a:p>
+            <a:pPr lvl="1"/>
+            <a:r>
+              <a:rPr lang="en-US"/>
+              <a:t>Second level</a:t>
+            </a:r>
+          </a:p>
+          <a:p>
+            <a:pPr lvl="2"/>
+            <a:r>
+              <a:rPr lang="en-US"/>
+              <a:t>Third level</a:t>
+            </a:r>
+          </a:p>
+          <a:p>
+            <a:pPr lvl="3"/>
+            <a:r>
+              <a:rPr lang="en-US"/>
+              <a:t>Fourth level</a:t>
+            </a:r>
+          </a:p>
+          <a:p>
+            <a:pPr lvl="4"/>
+            <a:r>
+              <a:rPr lang="en-US"/>
+              <a:t>Fifth level</a:t>
+            </a:r>
+          </a:p>
+        </p:txBody>
+      </p:sp>
+      <p:sp>
+        <p:nvSpPr>
+          <p:cNvPr id="6" name="Footer Placeholder 5"/>
+          <p:cNvSpPr>
+            <a:spLocks noGrp="1"/>
+          </p:cNvSpPr>
+          <p:nvPr>
+            <p:ph type="ftr" sz="quarter" idx="4"/>
+          </p:nvPr>
+        </p:nvSpPr>
+        <p:spPr>
+          <a:xfrm>
+            <a:off x="0" y="8685213"/>
+            <a:ext cx="2971800" cy="458787"/>
+          </a:xfrm>
+          <a:prstGeom prst="rect">
+            <a:avLst/>
+          </a:prstGeom>
+        </p:spPr>
+        <p:txBody>
+          <a:bodyPr vert="horz" lIns="91440" tIns="45720" rIns="91440" bIns="45720" rtlCol="0" anchor="b"/>
+          <a:lstStyle>
+            <a:lvl1pPr algn="l">
+              <a:defRPr sz="1200"/>
+            </a:lvl1pPr>
+          </a:lstStyle>
+          <a:p>
+            <a:endParaRPr lang="en-US"/>
+          </a:p>
+        </p:txBody>
+      </p:sp>
+      <p:sp>
+        <p:nvSpPr>
+          <p:cNvPr id="7" name="Slide Number Placeholder 6"/>
+          <p:cNvSpPr>
+            <a:spLocks noGrp="1"/>
+          </p:cNvSpPr>
+          <p:nvPr>
+            <p:ph type="sldNum" sz="quarter" idx="5"/>
+          </p:nvPr>
+        </p:nvSpPr>
+        <p:spPr>
+          <a:xfrm>
+            <a:off x="3884613" y="8685213"/>
+            <a:ext cx="2971800" cy="458787"/>
+          </a:xfrm>
+          <a:prstGeom prst="rect">
+            <a:avLst/>
+          </a:prstGeom>
+        </p:spPr>
+        <p:txBody>
+          <a:bodyPr vert="horz" lIns="91440" tIns="45720" rIns="91440" bIns="45720" rtlCol="0" anchor="b"/>
+          <a:lstStyle>
+            <a:lvl1pPr algn="r">
+              <a:defRPr sz="1200"/>
+            </a:lvl1pPr>
+          </a:lstStyle>
+          <a:p>
+            <a:fld id="{0616DE14-49C1-44D0-9947-5BBF1684B2E1}" type="slidenum">
+              <a:rPr lang="en-US" smtClean="0"/>
+              <a:t>‹#›</a:t>
+            </a:fld>
+            <a:endParaRPr lang="en-US"/>
+          </a:p>
+        </p:txBody>
+      </p:sp>
+    </p:spTree>
+    <p:extLst>
+      <p:ext uri="{BB962C8B-B14F-4D97-AF65-F5344CB8AC3E}">
+        <p14:creationId xmlns:p14="http://schemas.microsoft.com/office/powerpoint/2010/main" val="367621495"/>
+      </p:ext>
+    </p:extLst>
+  </p:cSld>
+  <p:clrMap bg1="lt1" tx1="dk1" bg2="lt2" tx2="dk2" accent1="accent1" accent2="accent2" accent3="accent3" accent4="accent4" accent5="accent5" accent6="accent6" hlink="hlink" folHlink="folHlink"/>
+  <p:notesStyle>
+    <a:lvl1pPr marL="0" algn="l" defTabSz="914400" rtl="0" eaLnBrk="1" latinLnBrk="0" hangingPunct="1">
+      <a:defRPr sz="1200" kern="1200">
+        <a:solidFill>
+          <a:schemeClr val="tx1"/>
+        </a:solidFill>
+        <a:latin typeface="+mn-lt"/>
+        <a:ea typeface="+mn-ea"/>
+        <a:cs typeface="+mn-cs"/>
+      </a:defRPr>
+    </a:lvl1pPr>
+    <a:lvl2pPr marL="457200" algn="l" defTabSz="914400" rtl="0" eaLnBrk="1" latinLnBrk="0" hangingPunct="1">
+      <a:defRPr sz="1200" kern="1200">
+        <a:solidFill>
+          <a:schemeClr val="tx1"/>
+        </a:solidFill>
+        <a:latin typeface="+mn-lt"/>
+        <a:ea typeface="+mn-ea"/>
+        <a:cs typeface="+mn-cs"/>
+      </a:defRPr>
+    </a:lvl2pPr>
+    <a:lvl3pPr marL="914400" algn="l" defTabSz="914400" rtl="0" eaLnBrk="1" latinLnBrk="0" hangingPunct="1">
+      <a:defRPr sz="1200" kern="1200">
+        <a:solidFill>
+          <a:schemeClr val="tx1"/>
+        </a:solidFill>
+        <a:latin typeface="+mn-lt"/>
+        <a:ea typeface="+mn-ea"/>
+        <a:cs typeface="+mn-cs"/>
+      </a:defRPr>
+    </a:lvl3pPr>
+    <a:lvl4pPr marL="1371600" algn="l" defTabSz="914400" rtl="0" eaLnBrk="1" latinLnBrk="0" hangingPunct="1">
+      <a:defRPr sz="1200" kern="1200">
+        <a:solidFill>
+          <a:schemeClr val="tx1"/>
+        </a:solidFill>
+        <a:latin typeface="+mn-lt"/>
+        <a:ea typeface="+mn-ea"/>
+        <a:cs typeface="+mn-cs"/>
+      </a:defRPr>
+    </a:lvl4pPr>
+    <a:lvl5pPr marL="1828800" algn="l" defTabSz="914400" rtl="0" eaLnBrk="1" latinLnBrk="0" hangingPunct="1">
+      <a:defRPr sz="1200" kern="1200">
+        <a:solidFill>
+          <a:schemeClr val="tx1"/>
+        </a:solidFill>
+        <a:latin typeface="+mn-lt"/>
+        <a:ea typeface="+mn-ea"/>
+        <a:cs typeface="+mn-cs"/>
+      </a:defRPr>
+    </a:lvl5pPr>
+    <a:lvl6pPr marL="2286000" algn="l" defTabSz="914400" rtl="0" eaLnBrk="1" latinLnBrk="0" hangingPunct="1">
+      <a:defRPr sz="1200" kern="1200">
+        <a:solidFill>
+          <a:schemeClr val="tx1"/>
+        </a:solidFill>
+        <a:latin typeface="+mn-lt"/>
+        <a:ea typeface="+mn-ea"/>
+        <a:cs typeface="+mn-cs"/>
+      </a:defRPr>
+    </a:lvl6pPr>
+    <a:lvl7pPr marL="2743200" algn="l" defTabSz="914400" rtl="0" eaLnBrk="1" latinLnBrk="0" hangingPunct="1">
+      <a:defRPr sz="1200" kern="1200">
+        <a:solidFill>
+          <a:schemeClr val="tx1"/>
+        </a:solidFill>
+        <a:latin typeface="+mn-lt"/>
+        <a:ea typeface="+mn-ea"/>
+        <a:cs typeface="+mn-cs"/>
+      </a:defRPr>
+    </a:lvl7pPr>
+    <a:lvl8pPr marL="3200400" algn="l" defTabSz="914400" rtl="0" eaLnBrk="1" latinLnBrk="0" hangingPunct="1">
+      <a:defRPr sz="1200" kern="1200">
+        <a:solidFill>
+          <a:schemeClr val="tx1"/>
+        </a:solidFill>
+        <a:latin typeface="+mn-lt"/>
+        <a:ea typeface="+mn-ea"/>
+        <a:cs typeface="+mn-cs"/>
+      </a:defRPr>
+    </a:lvl8pPr>
+    <a:lvl9pPr marL="3657600" algn="l" defTabSz="914400" rtl="0" eaLnBrk="1" latinLnBrk="0" hangingPunct="1">
+      <a:defRPr sz="1200" kern="1200">
+        <a:solidFill>
+          <a:schemeClr val="tx1"/>
+        </a:solidFill>
+        <a:latin typeface="+mn-lt"/>
+        <a:ea typeface="+mn-ea"/>
+        <a:cs typeface="+mn-cs"/>
+      </a:defRPr>
+    </a:lvl9pPr>
+  </p:notesStyle>
+</p:notesMaster>
+</file>
+
+<file path=ppt/notesSlides/notesSlide1.xml><?xml version="1.0" encoding="utf-8"?>
+<p:notes xmlns:a="http://schemas.openxmlformats.org/drawingml/2006/main" xmlns:r="http://schemas.openxmlformats.org/officeDocument/2006/relationships" xmlns:p="http://schemas.openxmlformats.org/presentationml/2006/main">
+  <p:cSld>
+    <p:spTree>
+      <p:nvGrpSpPr>
+        <p:cNvPr id="1" name=""/>
+        <p:cNvGrpSpPr/>
+        <p:nvPr/>
+      </p:nvGrpSpPr>
+      <p:grpSpPr>
+        <a:xfrm>
+          <a:off x="0" y="0"/>
+          <a:ext cx="0" cy="0"/>
+          <a:chOff x="0" y="0"/>
+          <a:chExt cx="0" cy="0"/>
+        </a:xfrm>
+      </p:grpSpPr>
+      <p:sp>
+        <p:nvSpPr>
+          <p:cNvPr id="2" name="Slide Image Placeholder 1"/>
+          <p:cNvSpPr>
+            <a:spLocks noGrp="1" noRot="1" noChangeAspect="1"/>
+          </p:cNvSpPr>
+          <p:nvPr>
+            <p:ph type="sldImg"/>
+          </p:nvPr>
+        </p:nvSpPr>
+        <p:spPr/>
+      </p:sp>
+      <p:sp>
+        <p:nvSpPr>
+          <p:cNvPr id="3" name="Notes Placeholder 2"/>
+          <p:cNvSpPr>
+            <a:spLocks noGrp="1"/>
+          </p:cNvSpPr>
+          <p:nvPr>
+            <p:ph type="body" idx="1"/>
+          </p:nvPr>
+        </p:nvSpPr>
+        <p:spPr/>
+        <p:txBody>
+          <a:bodyPr/>
+          <a:lstStyle/>
+          <a:p>
+            <a:pPr algn="r" rtl="1"/>
+            <a:r>
+              <a:rPr lang="he-IL" dirty="0"/>
+              <a:t>* </a:t>
+            </a:r>
+            <a:r>
+              <a:rPr lang="en-US" dirty="0"/>
+              <a:t>Petabyte – 1024 TB</a:t>
+            </a:r>
+            <a:endParaRPr lang="he-IL" dirty="0"/>
+          </a:p>
+          <a:p>
+            <a:pPr marL="171450" indent="-171450" algn="r" rtl="1">
+              <a:buFont typeface="Arial" panose="020B0604020202020204" pitchFamily="34" charset="0"/>
+              <a:buChar char="•"/>
+            </a:pPr>
+            <a:r>
+              <a:rPr lang="he-IL" dirty="0"/>
+              <a:t>90% מהמידע שקיים נוצר בשנתיים האחרונות (++ עדכני ל2014, צריך לבדוק היום ++)</a:t>
+            </a:r>
+          </a:p>
+          <a:p>
+            <a:pPr marL="171450" indent="-171450" algn="r" rtl="1">
+              <a:buFont typeface="Arial" panose="020B0604020202020204" pitchFamily="34" charset="0"/>
+              <a:buChar char="•"/>
+            </a:pPr>
+            <a:r>
+              <a:rPr lang="en-US" dirty="0"/>
+              <a:t>V</a:t>
+            </a:r>
+            <a:r>
+              <a:rPr lang="he-IL" dirty="0"/>
+              <a:t>4 הוגדר ע"י סטיב </a:t>
+            </a:r>
+            <a:r>
+              <a:rPr lang="he-IL" dirty="0" err="1"/>
+              <a:t>טוד</a:t>
+            </a:r>
+            <a:r>
+              <a:rPr lang="he-IL" dirty="0"/>
+              <a:t> מאוניברסיטת ברקלי - יש תיאורים של 9 </a:t>
+            </a:r>
+            <a:r>
+              <a:rPr lang="en-US" dirty="0"/>
+              <a:t>V</a:t>
+            </a:r>
+            <a:r>
+              <a:rPr lang="he-IL" dirty="0"/>
+              <a:t> גם</a:t>
+            </a:r>
+          </a:p>
+          <a:p>
+            <a:pPr marL="628650" lvl="1" indent="-171450" algn="r" rtl="1">
+              <a:buFont typeface="Arial" panose="020B0604020202020204" pitchFamily="34" charset="0"/>
+              <a:buChar char="•"/>
+            </a:pPr>
+            <a:r>
+              <a:rPr lang="he-IL" dirty="0"/>
+              <a:t>מהירות – משתמשים רוצים תשובה בזמן סביר</a:t>
+            </a:r>
+          </a:p>
+          <a:p>
+            <a:pPr marL="628650" lvl="1" indent="-171450" algn="r" rtl="1">
+              <a:buFont typeface="Arial" panose="020B0604020202020204" pitchFamily="34" charset="0"/>
+              <a:buChar char="•"/>
+            </a:pPr>
+            <a:r>
+              <a:rPr lang="he-IL" dirty="0"/>
+              <a:t>אמינות – התעלמות מ"רעש" ויכולת להסתמך על המידע בכדי לקבל החלטות</a:t>
+            </a:r>
+          </a:p>
+          <a:p>
+            <a:pPr marL="171450" lvl="0" indent="-171450" algn="r" rtl="1">
+              <a:buFont typeface="Arial" panose="020B0604020202020204" pitchFamily="34" charset="0"/>
+              <a:buChar char="•"/>
+            </a:pPr>
+            <a:r>
+              <a:rPr lang="he-IL" dirty="0"/>
+              <a:t>אתגרים</a:t>
+            </a:r>
+          </a:p>
+          <a:p>
+            <a:pPr marL="628650" lvl="1" indent="-171450" algn="r" rtl="1">
+              <a:buFont typeface="Arial" panose="020B0604020202020204" pitchFamily="34" charset="0"/>
+              <a:buChar char="•"/>
+            </a:pPr>
+            <a:r>
+              <a:rPr lang="he-IL" dirty="0"/>
+              <a:t>עולמי </a:t>
+            </a:r>
+            <a:r>
+              <a:rPr lang="en-US" dirty="0"/>
+              <a:t>DBMS</a:t>
+            </a:r>
+            <a:r>
+              <a:rPr lang="he-IL" dirty="0"/>
+              <a:t> (</a:t>
+            </a:r>
+            <a:r>
+              <a:rPr lang="en-US" dirty="0"/>
+              <a:t>Database management systems</a:t>
+            </a:r>
+            <a:r>
+              <a:rPr lang="he-IL" dirty="0"/>
+              <a:t>)</a:t>
+            </a:r>
+          </a:p>
+          <a:p>
+            <a:pPr marL="628650" lvl="1" indent="-171450" algn="r" rtl="1">
+              <a:buFont typeface="Arial" panose="020B0604020202020204" pitchFamily="34" charset="0"/>
+              <a:buChar char="•"/>
+            </a:pPr>
+            <a:r>
+              <a:rPr lang="he-IL" dirty="0"/>
+              <a:t>פתרון קלאסי של </a:t>
+            </a:r>
+            <a:r>
+              <a:rPr lang="en-US" dirty="0"/>
+              <a:t>entity-relationship</a:t>
+            </a:r>
+            <a:r>
+              <a:rPr lang="he-IL" dirty="0"/>
+              <a:t> דורש טעינה של המידע לפני החיפוש, מה שלא יעבוד בכמויות האלה</a:t>
+            </a:r>
+          </a:p>
+          <a:p>
+            <a:pPr marL="628650" lvl="1" indent="-171450" algn="r" rtl="1">
+              <a:buFont typeface="Arial" panose="020B0604020202020204" pitchFamily="34" charset="0"/>
+              <a:buChar char="•"/>
+            </a:pPr>
+            <a:r>
+              <a:rPr lang="he-IL" dirty="0"/>
+              <a:t>אין הרבה תמיכה לביצוע סטטיסטיקות בתוך ה</a:t>
+            </a:r>
+            <a:r>
+              <a:rPr lang="en-US" dirty="0"/>
+              <a:t>DB</a:t>
+            </a:r>
+            <a:r>
+              <a:rPr lang="he-IL" dirty="0"/>
+              <a:t> וביצוע חיפושים במקביל</a:t>
+            </a:r>
+          </a:p>
+          <a:p>
+            <a:pPr marL="171450" lvl="0" indent="-171450" algn="r" rtl="1">
+              <a:buFont typeface="Arial" panose="020B0604020202020204" pitchFamily="34" charset="0"/>
+              <a:buChar char="•"/>
+            </a:pPr>
+            <a:endParaRPr lang="he-IL" dirty="0"/>
+          </a:p>
+          <a:p>
+            <a:pPr marL="171450" indent="-171450" algn="r" rtl="1">
+              <a:buFont typeface="Arial" panose="020B0604020202020204" pitchFamily="34" charset="0"/>
+              <a:buChar char="•"/>
+            </a:pPr>
+            <a:endParaRPr lang="he-IL" dirty="0"/>
+          </a:p>
+          <a:p>
+            <a:pPr marL="171450" indent="-171450" algn="r" rtl="1">
+              <a:buFont typeface="Arial" panose="020B0604020202020204" pitchFamily="34" charset="0"/>
+              <a:buChar char="•"/>
+            </a:pPr>
+            <a:endParaRPr lang="en-US" dirty="0"/>
+          </a:p>
+        </p:txBody>
+      </p:sp>
+      <p:sp>
+        <p:nvSpPr>
+          <p:cNvPr id="4" name="Slide Number Placeholder 3"/>
+          <p:cNvSpPr>
+            <a:spLocks noGrp="1"/>
+          </p:cNvSpPr>
+          <p:nvPr>
+            <p:ph type="sldNum" sz="quarter" idx="5"/>
+          </p:nvPr>
+        </p:nvSpPr>
+        <p:spPr/>
+        <p:txBody>
+          <a:bodyPr/>
+          <a:lstStyle/>
+          <a:p>
+            <a:fld id="{0616DE14-49C1-44D0-9947-5BBF1684B2E1}" type="slidenum">
+              <a:rPr lang="en-US" smtClean="0"/>
+              <a:t>3</a:t>
+            </a:fld>
+            <a:endParaRPr lang="en-US"/>
+          </a:p>
+        </p:txBody>
+      </p:sp>
+    </p:spTree>
+    <p:extLst>
+      <p:ext uri="{BB962C8B-B14F-4D97-AF65-F5344CB8AC3E}">
+        <p14:creationId xmlns:p14="http://schemas.microsoft.com/office/powerpoint/2010/main" val="1030262925"/>
+      </p:ext>
+    </p:extLst>
+  </p:cSld>
+  <p:clrMapOvr>
+    <a:masterClrMapping/>
+  </p:clrMapOvr>
+</p:notes>
+</file>
+
+<file path=ppt/notesSlides/notesSlide2.xml><?xml version="1.0" encoding="utf-8"?>
+<p:notes xmlns:a="http://schemas.openxmlformats.org/drawingml/2006/main" xmlns:r="http://schemas.openxmlformats.org/officeDocument/2006/relationships" xmlns:p="http://schemas.openxmlformats.org/presentationml/2006/main">
+  <p:cSld>
+    <p:spTree>
+      <p:nvGrpSpPr>
+        <p:cNvPr id="1" name=""/>
+        <p:cNvGrpSpPr/>
+        <p:nvPr/>
+      </p:nvGrpSpPr>
+      <p:grpSpPr>
+        <a:xfrm>
+          <a:off x="0" y="0"/>
+          <a:ext cx="0" cy="0"/>
+          <a:chOff x="0" y="0"/>
+          <a:chExt cx="0" cy="0"/>
+        </a:xfrm>
+      </p:grpSpPr>
+      <p:sp>
+        <p:nvSpPr>
+          <p:cNvPr id="2" name="Slide Image Placeholder 1"/>
+          <p:cNvSpPr>
+            <a:spLocks noGrp="1" noRot="1" noChangeAspect="1"/>
+          </p:cNvSpPr>
+          <p:nvPr>
+            <p:ph type="sldImg"/>
+          </p:nvPr>
+        </p:nvSpPr>
+        <p:spPr/>
+      </p:sp>
+      <p:sp>
+        <p:nvSpPr>
+          <p:cNvPr id="3" name="Notes Placeholder 2"/>
+          <p:cNvSpPr>
+            <a:spLocks noGrp="1"/>
+          </p:cNvSpPr>
+          <p:nvPr>
+            <p:ph type="body" idx="1"/>
+          </p:nvPr>
+        </p:nvSpPr>
+        <p:spPr/>
+        <p:txBody>
+          <a:bodyPr/>
+          <a:lstStyle/>
+          <a:p>
+            <a:pPr algn="r" rtl="1"/>
+            <a:r>
+              <a:rPr lang="en-US" dirty="0"/>
+              <a:t>Business Intelligence</a:t>
+            </a:r>
+            <a:endParaRPr lang="he-IL" dirty="0"/>
+          </a:p>
+          <a:p>
+            <a:pPr algn="r" rtl="1"/>
+            <a:r>
+              <a:rPr lang="he-IL" dirty="0"/>
+              <a:t>ארגונים מחפשים דרכים חדשות ואפקטיביות לקבלת החלטות – כדי לקבל יתרון בשוק</a:t>
+            </a:r>
+          </a:p>
+          <a:p>
+            <a:pPr algn="r" rtl="1"/>
+            <a:r>
+              <a:rPr lang="en-US" dirty="0"/>
+              <a:t>Data mining</a:t>
+            </a:r>
+            <a:r>
+              <a:rPr lang="he-IL" dirty="0"/>
+              <a:t> – חשוב כדי לזהות דפוסים חדשים שיכולים להיות להועיל</a:t>
+            </a:r>
+          </a:p>
+          <a:p>
+            <a:pPr algn="r" rtl="1"/>
+            <a:r>
+              <a:rPr lang="he-IL" dirty="0"/>
+              <a:t>מאיפה? כל מקום.</a:t>
+            </a:r>
+          </a:p>
+          <a:p>
+            <a:pPr algn="r" rtl="1"/>
+            <a:endParaRPr lang="he-IL" dirty="0"/>
+          </a:p>
+          <a:p>
+            <a:pPr algn="r" rtl="1"/>
+            <a:r>
+              <a:rPr lang="he-IL" dirty="0"/>
+              <a:t>חנויות – החלטה על מחירים</a:t>
+            </a:r>
+          </a:p>
+          <a:p>
+            <a:pPr algn="r" rtl="1"/>
+            <a:r>
+              <a:rPr lang="he-IL" dirty="0"/>
+              <a:t>בנקים/השקעה – חישוב של סיכונים של השקעות, שינוי של אחוזים בודדים בזמן אמת</a:t>
+            </a:r>
+          </a:p>
+          <a:p>
+            <a:pPr algn="r" rtl="1"/>
+            <a:r>
+              <a:rPr lang="he-IL" dirty="0"/>
+              <a:t>ביטוח – במיוחד ביטוח חיים – הסתכלות על מידע היסטורי כדי לנחש התנהגות עתידית.</a:t>
+            </a:r>
+          </a:p>
+          <a:p>
+            <a:pPr algn="r" rtl="1"/>
+            <a:endParaRPr lang="he-IL" dirty="0"/>
+          </a:p>
+          <a:p>
+            <a:pPr algn="r" rtl="1"/>
+            <a:r>
+              <a:rPr lang="he-IL" dirty="0"/>
+              <a:t>צריך תשתיות כדי לעשות את זה</a:t>
+            </a:r>
+            <a:endParaRPr lang="en-US" dirty="0"/>
+          </a:p>
+        </p:txBody>
+      </p:sp>
+      <p:sp>
+        <p:nvSpPr>
+          <p:cNvPr id="4" name="Slide Number Placeholder 3"/>
+          <p:cNvSpPr>
+            <a:spLocks noGrp="1"/>
+          </p:cNvSpPr>
+          <p:nvPr>
+            <p:ph type="sldNum" sz="quarter" idx="5"/>
+          </p:nvPr>
+        </p:nvSpPr>
+        <p:spPr/>
+        <p:txBody>
+          <a:bodyPr/>
+          <a:lstStyle/>
+          <a:p>
+            <a:fld id="{0616DE14-49C1-44D0-9947-5BBF1684B2E1}" type="slidenum">
+              <a:rPr lang="en-US" smtClean="0"/>
+              <a:t>4</a:t>
+            </a:fld>
+            <a:endParaRPr lang="en-US"/>
+          </a:p>
+        </p:txBody>
+      </p:sp>
+    </p:spTree>
+    <p:extLst>
+      <p:ext uri="{BB962C8B-B14F-4D97-AF65-F5344CB8AC3E}">
+        <p14:creationId xmlns:p14="http://schemas.microsoft.com/office/powerpoint/2010/main" val="1254362943"/>
+      </p:ext>
+    </p:extLst>
+  </p:cSld>
+  <p:clrMapOvr>
+    <a:masterClrMapping/>
+  </p:clrMapOvr>
+</p:notes>
+</file>
+
+<file path=ppt/notesSlides/notesSlide3.xml><?xml version="1.0" encoding="utf-8"?>
+<p:notes xmlns:a="http://schemas.openxmlformats.org/drawingml/2006/main" xmlns:r="http://schemas.openxmlformats.org/officeDocument/2006/relationships" xmlns:p="http://schemas.openxmlformats.org/presentationml/2006/main">
+  <p:cSld>
+    <p:spTree>
+      <p:nvGrpSpPr>
+        <p:cNvPr id="1" name=""/>
+        <p:cNvGrpSpPr/>
+        <p:nvPr/>
+      </p:nvGrpSpPr>
+      <p:grpSpPr>
+        <a:xfrm>
+          <a:off x="0" y="0"/>
+          <a:ext cx="0" cy="0"/>
+          <a:chOff x="0" y="0"/>
+          <a:chExt cx="0" cy="0"/>
+        </a:xfrm>
+      </p:grpSpPr>
+      <p:sp>
+        <p:nvSpPr>
+          <p:cNvPr id="2" name="Slide Image Placeholder 1"/>
+          <p:cNvSpPr>
+            <a:spLocks noGrp="1" noRot="1" noChangeAspect="1"/>
+          </p:cNvSpPr>
+          <p:nvPr>
+            <p:ph type="sldImg"/>
+          </p:nvPr>
+        </p:nvSpPr>
+        <p:spPr/>
+      </p:sp>
+      <p:sp>
+        <p:nvSpPr>
+          <p:cNvPr id="3" name="Notes Placeholder 2"/>
+          <p:cNvSpPr>
+            <a:spLocks noGrp="1"/>
+          </p:cNvSpPr>
+          <p:nvPr>
+            <p:ph type="body" idx="1"/>
+          </p:nvPr>
+        </p:nvSpPr>
+        <p:spPr/>
+        <p:txBody>
+          <a:bodyPr/>
+          <a:lstStyle/>
+          <a:p>
+            <a:pPr algn="r" rtl="1"/>
+            <a:r>
+              <a:rPr lang="he-IL" dirty="0"/>
+              <a:t>עולם ה</a:t>
+            </a:r>
+            <a:r>
+              <a:rPr lang="en-US" dirty="0"/>
+              <a:t>Cloud</a:t>
+            </a:r>
+            <a:r>
+              <a:rPr lang="he-IL" dirty="0"/>
+              <a:t> עוזר כדי לתת אפשרות לכולם להשתתף בתחום</a:t>
+            </a:r>
+          </a:p>
+          <a:p>
+            <a:pPr algn="r" rtl="1"/>
+            <a:r>
+              <a:rPr lang="he-IL" dirty="0"/>
+              <a:t>מציע יכולת </a:t>
+            </a:r>
+            <a:r>
+              <a:rPr lang="en-US" dirty="0"/>
+              <a:t>Scaling</a:t>
+            </a:r>
+            <a:r>
+              <a:rPr lang="he-IL" dirty="0"/>
+              <a:t> ביחס לשימוש, עלות ניהול קטנות וגמישות לשימוש הלקוח</a:t>
+            </a:r>
+          </a:p>
+          <a:p>
+            <a:pPr algn="r" rtl="1"/>
+            <a:r>
+              <a:rPr lang="he-IL" dirty="0"/>
+              <a:t>מחולק לרמות אבסטרקציה</a:t>
+            </a:r>
+          </a:p>
+          <a:p>
+            <a:pPr algn="r" rtl="1"/>
+            <a:r>
+              <a:rPr lang="en-US" dirty="0"/>
+              <a:t>Infrastructure as a Service</a:t>
+            </a:r>
+            <a:r>
+              <a:rPr lang="he-IL" dirty="0"/>
+              <a:t> – </a:t>
+            </a:r>
+            <a:r>
+              <a:rPr lang="en-US" dirty="0"/>
+              <a:t>filesystem</a:t>
+            </a:r>
+            <a:r>
+              <a:rPr lang="he-IL" dirty="0"/>
+              <a:t> לאחסון המידע בכמויות גדולות</a:t>
+            </a:r>
+          </a:p>
+          <a:p>
+            <a:pPr algn="r" rtl="1"/>
+            <a:r>
+              <a:rPr lang="en-US" dirty="0"/>
+              <a:t>Platform as a Service</a:t>
+            </a:r>
+            <a:r>
+              <a:rPr lang="he-IL" dirty="0"/>
+              <a:t> – </a:t>
+            </a:r>
+            <a:r>
+              <a:rPr lang="en-US" dirty="0"/>
+              <a:t>DBMS</a:t>
+            </a:r>
+            <a:r>
+              <a:rPr lang="he-IL" dirty="0"/>
+              <a:t>, </a:t>
+            </a:r>
+            <a:r>
+              <a:rPr lang="en-US" dirty="0"/>
+              <a:t>DB</a:t>
+            </a:r>
+            <a:r>
+              <a:rPr lang="he-IL" dirty="0"/>
+              <a:t> לניהול המידע (בין שכבות "תשתית" ל"פלטפורמה") – משומש כדי לגשת למידע ברמת הפלטפורמה, אך המימוש הוא ברמת החומרה ולכן בתשתית.</a:t>
+            </a:r>
+          </a:p>
+          <a:p>
+            <a:pPr marL="0" marR="0" lvl="0" indent="0" algn="r" defTabSz="914400" rtl="1" eaLnBrk="1" fontAlgn="auto" latinLnBrk="0" hangingPunct="1">
+              <a:lnSpc>
+                <a:spcPct val="100000"/>
+              </a:lnSpc>
+              <a:spcBef>
+                <a:spcPts val="0"/>
+              </a:spcBef>
+              <a:spcAft>
+                <a:spcPts val="0"/>
+              </a:spcAft>
+              <a:buClrTx/>
+              <a:buSzTx/>
+              <a:buFontTx/>
+              <a:buNone/>
+              <a:tabLst/>
+              <a:defRPr/>
+            </a:pPr>
+            <a:r>
+              <a:rPr lang="en-US" dirty="0"/>
+              <a:t>PaaS</a:t>
+            </a:r>
+            <a:r>
+              <a:rPr lang="he-IL" dirty="0"/>
+              <a:t>- פלטפורמה לביצוע שיודעת לבזר את הפעולה החישובית על כלל המחשבים.</a:t>
+            </a:r>
+            <a:endParaRPr lang="en-US" dirty="0"/>
+          </a:p>
+          <a:p>
+            <a:pPr algn="r" rtl="1"/>
+            <a:r>
+              <a:rPr lang="en-US" dirty="0"/>
+              <a:t>Software as a Service</a:t>
+            </a:r>
+            <a:r>
+              <a:rPr lang="he-IL" dirty="0"/>
+              <a:t> – תכונה לשליפת המידע שיושבת בין ה</a:t>
+            </a:r>
+            <a:r>
+              <a:rPr lang="en-US" dirty="0"/>
+              <a:t>PaaS</a:t>
+            </a:r>
+            <a:r>
+              <a:rPr lang="he-IL" dirty="0"/>
+              <a:t> ל-</a:t>
+            </a:r>
+            <a:r>
+              <a:rPr lang="en-US" dirty="0"/>
+              <a:t>SaaS</a:t>
+            </a:r>
+            <a:endParaRPr lang="he-IL" dirty="0"/>
+          </a:p>
+          <a:p>
+            <a:pPr algn="r" rtl="1"/>
+            <a:r>
+              <a:rPr lang="he-IL" dirty="0"/>
+              <a:t>נראה את 4 השכבות:</a:t>
+            </a:r>
+          </a:p>
+        </p:txBody>
+      </p:sp>
+      <p:sp>
+        <p:nvSpPr>
+          <p:cNvPr id="4" name="Slide Number Placeholder 3"/>
+          <p:cNvSpPr>
+            <a:spLocks noGrp="1"/>
+          </p:cNvSpPr>
+          <p:nvPr>
+            <p:ph type="sldNum" sz="quarter" idx="5"/>
+          </p:nvPr>
+        </p:nvSpPr>
+        <p:spPr/>
+        <p:txBody>
+          <a:bodyPr/>
+          <a:lstStyle/>
+          <a:p>
+            <a:fld id="{0616DE14-49C1-44D0-9947-5BBF1684B2E1}" type="slidenum">
+              <a:rPr lang="en-US" smtClean="0"/>
+              <a:t>5</a:t>
+            </a:fld>
+            <a:endParaRPr lang="en-US"/>
+          </a:p>
+        </p:txBody>
+      </p:sp>
+    </p:spTree>
+    <p:extLst>
+      <p:ext uri="{BB962C8B-B14F-4D97-AF65-F5344CB8AC3E}">
+        <p14:creationId xmlns:p14="http://schemas.microsoft.com/office/powerpoint/2010/main" val="1505011754"/>
+      </p:ext>
+    </p:extLst>
+  </p:cSld>
+  <p:clrMapOvr>
+    <a:masterClrMapping/>
+  </p:clrMapOvr>
+</p:notes>
+</file>
+
+<file path=ppt/notesSlides/notesSlide4.xml><?xml version="1.0" encoding="utf-8"?>
+<p:notes xmlns:a="http://schemas.openxmlformats.org/drawingml/2006/main" xmlns:r="http://schemas.openxmlformats.org/officeDocument/2006/relationships" xmlns:p="http://schemas.openxmlformats.org/presentationml/2006/main">
+  <p:cSld>
+    <p:spTree>
+      <p:nvGrpSpPr>
+        <p:cNvPr id="1" name=""/>
+        <p:cNvGrpSpPr/>
+        <p:nvPr/>
+      </p:nvGrpSpPr>
+      <p:grpSpPr>
+        <a:xfrm>
+          <a:off x="0" y="0"/>
+          <a:ext cx="0" cy="0"/>
+          <a:chOff x="0" y="0"/>
+          <a:chExt cx="0" cy="0"/>
+        </a:xfrm>
+      </p:grpSpPr>
+      <p:sp>
+        <p:nvSpPr>
+          <p:cNvPr id="2" name="Slide Image Placeholder 1"/>
+          <p:cNvSpPr>
+            <a:spLocks noGrp="1" noRot="1" noChangeAspect="1"/>
+          </p:cNvSpPr>
+          <p:nvPr>
+            <p:ph type="sldImg"/>
+          </p:nvPr>
+        </p:nvSpPr>
+        <p:spPr/>
+      </p:sp>
+      <p:sp>
+        <p:nvSpPr>
+          <p:cNvPr id="3" name="Notes Placeholder 2"/>
+          <p:cNvSpPr>
+            <a:spLocks noGrp="1"/>
+          </p:cNvSpPr>
+          <p:nvPr>
+            <p:ph type="body" idx="1"/>
+          </p:nvPr>
+        </p:nvSpPr>
+        <p:spPr/>
+        <p:txBody>
+          <a:bodyPr/>
+          <a:lstStyle/>
+          <a:p>
+            <a:pPr marL="0" marR="0" lvl="0" indent="0" algn="r" defTabSz="914400" rtl="1" eaLnBrk="1" fontAlgn="auto" latinLnBrk="0" hangingPunct="1">
+              <a:lnSpc>
+                <a:spcPct val="100000"/>
+              </a:lnSpc>
+              <a:spcBef>
+                <a:spcPts val="0"/>
+              </a:spcBef>
+              <a:spcAft>
+                <a:spcPts val="0"/>
+              </a:spcAft>
+              <a:buClrTx/>
+              <a:buSzTx/>
+              <a:buFontTx/>
+              <a:buNone/>
+              <a:tabLst/>
+              <a:defRPr/>
+            </a:pPr>
+            <a:r>
+              <a:rPr lang="he-IL" dirty="0"/>
+              <a:t>השכבה הראשונה היא הבסיס לארכיטקטורת ה</a:t>
+            </a:r>
+            <a:r>
+              <a:rPr lang="en-US" dirty="0"/>
+              <a:t>cloud</a:t>
+            </a:r>
+            <a:r>
+              <a:rPr lang="he-IL" dirty="0"/>
+              <a:t>. (שכבת </a:t>
+            </a:r>
+            <a:r>
+              <a:rPr lang="he-IL" sz="1200" dirty="0"/>
+              <a:t>אחסון קבצים)</a:t>
+            </a:r>
+            <a:endParaRPr lang="he-IL" dirty="0"/>
+          </a:p>
+          <a:p>
+            <a:pPr algn="r" rtl="1"/>
+            <a:endParaRPr lang="en-US" dirty="0"/>
+          </a:p>
+          <a:p>
+            <a:pPr algn="r" rtl="1"/>
+            <a:r>
+              <a:rPr lang="en-US" dirty="0"/>
+              <a:t>Hadoop-distributed file system</a:t>
+            </a:r>
+            <a:endParaRPr lang="he-IL" dirty="0"/>
+          </a:p>
+          <a:p>
+            <a:pPr algn="r" rtl="1"/>
+            <a:r>
+              <a:rPr lang="he-IL" dirty="0"/>
+              <a:t>פרויקט </a:t>
+            </a:r>
+            <a:r>
+              <a:rPr lang="en-US" dirty="0"/>
+              <a:t>opensource</a:t>
+            </a:r>
+            <a:r>
+              <a:rPr lang="he-IL" dirty="0"/>
+              <a:t> של </a:t>
+            </a:r>
+            <a:r>
+              <a:rPr lang="en-US" dirty="0"/>
+              <a:t>apache</a:t>
+            </a:r>
+            <a:r>
+              <a:rPr lang="he-IL" dirty="0"/>
+              <a:t> שממש את הרעיון של </a:t>
+            </a:r>
+            <a:r>
+              <a:rPr lang="en-US" dirty="0"/>
+              <a:t>google filesystem</a:t>
+            </a:r>
+            <a:endParaRPr lang="he-IL" dirty="0"/>
+          </a:p>
+          <a:p>
+            <a:pPr algn="r" rtl="1"/>
+            <a:r>
+              <a:rPr lang="he-IL" dirty="0"/>
+              <a:t>בנוי מהמון שרתים שמתחלקים לשתי קבוצות.</a:t>
+            </a:r>
+          </a:p>
+          <a:p>
+            <a:pPr algn="r" rtl="1"/>
+            <a:r>
+              <a:rPr lang="en-US" dirty="0" err="1"/>
+              <a:t>Namenode</a:t>
+            </a:r>
+            <a:r>
+              <a:rPr lang="he-IL" dirty="0"/>
+              <a:t> – אחד.</a:t>
+            </a:r>
+          </a:p>
+          <a:p>
+            <a:pPr algn="r" rtl="1"/>
+            <a:r>
+              <a:rPr lang="en-US" dirty="0" err="1"/>
+              <a:t>Datanodes</a:t>
+            </a:r>
+            <a:r>
+              <a:rPr lang="he-IL" dirty="0"/>
+              <a:t> – המון.</a:t>
+            </a:r>
+          </a:p>
+          <a:p>
+            <a:pPr algn="r" rtl="1"/>
+            <a:r>
+              <a:rPr lang="he-IL" dirty="0"/>
+              <a:t>קבצים מחולקים לבלוקים קבועים של </a:t>
+            </a:r>
+            <a:r>
+              <a:rPr lang="en-US" dirty="0"/>
+              <a:t>64MB</a:t>
+            </a:r>
+            <a:endParaRPr lang="he-IL" dirty="0"/>
+          </a:p>
+          <a:p>
+            <a:pPr algn="r" rtl="1"/>
+            <a:r>
+              <a:rPr lang="he-IL" dirty="0"/>
+              <a:t>לכל בלוק יש </a:t>
+            </a:r>
+            <a:r>
+              <a:rPr lang="en-US" dirty="0"/>
+              <a:t>ID</a:t>
+            </a:r>
+            <a:r>
+              <a:rPr lang="he-IL" dirty="0"/>
+              <a:t> בגודל 64 ביט. (</a:t>
+            </a:r>
+            <a:r>
+              <a:rPr lang="en-US" dirty="0"/>
+              <a:t>2^64</a:t>
+            </a:r>
+            <a:r>
+              <a:rPr lang="he-IL" dirty="0"/>
+              <a:t> בלוקים אפשריים – </a:t>
+            </a:r>
+            <a:r>
+              <a:rPr lang="en-US" dirty="0"/>
+              <a:t>2^64*64 = 2^70=1180591620717PB=10**12 PB</a:t>
+            </a:r>
+            <a:r>
+              <a:rPr lang="he-IL" dirty="0"/>
+              <a:t>)</a:t>
+            </a:r>
+          </a:p>
+          <a:p>
+            <a:pPr algn="r" rtl="1"/>
+            <a:r>
+              <a:rPr lang="he-IL" dirty="0"/>
+              <a:t>כמשתמש רוצה קובץ, הוא פונה ל</a:t>
+            </a:r>
+            <a:r>
+              <a:rPr lang="en-US" dirty="0" err="1"/>
+              <a:t>Namenode</a:t>
+            </a:r>
+            <a:r>
+              <a:rPr lang="he-IL" dirty="0"/>
+              <a:t> עם השם שלו ומקבל בחזרה את ה</a:t>
+            </a:r>
+            <a:r>
+              <a:rPr lang="en-US" dirty="0" err="1"/>
+              <a:t>BlockID</a:t>
+            </a:r>
+            <a:r>
+              <a:rPr lang="he-IL" dirty="0"/>
+              <a:t> </a:t>
+            </a:r>
+            <a:r>
+              <a:rPr lang="he-IL" dirty="0" err="1"/>
+              <a:t>וה</a:t>
+            </a:r>
+            <a:r>
+              <a:rPr lang="en-US" dirty="0" err="1"/>
+              <a:t>Datanode</a:t>
+            </a:r>
+            <a:r>
+              <a:rPr lang="he-IL" dirty="0"/>
+              <a:t> שבו מאוחסן המידע – ופונה אליו עצמאית (חשוב! מידע אף פעם לא עובר דרך ה</a:t>
+            </a:r>
+            <a:r>
+              <a:rPr lang="en-US" dirty="0" err="1"/>
+              <a:t>Namenode</a:t>
+            </a:r>
+            <a:r>
+              <a:rPr lang="he-IL" dirty="0"/>
+              <a:t>)</a:t>
+            </a:r>
+          </a:p>
+          <a:p>
+            <a:pPr algn="r" rtl="1"/>
+            <a:r>
+              <a:rPr lang="he-IL" dirty="0"/>
+              <a:t>כדי לשמור על זמינות – כל בלוק משוכפל 3 פעמים של שרתים שונים</a:t>
+            </a:r>
+          </a:p>
+          <a:p>
+            <a:pPr algn="r" rtl="1"/>
+            <a:r>
+              <a:rPr lang="he-IL" dirty="0"/>
+              <a:t>איזון אוטומטי של המידע בין שרתי </a:t>
+            </a:r>
+            <a:r>
+              <a:rPr lang="en-US" dirty="0" err="1"/>
+              <a:t>Datanode</a:t>
+            </a:r>
+            <a:endParaRPr lang="he-IL" dirty="0"/>
+          </a:p>
+          <a:p>
+            <a:pPr algn="r" rtl="1"/>
+            <a:endParaRPr lang="he-IL" dirty="0"/>
+          </a:p>
+          <a:p>
+            <a:pPr algn="r" rtl="1"/>
+            <a:r>
+              <a:rPr lang="he-IL" dirty="0"/>
+              <a:t>עוד אופציות:</a:t>
+            </a:r>
+          </a:p>
+          <a:p>
+            <a:pPr algn="r" rtl="1"/>
+            <a:r>
+              <a:rPr lang="en-US" dirty="0"/>
+              <a:t>Amazon Simple Storage Service (S3), Cosmos, and Sector</a:t>
+            </a:r>
+          </a:p>
+        </p:txBody>
+      </p:sp>
+      <p:sp>
+        <p:nvSpPr>
+          <p:cNvPr id="4" name="Slide Number Placeholder 3"/>
+          <p:cNvSpPr>
+            <a:spLocks noGrp="1"/>
+          </p:cNvSpPr>
+          <p:nvPr>
+            <p:ph type="sldNum" sz="quarter" idx="5"/>
+          </p:nvPr>
+        </p:nvSpPr>
+        <p:spPr/>
+        <p:txBody>
+          <a:bodyPr/>
+          <a:lstStyle/>
+          <a:p>
+            <a:fld id="{0616DE14-49C1-44D0-9947-5BBF1684B2E1}" type="slidenum">
+              <a:rPr lang="en-US" smtClean="0"/>
+              <a:t>6</a:t>
+            </a:fld>
+            <a:endParaRPr lang="en-US"/>
+          </a:p>
+        </p:txBody>
+      </p:sp>
+    </p:spTree>
+    <p:extLst>
+      <p:ext uri="{BB962C8B-B14F-4D97-AF65-F5344CB8AC3E}">
+        <p14:creationId xmlns:p14="http://schemas.microsoft.com/office/powerpoint/2010/main" val="3716785628"/>
+      </p:ext>
+    </p:extLst>
+  </p:cSld>
+  <p:clrMapOvr>
+    <a:masterClrMapping/>
+  </p:clrMapOvr>
+</p:notes>
+</file>
+
+<file path=ppt/notesSlides/notesSlide5.xml><?xml version="1.0" encoding="utf-8"?>
+<p:notes xmlns:a="http://schemas.openxmlformats.org/drawingml/2006/main" xmlns:r="http://schemas.openxmlformats.org/officeDocument/2006/relationships" xmlns:p="http://schemas.openxmlformats.org/presentationml/2006/main">
+  <p:cSld>
+    <p:spTree>
+      <p:nvGrpSpPr>
+        <p:cNvPr id="1" name=""/>
+        <p:cNvGrpSpPr/>
+        <p:nvPr/>
+      </p:nvGrpSpPr>
+      <p:grpSpPr>
+        <a:xfrm>
+          <a:off x="0" y="0"/>
+          <a:ext cx="0" cy="0"/>
+          <a:chOff x="0" y="0"/>
+          <a:chExt cx="0" cy="0"/>
+        </a:xfrm>
+      </p:grpSpPr>
+      <p:sp>
+        <p:nvSpPr>
+          <p:cNvPr id="2" name="Slide Image Placeholder 1"/>
+          <p:cNvSpPr>
+            <a:spLocks noGrp="1" noRot="1" noChangeAspect="1"/>
+          </p:cNvSpPr>
+          <p:nvPr>
+            <p:ph type="sldImg"/>
+          </p:nvPr>
+        </p:nvSpPr>
+        <p:spPr/>
+      </p:sp>
+      <p:sp>
+        <p:nvSpPr>
+          <p:cNvPr id="3" name="Notes Placeholder 2"/>
+          <p:cNvSpPr>
+            <a:spLocks noGrp="1"/>
+          </p:cNvSpPr>
+          <p:nvPr>
+            <p:ph type="body" idx="1"/>
+          </p:nvPr>
+        </p:nvSpPr>
+        <p:spPr/>
+        <p:txBody>
+          <a:bodyPr/>
+          <a:lstStyle/>
+          <a:p>
+            <a:pPr marL="0" marR="0" lvl="0" indent="0" algn="r" defTabSz="914400" rtl="1" eaLnBrk="1" fontAlgn="auto" latinLnBrk="0" hangingPunct="1">
+              <a:lnSpc>
+                <a:spcPct val="100000"/>
+              </a:lnSpc>
+              <a:spcBef>
+                <a:spcPts val="0"/>
+              </a:spcBef>
+              <a:spcAft>
+                <a:spcPts val="0"/>
+              </a:spcAft>
+              <a:buClrTx/>
+              <a:buSzTx/>
+              <a:buFontTx/>
+              <a:buNone/>
+              <a:tabLst/>
+              <a:defRPr/>
+            </a:pPr>
+            <a:r>
+              <a:rPr lang="he-IL" dirty="0"/>
+              <a:t>השכבה השנייה היא על מסדי הנתונים (שכבת </a:t>
+            </a:r>
+            <a:r>
+              <a:rPr lang="he-IL" sz="1200" dirty="0"/>
+              <a:t>ניהול מידע)</a:t>
+            </a:r>
+            <a:endParaRPr lang="he-IL" dirty="0"/>
+          </a:p>
+          <a:p>
+            <a:pPr algn="r" rtl="1"/>
+            <a:endParaRPr lang="en-US" dirty="0"/>
+          </a:p>
+          <a:p>
+            <a:pPr algn="r" rtl="1"/>
+            <a:r>
+              <a:rPr lang="en-US" dirty="0"/>
+              <a:t>Not Only SQL</a:t>
+            </a:r>
+            <a:endParaRPr lang="he-IL" dirty="0"/>
+          </a:p>
+          <a:p>
+            <a:pPr algn="r" rtl="1"/>
+            <a:endParaRPr lang="he-IL" dirty="0"/>
+          </a:p>
+          <a:p>
+            <a:pPr algn="r" rtl="1"/>
+            <a:r>
+              <a:rPr lang="he-IL" dirty="0"/>
+              <a:t>ממומש מעל מערכות קבצים מבוזרות - פעולות </a:t>
+            </a:r>
+            <a:r>
+              <a:rPr lang="en-US" dirty="0"/>
+              <a:t>Join</a:t>
+            </a:r>
+            <a:r>
+              <a:rPr lang="he-IL" dirty="0"/>
+              <a:t> ממומשות בעת הצורך ע"י אלגוריתמים ייעודיים</a:t>
+            </a:r>
+          </a:p>
+          <a:p>
+            <a:pPr algn="r" rtl="1"/>
+            <a:r>
+              <a:rPr lang="he-IL" dirty="0"/>
+              <a:t>ההבדל העיקרי היא האפשרות להרחבה אופקית של המידע</a:t>
+            </a:r>
+            <a:r>
+              <a:rPr lang="en-US" dirty="0"/>
+              <a:t> </a:t>
+            </a:r>
+            <a:r>
+              <a:rPr lang="he-IL" dirty="0"/>
+              <a:t> (אופקית – הוספת שרתים. אנכית – הוספת יכולת עיבוד)</a:t>
+            </a:r>
+          </a:p>
+          <a:p>
+            <a:pPr algn="r" rtl="1"/>
+            <a:r>
+              <a:rPr lang="he-IL" dirty="0"/>
+              <a:t>קריסה של שרת יחיד יכול להיפתר בלי קושי</a:t>
+            </a:r>
+          </a:p>
+          <a:p>
+            <a:pPr algn="r" rtl="1"/>
+            <a:endParaRPr lang="he-IL" dirty="0"/>
+          </a:p>
+          <a:p>
+            <a:pPr algn="r" rtl="1"/>
+            <a:r>
+              <a:rPr lang="he-IL" dirty="0"/>
+              <a:t>אין צורך בסכמה (</a:t>
+            </a:r>
+            <a:r>
+              <a:rPr lang="en-US" dirty="0"/>
+              <a:t>scheme</a:t>
+            </a:r>
+            <a:r>
+              <a:rPr lang="he-IL" dirty="0"/>
+              <a:t>) המידע יכול להיכנס בלי להגדיר מבנה קבוע – בנוסף אפשר לשנות את הפורמט בכל רגע בלי לעצור את האפליקציה, מה שמאפשר המון גמישות</a:t>
+            </a:r>
+            <a:endParaRPr lang="en-US" dirty="0"/>
+          </a:p>
+          <a:p>
+            <a:pPr algn="r" rtl="1"/>
+            <a:endParaRPr lang="he-IL" dirty="0"/>
+          </a:p>
+          <a:p>
+            <a:pPr algn="r" rtl="1"/>
+            <a:r>
+              <a:rPr lang="he-IL" dirty="0"/>
+              <a:t>דוגמה של מימוש הוא </a:t>
+            </a:r>
+            <a:r>
+              <a:rPr lang="en-US" dirty="0" err="1"/>
+              <a:t>BigTable</a:t>
+            </a:r>
+            <a:r>
+              <a:rPr lang="he-IL" dirty="0"/>
+              <a:t> ע"י גוגל ב2004</a:t>
+            </a:r>
+            <a:endParaRPr lang="en-US" dirty="0"/>
+          </a:p>
+          <a:p>
+            <a:pPr algn="r" rtl="1"/>
+            <a:endParaRPr lang="he-IL" dirty="0"/>
+          </a:p>
+          <a:p>
+            <a:pPr algn="r" rtl="1"/>
+            <a:r>
+              <a:rPr lang="he-IL" dirty="0"/>
+              <a:t>עוד דוגמאות:</a:t>
+            </a:r>
+            <a:endParaRPr lang="en-US" dirty="0"/>
+          </a:p>
+          <a:p>
+            <a:pPr algn="r" rtl="1"/>
+            <a:r>
+              <a:rPr lang="en-US" dirty="0"/>
+              <a:t>Dynamo, </a:t>
+            </a:r>
+            <a:r>
+              <a:rPr lang="en-US" dirty="0" err="1"/>
+              <a:t>Hbase</a:t>
+            </a:r>
+            <a:r>
+              <a:rPr lang="en-US" dirty="0"/>
+              <a:t>, Cassandra, </a:t>
+            </a:r>
+            <a:r>
+              <a:rPr lang="en-US" dirty="0" err="1"/>
+              <a:t>Hypertable</a:t>
+            </a:r>
+            <a:r>
+              <a:rPr lang="en-US" dirty="0"/>
+              <a:t>, MongoDB, CouchDB</a:t>
+            </a:r>
+          </a:p>
+        </p:txBody>
+      </p:sp>
+      <p:sp>
+        <p:nvSpPr>
+          <p:cNvPr id="4" name="Slide Number Placeholder 3"/>
+          <p:cNvSpPr>
+            <a:spLocks noGrp="1"/>
+          </p:cNvSpPr>
+          <p:nvPr>
+            <p:ph type="sldNum" sz="quarter" idx="5"/>
+          </p:nvPr>
+        </p:nvSpPr>
+        <p:spPr/>
+        <p:txBody>
+          <a:bodyPr/>
+          <a:lstStyle/>
+          <a:p>
+            <a:fld id="{0616DE14-49C1-44D0-9947-5BBF1684B2E1}" type="slidenum">
+              <a:rPr lang="en-US" smtClean="0"/>
+              <a:t>7</a:t>
+            </a:fld>
+            <a:endParaRPr lang="en-US"/>
+          </a:p>
+        </p:txBody>
+      </p:sp>
+    </p:spTree>
+    <p:extLst>
+      <p:ext uri="{BB962C8B-B14F-4D97-AF65-F5344CB8AC3E}">
+        <p14:creationId xmlns:p14="http://schemas.microsoft.com/office/powerpoint/2010/main" val="2880103432"/>
+      </p:ext>
+    </p:extLst>
+  </p:cSld>
+  <p:clrMapOvr>
+    <a:masterClrMapping/>
+  </p:clrMapOvr>
+</p:notes>
+</file>
+
+<file path=ppt/notesSlides/notesSlide6.xml><?xml version="1.0" encoding="utf-8"?>
+<p:notes xmlns:a="http://schemas.openxmlformats.org/drawingml/2006/main" xmlns:r="http://schemas.openxmlformats.org/officeDocument/2006/relationships" xmlns:p="http://schemas.openxmlformats.org/presentationml/2006/main">
+  <p:cSld>
+    <p:spTree>
+      <p:nvGrpSpPr>
+        <p:cNvPr id="1" name=""/>
+        <p:cNvGrpSpPr/>
+        <p:nvPr/>
+      </p:nvGrpSpPr>
+      <p:grpSpPr>
+        <a:xfrm>
+          <a:off x="0" y="0"/>
+          <a:ext cx="0" cy="0"/>
+          <a:chOff x="0" y="0"/>
+          <a:chExt cx="0" cy="0"/>
+        </a:xfrm>
+      </p:grpSpPr>
+      <p:sp>
+        <p:nvSpPr>
+          <p:cNvPr id="2" name="Slide Image Placeholder 1"/>
+          <p:cNvSpPr>
+            <a:spLocks noGrp="1" noRot="1" noChangeAspect="1"/>
+          </p:cNvSpPr>
+          <p:nvPr>
+            <p:ph type="sldImg"/>
+          </p:nvPr>
+        </p:nvSpPr>
+        <p:spPr/>
+      </p:sp>
+      <p:sp>
+        <p:nvSpPr>
+          <p:cNvPr id="3" name="Notes Placeholder 2"/>
+          <p:cNvSpPr>
+            <a:spLocks noGrp="1"/>
+          </p:cNvSpPr>
+          <p:nvPr>
+            <p:ph type="body" idx="1"/>
+          </p:nvPr>
+        </p:nvSpPr>
+        <p:spPr/>
+        <p:txBody>
+          <a:bodyPr/>
+          <a:lstStyle/>
+          <a:p>
+            <a:pPr marL="0" marR="0" lvl="0" indent="0" algn="r" defTabSz="914400" rtl="1" eaLnBrk="1" fontAlgn="auto" latinLnBrk="0" hangingPunct="1">
+              <a:lnSpc>
+                <a:spcPct val="100000"/>
+              </a:lnSpc>
+              <a:spcBef>
+                <a:spcPts val="0"/>
+              </a:spcBef>
+              <a:spcAft>
+                <a:spcPts val="0"/>
+              </a:spcAft>
+              <a:buClrTx/>
+              <a:buSzTx/>
+              <a:buFontTx/>
+              <a:buNone/>
+              <a:tabLst/>
+              <a:defRPr/>
+            </a:pPr>
+            <a:r>
+              <a:rPr lang="he-IL" dirty="0"/>
+              <a:t>השכבה השלישית היא סביבת הביצוע (</a:t>
+            </a:r>
+            <a:r>
+              <a:rPr lang="he-IL" sz="1200" dirty="0"/>
+              <a:t>ביצוע פעולות)</a:t>
+            </a:r>
+          </a:p>
+          <a:p>
+            <a:pPr marL="0" marR="0" lvl="0" indent="0" algn="r" defTabSz="914400" rtl="1" eaLnBrk="1" fontAlgn="auto" latinLnBrk="0" hangingPunct="1">
+              <a:lnSpc>
+                <a:spcPct val="100000"/>
+              </a:lnSpc>
+              <a:spcBef>
+                <a:spcPts val="0"/>
+              </a:spcBef>
+              <a:spcAft>
+                <a:spcPts val="0"/>
+              </a:spcAft>
+              <a:buClrTx/>
+              <a:buSzTx/>
+              <a:buFontTx/>
+              <a:buNone/>
+              <a:tabLst/>
+              <a:defRPr/>
+            </a:pPr>
+            <a:endParaRPr lang="he-IL" dirty="0"/>
+          </a:p>
+          <a:p>
+            <a:pPr marL="0" marR="0" lvl="0" indent="0" algn="r" defTabSz="914400" rtl="1" eaLnBrk="1" fontAlgn="auto" latinLnBrk="0" hangingPunct="1">
+              <a:lnSpc>
+                <a:spcPct val="100000"/>
+              </a:lnSpc>
+              <a:spcBef>
+                <a:spcPts val="0"/>
+              </a:spcBef>
+              <a:spcAft>
+                <a:spcPts val="0"/>
+              </a:spcAft>
+              <a:buClrTx/>
+              <a:buSzTx/>
+              <a:buFontTx/>
+              <a:buNone/>
+              <a:tabLst/>
+              <a:defRPr/>
+            </a:pPr>
+            <a:r>
+              <a:rPr lang="he-IL" dirty="0"/>
+              <a:t>בעקבות כמות שרתים גודלה – </a:t>
+            </a:r>
+            <a:r>
+              <a:rPr lang="en-US" dirty="0"/>
+              <a:t>cloud</a:t>
+            </a:r>
+            <a:r>
+              <a:rPr lang="he-IL" dirty="0"/>
+              <a:t> מותאם בביצוע חישובים פשוטים ומבוזרים על שרתים</a:t>
+            </a:r>
+          </a:p>
+          <a:p>
+            <a:pPr marL="0" marR="0" lvl="0" indent="0" algn="r" defTabSz="914400" rtl="1" eaLnBrk="1" fontAlgn="auto" latinLnBrk="0" hangingPunct="1">
+              <a:lnSpc>
+                <a:spcPct val="100000"/>
+              </a:lnSpc>
+              <a:spcBef>
+                <a:spcPts val="0"/>
+              </a:spcBef>
+              <a:spcAft>
+                <a:spcPts val="0"/>
+              </a:spcAft>
+              <a:buClrTx/>
+              <a:buSzTx/>
+              <a:buFontTx/>
+              <a:buNone/>
+              <a:tabLst/>
+              <a:defRPr/>
+            </a:pPr>
+            <a:r>
+              <a:rPr lang="he-IL" dirty="0"/>
+              <a:t>הנחות של </a:t>
+            </a:r>
+            <a:r>
+              <a:rPr lang="en-US" dirty="0"/>
+              <a:t>MapReduce</a:t>
+            </a:r>
+            <a:endParaRPr lang="he-IL" dirty="0"/>
+          </a:p>
+          <a:p>
+            <a:pPr marL="171450" marR="0" lvl="0" indent="-171450" algn="r" defTabSz="914400" rtl="1" eaLnBrk="1" fontAlgn="auto" latinLnBrk="0" hangingPunct="1">
+              <a:lnSpc>
+                <a:spcPct val="100000"/>
+              </a:lnSpc>
+              <a:spcBef>
+                <a:spcPts val="0"/>
+              </a:spcBef>
+              <a:spcAft>
+                <a:spcPts val="0"/>
+              </a:spcAft>
+              <a:buClrTx/>
+              <a:buSzTx/>
+              <a:buFont typeface="Arial" panose="020B0604020202020204" pitchFamily="34" charset="0"/>
+              <a:buChar char="•"/>
+              <a:tabLst/>
+              <a:defRPr/>
+            </a:pPr>
+            <a:r>
+              <a:rPr lang="he-IL" dirty="0"/>
+              <a:t>כלל השרתים באותו מקום פיזי או שיש רוחב פס גבוה בין השרתים</a:t>
+            </a:r>
+          </a:p>
+          <a:p>
+            <a:pPr marL="171450" marR="0" lvl="0" indent="-171450" algn="r" defTabSz="914400" rtl="1" eaLnBrk="1" fontAlgn="auto" latinLnBrk="0" hangingPunct="1">
+              <a:lnSpc>
+                <a:spcPct val="100000"/>
+              </a:lnSpc>
+              <a:spcBef>
+                <a:spcPts val="0"/>
+              </a:spcBef>
+              <a:spcAft>
+                <a:spcPts val="0"/>
+              </a:spcAft>
+              <a:buClrTx/>
+              <a:buSzTx/>
+              <a:buFont typeface="Arial" panose="020B0604020202020204" pitchFamily="34" charset="0"/>
+              <a:buChar char="•"/>
+              <a:tabLst/>
+              <a:defRPr/>
+            </a:pPr>
+            <a:r>
+              <a:rPr lang="he-IL" dirty="0"/>
+              <a:t>הקלט והפלט קטנים יחסית על שהפעולות מבוצעות על כמות גדלה של מידע</a:t>
+            </a:r>
+          </a:p>
+          <a:p>
+            <a:pPr marL="0" marR="0" lvl="0" indent="0" algn="r" defTabSz="914400" rtl="1" eaLnBrk="1" fontAlgn="auto" latinLnBrk="0" hangingPunct="1">
+              <a:lnSpc>
+                <a:spcPct val="100000"/>
+              </a:lnSpc>
+              <a:spcBef>
+                <a:spcPts val="0"/>
+              </a:spcBef>
+              <a:spcAft>
+                <a:spcPts val="0"/>
+              </a:spcAft>
+              <a:buClrTx/>
+              <a:buSzTx/>
+              <a:buFontTx/>
+              <a:buNone/>
+              <a:tabLst/>
+              <a:defRPr/>
+            </a:pPr>
+            <a:endParaRPr lang="he-IL" sz="1200" dirty="0"/>
+          </a:p>
+          <a:p>
+            <a:pPr marL="0" marR="0" lvl="0" indent="0" algn="r" defTabSz="914400" rtl="1" eaLnBrk="1" fontAlgn="auto" latinLnBrk="0" hangingPunct="1">
+              <a:lnSpc>
+                <a:spcPct val="100000"/>
+              </a:lnSpc>
+              <a:spcBef>
+                <a:spcPts val="0"/>
+              </a:spcBef>
+              <a:spcAft>
+                <a:spcPts val="0"/>
+              </a:spcAft>
+              <a:buClrTx/>
+              <a:buSzTx/>
+              <a:buFontTx/>
+              <a:buNone/>
+              <a:tabLst/>
+              <a:defRPr/>
+            </a:pPr>
+            <a:r>
+              <a:rPr lang="he-IL" sz="1200" dirty="0"/>
+              <a:t>המשתמש מגדיר איזו פעולה הוא עושה על כל שורה (</a:t>
+            </a:r>
+            <a:r>
+              <a:rPr lang="en-US" sz="1200" dirty="0"/>
+              <a:t>Map</a:t>
+            </a:r>
+            <a:r>
+              <a:rPr lang="he-IL" sz="1200" dirty="0"/>
+              <a:t>) ואז איך עושים </a:t>
+            </a:r>
+            <a:r>
+              <a:rPr lang="he-IL" sz="1200" dirty="0" err="1"/>
+              <a:t>אגרגציה</a:t>
+            </a:r>
+            <a:r>
+              <a:rPr lang="he-IL" sz="1200" dirty="0"/>
+              <a:t> (צוברים) בין התוצאות [הפעולה חייבת להיות </a:t>
+            </a:r>
+            <a:r>
+              <a:rPr lang="he-IL" sz="1200" dirty="0" err="1"/>
+              <a:t>אסוסיציבית</a:t>
+            </a:r>
+            <a:r>
+              <a:rPr lang="he-IL" sz="1200" dirty="0"/>
+              <a:t> </a:t>
+            </a:r>
+            <a:r>
+              <a:rPr lang="he-IL" sz="1200" dirty="0" err="1"/>
+              <a:t>וכומטטיבית</a:t>
+            </a:r>
+            <a:r>
+              <a:rPr lang="he-IL" sz="1200" dirty="0"/>
+              <a:t>] (</a:t>
+            </a:r>
+            <a:r>
+              <a:rPr lang="en-US" sz="1200" dirty="0"/>
+              <a:t>Reduce</a:t>
+            </a:r>
+            <a:r>
+              <a:rPr lang="he-IL" sz="1200" dirty="0"/>
+              <a:t>)</a:t>
+            </a:r>
+          </a:p>
+          <a:p>
+            <a:pPr marL="0" marR="0" lvl="0" indent="0" algn="r" defTabSz="914400" rtl="1" eaLnBrk="1" fontAlgn="auto" latinLnBrk="0" hangingPunct="1">
+              <a:lnSpc>
+                <a:spcPct val="100000"/>
+              </a:lnSpc>
+              <a:spcBef>
+                <a:spcPts val="0"/>
+              </a:spcBef>
+              <a:spcAft>
+                <a:spcPts val="0"/>
+              </a:spcAft>
+              <a:buClrTx/>
+              <a:buSzTx/>
+              <a:buFontTx/>
+              <a:buNone/>
+              <a:tabLst/>
+              <a:defRPr/>
+            </a:pPr>
+            <a:endParaRPr lang="he-IL" sz="1200" dirty="0"/>
+          </a:p>
+        </p:txBody>
+      </p:sp>
+      <p:sp>
+        <p:nvSpPr>
+          <p:cNvPr id="4" name="Slide Number Placeholder 3"/>
+          <p:cNvSpPr>
+            <a:spLocks noGrp="1"/>
+          </p:cNvSpPr>
+          <p:nvPr>
+            <p:ph type="sldNum" sz="quarter" idx="5"/>
+          </p:nvPr>
+        </p:nvSpPr>
+        <p:spPr/>
+        <p:txBody>
+          <a:bodyPr/>
+          <a:lstStyle/>
+          <a:p>
+            <a:fld id="{0616DE14-49C1-44D0-9947-5BBF1684B2E1}" type="slidenum">
+              <a:rPr lang="en-US" smtClean="0"/>
+              <a:t>8</a:t>
+            </a:fld>
+            <a:endParaRPr lang="en-US"/>
+          </a:p>
+        </p:txBody>
+      </p:sp>
+    </p:spTree>
+    <p:extLst>
+      <p:ext uri="{BB962C8B-B14F-4D97-AF65-F5344CB8AC3E}">
+        <p14:creationId xmlns:p14="http://schemas.microsoft.com/office/powerpoint/2010/main" val="139368597"/>
+      </p:ext>
+    </p:extLst>
+  </p:cSld>
+  <p:clrMapOvr>
+    <a:masterClrMapping/>
+  </p:clrMapOvr>
+</p:notes>
+</file>
+
+<file path=ppt/notesSlides/notesSlide7.xml><?xml version="1.0" encoding="utf-8"?>
+<p:notes xmlns:a="http://schemas.openxmlformats.org/drawingml/2006/main" xmlns:r="http://schemas.openxmlformats.org/officeDocument/2006/relationships" xmlns:p="http://schemas.openxmlformats.org/presentationml/2006/main">
+  <p:cSld>
+    <p:spTree>
+      <p:nvGrpSpPr>
+        <p:cNvPr id="1" name=""/>
+        <p:cNvGrpSpPr/>
+        <p:nvPr/>
+      </p:nvGrpSpPr>
+      <p:grpSpPr>
+        <a:xfrm>
+          <a:off x="0" y="0"/>
+          <a:ext cx="0" cy="0"/>
+          <a:chOff x="0" y="0"/>
+          <a:chExt cx="0" cy="0"/>
+        </a:xfrm>
+      </p:grpSpPr>
+      <p:sp>
+        <p:nvSpPr>
+          <p:cNvPr id="2" name="Slide Image Placeholder 1"/>
+          <p:cNvSpPr>
+            <a:spLocks noGrp="1" noRot="1" noChangeAspect="1"/>
+          </p:cNvSpPr>
+          <p:nvPr>
+            <p:ph type="sldImg"/>
+          </p:nvPr>
+        </p:nvSpPr>
+        <p:spPr/>
+      </p:sp>
+      <p:sp>
+        <p:nvSpPr>
+          <p:cNvPr id="3" name="Notes Placeholder 2"/>
+          <p:cNvSpPr>
+            <a:spLocks noGrp="1"/>
+          </p:cNvSpPr>
+          <p:nvPr>
+            <p:ph type="body" idx="1"/>
+          </p:nvPr>
+        </p:nvSpPr>
+        <p:spPr/>
+        <p:txBody>
+          <a:bodyPr/>
+          <a:lstStyle/>
+          <a:p>
+            <a:pPr marL="0" marR="0" lvl="0" indent="0" algn="r" defTabSz="914400" rtl="1" eaLnBrk="1" fontAlgn="auto" latinLnBrk="0" hangingPunct="1">
+              <a:lnSpc>
+                <a:spcPct val="100000"/>
+              </a:lnSpc>
+              <a:spcBef>
+                <a:spcPts val="0"/>
+              </a:spcBef>
+              <a:spcAft>
+                <a:spcPts val="0"/>
+              </a:spcAft>
+              <a:buClrTx/>
+              <a:buSzTx/>
+              <a:buFontTx/>
+              <a:buNone/>
+              <a:tabLst/>
+              <a:defRPr/>
+            </a:pPr>
+            <a:r>
+              <a:rPr lang="he-IL" dirty="0"/>
+              <a:t>השכבה הרביעית היא על תשאול תוצרים (</a:t>
+            </a:r>
+            <a:r>
+              <a:rPr lang="he-IL" sz="1200" dirty="0"/>
+              <a:t>שליפת תוצאות)</a:t>
+            </a:r>
+          </a:p>
+          <a:p>
+            <a:pPr algn="r" rtl="1"/>
+            <a:endParaRPr lang="he-IL" sz="1200" dirty="0"/>
+          </a:p>
+          <a:p>
+            <a:pPr algn="r" rtl="1"/>
+            <a:r>
+              <a:rPr lang="he-IL" sz="1200" dirty="0"/>
+              <a:t>הממשק למשתמש אל מול שאר השכבות – שולח לביצוע ע"י </a:t>
+            </a:r>
+            <a:r>
+              <a:rPr lang="en-US" sz="1200" dirty="0"/>
+              <a:t>MR</a:t>
+            </a:r>
+            <a:r>
+              <a:rPr lang="he-IL" sz="1200" dirty="0"/>
+              <a:t> ושליפה מה</a:t>
+            </a:r>
+            <a:r>
+              <a:rPr lang="en-US" sz="1200" dirty="0"/>
+              <a:t>DB</a:t>
+            </a:r>
+            <a:r>
+              <a:rPr lang="he-IL" sz="1200" dirty="0"/>
+              <a:t> שמושך מה</a:t>
+            </a:r>
+            <a:r>
+              <a:rPr lang="en-US" sz="1200" dirty="0"/>
+              <a:t>FS</a:t>
+            </a:r>
+            <a:endParaRPr lang="he-IL" sz="1200" dirty="0"/>
+          </a:p>
+          <a:p>
+            <a:pPr algn="r" rtl="1"/>
+            <a:r>
+              <a:rPr lang="he-IL" sz="1200" dirty="0"/>
+              <a:t>הצגת התוצר הסופי לאחר ביצוע פעולות כמו </a:t>
+            </a:r>
+            <a:r>
+              <a:rPr lang="en-US" sz="1200" dirty="0"/>
+              <a:t>Join</a:t>
+            </a:r>
+            <a:r>
+              <a:rPr lang="he-IL" sz="1200" dirty="0"/>
+              <a:t> – לוגיקה להצגה של תשאולים מורכבים</a:t>
+            </a:r>
+          </a:p>
+          <a:p>
+            <a:pPr algn="r" rtl="1"/>
+            <a:r>
+              <a:rPr lang="he-IL" sz="1200" dirty="0"/>
+              <a:t>המטרה – לספק פתרון משולב של השפה "ההצהרתית" לבין הביצוע "הפרוצדורלי"</a:t>
+            </a:r>
+          </a:p>
+          <a:p>
+            <a:pPr marL="0" marR="0" lvl="0" indent="0" algn="r" defTabSz="914400" rtl="1" eaLnBrk="1" fontAlgn="auto" latinLnBrk="0" hangingPunct="1">
+              <a:lnSpc>
+                <a:spcPct val="100000"/>
+              </a:lnSpc>
+              <a:spcBef>
+                <a:spcPts val="0"/>
+              </a:spcBef>
+              <a:spcAft>
+                <a:spcPts val="0"/>
+              </a:spcAft>
+              <a:buClrTx/>
+              <a:buSzTx/>
+              <a:buFontTx/>
+              <a:buNone/>
+              <a:tabLst/>
+              <a:defRPr/>
+            </a:pPr>
+            <a:r>
+              <a:rPr lang="he-IL" sz="1200" dirty="0"/>
+              <a:t>דוגמאות:</a:t>
+            </a:r>
+          </a:p>
+          <a:p>
+            <a:pPr algn="r" rtl="1"/>
+            <a:r>
+              <a:rPr lang="en-US" sz="1200" dirty="0"/>
+              <a:t>Hive, Pig, JAQL, Dremel, Scope</a:t>
+            </a:r>
+          </a:p>
+          <a:p>
+            <a:pPr marL="0" marR="0" lvl="0" indent="0" algn="r" defTabSz="914400" rtl="1" eaLnBrk="1" fontAlgn="auto" latinLnBrk="0" hangingPunct="1">
+              <a:lnSpc>
+                <a:spcPct val="100000"/>
+              </a:lnSpc>
+              <a:spcBef>
+                <a:spcPts val="0"/>
+              </a:spcBef>
+              <a:spcAft>
+                <a:spcPts val="0"/>
+              </a:spcAft>
+              <a:buClrTx/>
+              <a:buSzTx/>
+              <a:buFontTx/>
+              <a:buNone/>
+              <a:tabLst/>
+              <a:defRPr/>
+            </a:pPr>
+            <a:endParaRPr lang="he-IL" sz="1200" dirty="0"/>
+          </a:p>
+        </p:txBody>
+      </p:sp>
+      <p:sp>
+        <p:nvSpPr>
+          <p:cNvPr id="4" name="Slide Number Placeholder 3"/>
+          <p:cNvSpPr>
+            <a:spLocks noGrp="1"/>
+          </p:cNvSpPr>
+          <p:nvPr>
+            <p:ph type="sldNum" sz="quarter" idx="5"/>
+          </p:nvPr>
+        </p:nvSpPr>
+        <p:spPr/>
+        <p:txBody>
+          <a:bodyPr/>
+          <a:lstStyle/>
+          <a:p>
+            <a:fld id="{0616DE14-49C1-44D0-9947-5BBF1684B2E1}" type="slidenum">
+              <a:rPr lang="en-US" smtClean="0"/>
+              <a:t>9</a:t>
+            </a:fld>
+            <a:endParaRPr lang="en-US"/>
+          </a:p>
+        </p:txBody>
+      </p:sp>
+    </p:spTree>
+    <p:extLst>
+      <p:ext uri="{BB962C8B-B14F-4D97-AF65-F5344CB8AC3E}">
+        <p14:creationId xmlns:p14="http://schemas.microsoft.com/office/powerpoint/2010/main" val="3631866300"/>
+      </p:ext>
+    </p:extLst>
+  </p:cSld>
+  <p:clrMapOvr>
+    <a:masterClrMapping/>
+  </p:clrMapOvr>
+</p:notes>
 </file>
 
 <file path=ppt/slideLayouts/slideLayout1.xml><?xml version="1.0" encoding="utf-8"?>
@@ -594,7 +2661,7 @@
           <a:p>
             <a:fld id="{EA0C0817-A112-4847-8014-A94B7D2A4EA3}" type="datetime1">
               <a:rPr lang="en-US" smtClean="0"/>
-              <a:t>24-Mar-20</a:t>
+              <a:t>31-Mar-20</a:t>
             </a:fld>
             <a:endParaRPr lang="en-US" dirty="0"/>
           </a:p>
@@ -796,7 +2863,7 @@
           <a:p>
             <a:fld id="{134F40B7-36AB-4376-BE14-EF7004D79BB9}" type="datetime1">
               <a:rPr lang="en-US" smtClean="0"/>
-              <a:t>24-Mar-20</a:t>
+              <a:t>31-Mar-20</a:t>
             </a:fld>
             <a:endParaRPr lang="en-US"/>
           </a:p>
@@ -976,7 +3043,7 @@
           <a:p>
             <a:fld id="{FF87CAB8-DCAE-46A5-AADA-B3FAD11A54E0}" type="datetime1">
               <a:rPr lang="en-US" smtClean="0"/>
-              <a:t>24-Mar-20</a:t>
+              <a:t>31-Mar-20</a:t>
             </a:fld>
             <a:endParaRPr lang="en-US"/>
           </a:p>
@@ -1146,7 +3213,7 @@
           <a:p>
             <a:fld id="{7332B432-ACDA-4023-A761-2BAB76577B62}" type="datetime1">
               <a:rPr lang="en-US" smtClean="0"/>
-              <a:t>24-Mar-20</a:t>
+              <a:t>31-Mar-20</a:t>
             </a:fld>
             <a:endParaRPr lang="en-US"/>
           </a:p>
@@ -1745,7 +3812,7 @@
           <a:p>
             <a:fld id="{D9C646AA-F36E-4540-911D-FFFC0A0EF24A}" type="datetime1">
               <a:rPr lang="en-US" smtClean="0"/>
-              <a:t>24-Mar-20</a:t>
+              <a:t>31-Mar-20</a:t>
             </a:fld>
             <a:endParaRPr lang="en-US" dirty="0"/>
           </a:p>
@@ -2065,7 +4132,7 @@
           <a:p>
             <a:fld id="{69186D26-FA5F-4637-B602-B7C2DC34CFD4}" type="datetime1">
               <a:rPr lang="en-US" smtClean="0"/>
-              <a:t>24-Mar-20</a:t>
+              <a:t>31-Mar-20</a:t>
             </a:fld>
             <a:endParaRPr lang="en-US"/>
           </a:p>
@@ -2500,7 +4567,7 @@
           <a:p>
             <a:fld id="{8A7F15D8-96D1-4781-BC50-CA8A088B2FE4}" type="datetime1">
               <a:rPr lang="en-US" smtClean="0"/>
-              <a:t>24-Mar-20</a:t>
+              <a:t>31-Mar-20</a:t>
             </a:fld>
             <a:endParaRPr lang="en-US"/>
           </a:p>
@@ -2618,7 +4685,7 @@
           <a:p>
             <a:fld id="{F9A96C99-B8F8-4528-BD05-0E16E943DC09}" type="datetime1">
               <a:rPr lang="en-US" smtClean="0"/>
-              <a:t>24-Mar-20</a:t>
+              <a:t>31-Mar-20</a:t>
             </a:fld>
             <a:endParaRPr lang="en-US"/>
           </a:p>
@@ -2713,7 +4780,7 @@
           <a:p>
             <a:fld id="{03636942-C211-4B28-8DBD-C953E00AF71B}" type="datetime1">
               <a:rPr lang="en-US" smtClean="0"/>
-              <a:t>24-Mar-20</a:t>
+              <a:t>31-Mar-20</a:t>
             </a:fld>
             <a:endParaRPr lang="en-US"/>
           </a:p>
@@ -3130,7 +5197,7 @@
           <a:p>
             <a:fld id="{7E8D12A6-918A-48BD-8CB9-CA713993B0EA}" type="datetime1">
               <a:rPr lang="en-US" smtClean="0"/>
-              <a:t>24-Mar-20</a:t>
+              <a:t>31-Mar-20</a:t>
             </a:fld>
             <a:endParaRPr lang="en-US"/>
           </a:p>
@@ -3392,7 +5459,7 @@
             <a:fld id="{E778CE86-875F-4587-BCF6-FA054AFC0D53}" type="datetime1">
               <a:rPr lang="en-US" smtClean="0"/>
               <a:pPr/>
-              <a:t>24-Mar-20</a:t>
+              <a:t>31-Mar-20</a:t>
             </a:fld>
             <a:endParaRPr lang="en-US" dirty="0"/>
           </a:p>
@@ -3908,7 +5975,7 @@
           <a:p>
             <a:fld id="{F6FA2B21-3FCD-4721-B95C-427943F61125}" type="datetime1">
               <a:rPr lang="en-US" smtClean="0"/>
-              <a:t>24-Mar-20</a:t>
+              <a:t>31-Mar-20</a:t>
             </a:fld>
             <a:endParaRPr lang="en-US"/>
           </a:p>
@@ -4700,7 +6767,7 @@
           <p:cNvPr id="2" name="Title 1">
             <a:extLst>
               <a:ext uri="{FF2B5EF4-FFF2-40B4-BE49-F238E27FC236}">
-                <a16:creationId xmlns:a16="http://schemas.microsoft.com/office/drawing/2014/main" id="{7ED0BD8B-7A13-4483-9D8D-3EC299620185}"/>
+                <a16:creationId xmlns:a16="http://schemas.microsoft.com/office/drawing/2014/main" id="{0FC1436D-5EEE-4E9D-AC23-E5A4DACB4155}"/>
               </a:ext>
             </a:extLst>
           </p:cNvPr>
@@ -4718,18 +6785,9 @@
           <a:p>
             <a:pPr algn="r" rtl="1"/>
             <a:r>
-              <a:rPr lang="he-IL" dirty="0"/>
-              <a:t>השוואת </a:t>
-            </a:r>
-            <a:r>
               <a:rPr lang="en-US" dirty="0"/>
-              <a:t>MapReduce</a:t>
-            </a:r>
-            <a:r>
-              <a:rPr lang="he-IL" dirty="0"/>
-              <a:t> לפתרון המסורתי</a:t>
-            </a:r>
-            <a:endParaRPr lang="en-US" dirty="0"/>
+              <a:t>MapReduce Framework</a:t>
+            </a:r>
           </a:p>
         </p:txBody>
       </p:sp>
@@ -4738,7 +6796,7 @@
           <p:cNvPr id="3" name="Content Placeholder 2">
             <a:extLst>
               <a:ext uri="{FF2B5EF4-FFF2-40B4-BE49-F238E27FC236}">
-                <a16:creationId xmlns:a16="http://schemas.microsoft.com/office/drawing/2014/main" id="{341368C8-0859-4F9D-94D7-EDA2D9708B4A}"/>
+                <a16:creationId xmlns:a16="http://schemas.microsoft.com/office/drawing/2014/main" id="{7A536F9D-DF6A-4B33-9937-7CF7F0B107AC}"/>
               </a:ext>
             </a:extLst>
           </p:cNvPr>
@@ -4762,7 +6820,7 @@
     </p:spTree>
     <p:extLst>
       <p:ext uri="{BB962C8B-B14F-4D97-AF65-F5344CB8AC3E}">
-        <p14:creationId xmlns:p14="http://schemas.microsoft.com/office/powerpoint/2010/main" val="266854115"/>
+        <p14:creationId xmlns:p14="http://schemas.microsoft.com/office/powerpoint/2010/main" val="2559828672"/>
       </p:ext>
     </p:extLst>
   </p:cSld>
@@ -4794,7 +6852,7 @@
           <p:cNvPr id="2" name="Title 1">
             <a:extLst>
               <a:ext uri="{FF2B5EF4-FFF2-40B4-BE49-F238E27FC236}">
-                <a16:creationId xmlns:a16="http://schemas.microsoft.com/office/drawing/2014/main" id="{9D852F06-E5D1-49C9-AC73-093F0DD0E902}"/>
+                <a16:creationId xmlns:a16="http://schemas.microsoft.com/office/drawing/2014/main" id="{7ED0BD8B-7A13-4483-9D8D-3EC299620185}"/>
               </a:ext>
             </a:extLst>
           </p:cNvPr>
@@ -4813,7 +6871,15 @@
             <a:pPr algn="r" rtl="1"/>
             <a:r>
               <a:rPr lang="he-IL" dirty="0"/>
-              <a:t>אלגוריתמי עיבוד מידע</a:t>
+              <a:t>השוואת </a:t>
+            </a:r>
+            <a:r>
+              <a:rPr lang="en-US" dirty="0"/>
+              <a:t>MapReduce</a:t>
+            </a:r>
+            <a:r>
+              <a:rPr lang="he-IL" dirty="0"/>
+              <a:t> לפתרון המסורתי</a:t>
             </a:r>
             <a:endParaRPr lang="en-US" dirty="0"/>
           </a:p>
@@ -4824,7 +6890,7 @@
           <p:cNvPr id="3" name="Content Placeholder 2">
             <a:extLst>
               <a:ext uri="{FF2B5EF4-FFF2-40B4-BE49-F238E27FC236}">
-                <a16:creationId xmlns:a16="http://schemas.microsoft.com/office/drawing/2014/main" id="{55BCA4D8-5F71-4753-AFDF-A7010038D0B2}"/>
+                <a16:creationId xmlns:a16="http://schemas.microsoft.com/office/drawing/2014/main" id="{341368C8-0859-4F9D-94D7-EDA2D9708B4A}"/>
               </a:ext>
             </a:extLst>
           </p:cNvPr>
@@ -4841,22 +6907,14 @@
           <a:lstStyle/>
           <a:p>
             <a:pPr algn="r" rtl="1"/>
-            <a:r>
-              <a:rPr lang="he-IL" dirty="0"/>
-              <a:t>רשימה של </a:t>
-            </a:r>
-            <a:r>
-              <a:rPr lang="he-IL"/>
-              <a:t>אלגו</a:t>
-            </a:r>
-            <a:endParaRPr lang="en-US" dirty="0"/>
+            <a:endParaRPr lang="en-US"/>
           </a:p>
         </p:txBody>
       </p:sp>
     </p:spTree>
     <p:extLst>
       <p:ext uri="{BB962C8B-B14F-4D97-AF65-F5344CB8AC3E}">
-        <p14:creationId xmlns:p14="http://schemas.microsoft.com/office/powerpoint/2010/main" val="2424539847"/>
+        <p14:creationId xmlns:p14="http://schemas.microsoft.com/office/powerpoint/2010/main" val="266854115"/>
       </p:ext>
     </p:extLst>
   </p:cSld>
@@ -4888,7 +6946,7 @@
           <p:cNvPr id="2" name="Title 1">
             <a:extLst>
               <a:ext uri="{FF2B5EF4-FFF2-40B4-BE49-F238E27FC236}">
-                <a16:creationId xmlns:a16="http://schemas.microsoft.com/office/drawing/2014/main" id="{F2D89B13-CA60-4753-9837-C0F7A18B15BA}"/>
+                <a16:creationId xmlns:a16="http://schemas.microsoft.com/office/drawing/2014/main" id="{9D852F06-E5D1-49C9-AC73-093F0DD0E902}"/>
               </a:ext>
             </a:extLst>
           </p:cNvPr>
@@ -4907,12 +6965,9 @@
             <a:pPr algn="r" rtl="1"/>
             <a:r>
               <a:rPr lang="he-IL" dirty="0"/>
-              <a:t>חסרונות </a:t>
-            </a:r>
-            <a:r>
-              <a:rPr lang="en-US" dirty="0"/>
-              <a:t>MapReduce</a:t>
-            </a:r>
+              <a:t>אלגוריתמי עיבוד מידע</a:t>
+            </a:r>
+            <a:endParaRPr lang="en-US" dirty="0"/>
           </a:p>
         </p:txBody>
       </p:sp>
@@ -4921,7 +6976,7 @@
           <p:cNvPr id="3" name="Content Placeholder 2">
             <a:extLst>
               <a:ext uri="{FF2B5EF4-FFF2-40B4-BE49-F238E27FC236}">
-                <a16:creationId xmlns:a16="http://schemas.microsoft.com/office/drawing/2014/main" id="{F2288D52-F988-444C-9DBE-6FA6B7EBF044}"/>
+                <a16:creationId xmlns:a16="http://schemas.microsoft.com/office/drawing/2014/main" id="{55BCA4D8-5F71-4753-AFDF-A7010038D0B2}"/>
               </a:ext>
             </a:extLst>
           </p:cNvPr>
@@ -4938,14 +6993,22 @@
           <a:lstStyle/>
           <a:p>
             <a:pPr algn="r" rtl="1"/>
-            <a:endParaRPr lang="en-US"/>
+            <a:r>
+              <a:rPr lang="he-IL" dirty="0"/>
+              <a:t>רשימה של </a:t>
+            </a:r>
+            <a:r>
+              <a:rPr lang="he-IL"/>
+              <a:t>אלגו</a:t>
+            </a:r>
+            <a:endParaRPr lang="en-US" dirty="0"/>
           </a:p>
         </p:txBody>
       </p:sp>
     </p:spTree>
     <p:extLst>
       <p:ext uri="{BB962C8B-B14F-4D97-AF65-F5344CB8AC3E}">
-        <p14:creationId xmlns:p14="http://schemas.microsoft.com/office/powerpoint/2010/main" val="3930027582"/>
+        <p14:creationId xmlns:p14="http://schemas.microsoft.com/office/powerpoint/2010/main" val="2424539847"/>
       </p:ext>
     </p:extLst>
   </p:cSld>
@@ -4977,6 +7040,95 @@
           <p:cNvPr id="2" name="Title 1">
             <a:extLst>
               <a:ext uri="{FF2B5EF4-FFF2-40B4-BE49-F238E27FC236}">
+                <a16:creationId xmlns:a16="http://schemas.microsoft.com/office/drawing/2014/main" id="{F2D89B13-CA60-4753-9837-C0F7A18B15BA}"/>
+              </a:ext>
+            </a:extLst>
+          </p:cNvPr>
+          <p:cNvSpPr>
+            <a:spLocks noGrp="1"/>
+          </p:cNvSpPr>
+          <p:nvPr>
+            <p:ph type="title"/>
+          </p:nvPr>
+        </p:nvSpPr>
+        <p:spPr/>
+        <p:txBody>
+          <a:bodyPr/>
+          <a:lstStyle/>
+          <a:p>
+            <a:pPr algn="r" rtl="1"/>
+            <a:r>
+              <a:rPr lang="he-IL" dirty="0"/>
+              <a:t>חסרונות </a:t>
+            </a:r>
+            <a:r>
+              <a:rPr lang="en-US" dirty="0"/>
+              <a:t>MapReduce</a:t>
+            </a:r>
+          </a:p>
+        </p:txBody>
+      </p:sp>
+      <p:sp>
+        <p:nvSpPr>
+          <p:cNvPr id="3" name="Content Placeholder 2">
+            <a:extLst>
+              <a:ext uri="{FF2B5EF4-FFF2-40B4-BE49-F238E27FC236}">
+                <a16:creationId xmlns:a16="http://schemas.microsoft.com/office/drawing/2014/main" id="{F2288D52-F988-444C-9DBE-6FA6B7EBF044}"/>
+              </a:ext>
+            </a:extLst>
+          </p:cNvPr>
+          <p:cNvSpPr>
+            <a:spLocks noGrp="1"/>
+          </p:cNvSpPr>
+          <p:nvPr>
+            <p:ph idx="1"/>
+          </p:nvPr>
+        </p:nvSpPr>
+        <p:spPr/>
+        <p:txBody>
+          <a:bodyPr/>
+          <a:lstStyle/>
+          <a:p>
+            <a:pPr algn="r" rtl="1"/>
+            <a:endParaRPr lang="en-US"/>
+          </a:p>
+        </p:txBody>
+      </p:sp>
+    </p:spTree>
+    <p:extLst>
+      <p:ext uri="{BB962C8B-B14F-4D97-AF65-F5344CB8AC3E}">
+        <p14:creationId xmlns:p14="http://schemas.microsoft.com/office/powerpoint/2010/main" val="3930027582"/>
+      </p:ext>
+    </p:extLst>
+  </p:cSld>
+  <p:clrMapOvr>
+    <a:masterClrMapping/>
+  </p:clrMapOvr>
+</p:sld>
+</file>
+
+<file path=ppt/slides/slide14.xml><?xml version="1.0" encoding="utf-8"?>
+<p:sld xmlns:a="http://schemas.openxmlformats.org/drawingml/2006/main" xmlns:r="http://schemas.openxmlformats.org/officeDocument/2006/relationships" xmlns:p="http://schemas.openxmlformats.org/presentationml/2006/main">
+  <p:cSld>
+    <p:spTree>
+      <p:nvGrpSpPr>
+        <p:cNvPr id="1" name=""/>
+        <p:cNvGrpSpPr/>
+        <p:nvPr/>
+      </p:nvGrpSpPr>
+      <p:grpSpPr>
+        <a:xfrm>
+          <a:off x="0" y="0"/>
+          <a:ext cx="0" cy="0"/>
+          <a:chOff x="0" y="0"/>
+          <a:chExt cx="0" cy="0"/>
+        </a:xfrm>
+      </p:grpSpPr>
+      <p:sp>
+        <p:nvSpPr>
+          <p:cNvPr id="2" name="Title 1">
+            <a:extLst>
+              <a:ext uri="{FF2B5EF4-FFF2-40B4-BE49-F238E27FC236}">
                 <a16:creationId xmlns:a16="http://schemas.microsoft.com/office/drawing/2014/main" id="{BA254402-E2B2-47BA-BCFA-C88AEFB52FD7}"/>
               </a:ext>
             </a:extLst>
@@ -5040,7 +7192,7 @@
 </p:sld>
 </file>
 
-<file path=ppt/slides/slide14.xml><?xml version="1.0" encoding="utf-8"?>
+<file path=ppt/slides/slide15.xml><?xml version="1.0" encoding="utf-8"?>
 <p:sld xmlns:a="http://schemas.openxmlformats.org/drawingml/2006/main" xmlns:r="http://schemas.openxmlformats.org/officeDocument/2006/relationships" xmlns:p="http://schemas.openxmlformats.org/presentationml/2006/main">
   <p:cSld>
     <p:spTree>
@@ -5337,11 +7489,142 @@
         </p:nvSpPr>
         <p:spPr/>
         <p:txBody>
-          <a:bodyPr/>
+          <a:bodyPr>
+            <a:normAutofit/>
+          </a:bodyPr>
           <a:lstStyle/>
           <a:p>
             <a:pPr algn="r" rtl="1"/>
-            <a:endParaRPr lang="en-US" dirty="0"/>
+            <a:r>
+              <a:rPr lang="he-IL" sz="2000" dirty="0"/>
+              <a:t>המושג הופיע בשנים האחרונות – ארגונים החלו להתעסק במידע בסדרי גודל של </a:t>
+            </a:r>
+            <a:r>
+              <a:rPr lang="en-US" sz="2000" dirty="0"/>
+              <a:t>Petabytes</a:t>
+            </a:r>
+            <a:endParaRPr lang="he-IL" sz="2000" dirty="0"/>
+          </a:p>
+          <a:p>
+            <a:pPr algn="r" rtl="1"/>
+            <a:r>
+              <a:rPr lang="he-IL" sz="2000" dirty="0"/>
+              <a:t>הגדרה קלאסית של ארבע </a:t>
+            </a:r>
+            <a:r>
+              <a:rPr lang="en-US" sz="2000" dirty="0"/>
+              <a:t>V</a:t>
+            </a:r>
+            <a:r>
+              <a:rPr lang="he-IL" sz="2000" dirty="0"/>
+              <a:t> (</a:t>
+            </a:r>
+            <a:r>
+              <a:rPr lang="en-US" sz="2000" dirty="0"/>
+              <a:t>“The four V’s”</a:t>
+            </a:r>
+            <a:r>
+              <a:rPr lang="he-IL" sz="2000" dirty="0"/>
+              <a:t>)</a:t>
+            </a:r>
+          </a:p>
+          <a:p>
+            <a:pPr lvl="1" algn="r" rtl="1"/>
+            <a:r>
+              <a:rPr lang="en-US" sz="1800" dirty="0">
+                <a:latin typeface="Consolas" panose="020B0609020204030204" pitchFamily="49" charset="0"/>
+              </a:rPr>
+              <a:t>Volume</a:t>
+            </a:r>
+            <a:r>
+              <a:rPr lang="he-IL" sz="1800" dirty="0">
+                <a:latin typeface="Consolas" panose="020B0609020204030204" pitchFamily="49" charset="0"/>
+              </a:rPr>
+              <a:t>       </a:t>
+            </a:r>
+            <a:r>
+              <a:rPr lang="he-IL" sz="1800" dirty="0"/>
+              <a:t>– כמות</a:t>
+            </a:r>
+          </a:p>
+          <a:p>
+            <a:pPr lvl="1" algn="r" rtl="1"/>
+            <a:r>
+              <a:rPr lang="en-US" sz="1800" dirty="0">
+                <a:latin typeface="Consolas" panose="020B0609020204030204" pitchFamily="49" charset="0"/>
+              </a:rPr>
+              <a:t>Variety</a:t>
+            </a:r>
+            <a:r>
+              <a:rPr lang="he-IL" sz="1800" dirty="0">
+                <a:latin typeface="Consolas" panose="020B0609020204030204" pitchFamily="49" charset="0"/>
+              </a:rPr>
+              <a:t>     </a:t>
+            </a:r>
+            <a:r>
+              <a:rPr lang="he-IL" sz="1800" dirty="0"/>
+              <a:t>– גיוון</a:t>
+            </a:r>
+          </a:p>
+          <a:p>
+            <a:pPr lvl="1" algn="r" rtl="1"/>
+            <a:r>
+              <a:rPr lang="en-US" sz="1800" dirty="0">
+                <a:latin typeface="Consolas" panose="020B0609020204030204" pitchFamily="49" charset="0"/>
+              </a:rPr>
+              <a:t>Velocity</a:t>
+            </a:r>
+            <a:r>
+              <a:rPr lang="he-IL" sz="1800" dirty="0">
+                <a:latin typeface="Consolas" panose="020B0609020204030204" pitchFamily="49" charset="0"/>
+              </a:rPr>
+              <a:t>   </a:t>
+            </a:r>
+            <a:r>
+              <a:rPr lang="he-IL" sz="1800" dirty="0"/>
+              <a:t>– מהירות חישוב</a:t>
+            </a:r>
+          </a:p>
+          <a:p>
+            <a:pPr lvl="1" algn="r" rtl="1"/>
+            <a:r>
+              <a:rPr lang="en-US" sz="1800" dirty="0">
+                <a:latin typeface="Consolas" panose="020B0609020204030204" pitchFamily="49" charset="0"/>
+              </a:rPr>
+              <a:t>Veracity</a:t>
+            </a:r>
+            <a:r>
+              <a:rPr lang="he-IL" sz="1800" dirty="0">
+                <a:latin typeface="Consolas" panose="020B0609020204030204" pitchFamily="49" charset="0"/>
+              </a:rPr>
+              <a:t>   </a:t>
+            </a:r>
+            <a:r>
+              <a:rPr lang="he-IL" sz="1800" dirty="0"/>
+              <a:t>– אמינות ודיוק</a:t>
+            </a:r>
+          </a:p>
+          <a:p>
+            <a:pPr algn="r" rtl="1"/>
+            <a:r>
+              <a:rPr lang="he-IL" sz="2000" dirty="0"/>
+              <a:t>אתגרים בעולם</a:t>
+            </a:r>
+          </a:p>
+          <a:p>
+            <a:pPr lvl="1" algn="r" rtl="1"/>
+            <a:r>
+              <a:rPr lang="he-IL" sz="1800" dirty="0"/>
+              <a:t>אחסון וניהול המידע</a:t>
+            </a:r>
+          </a:p>
+          <a:p>
+            <a:pPr lvl="1" algn="r" rtl="1"/>
+            <a:r>
+              <a:rPr lang="he-IL" sz="1800" dirty="0"/>
+              <a:t>ביצוע חיפושים יעילים</a:t>
+            </a:r>
+            <a:endParaRPr lang="en-US" sz="1800" dirty="0"/>
           </a:p>
         </p:txBody>
       </p:sp>
@@ -5380,6 +7663,141 @@
           <p:cNvPr id="2" name="Title 1">
             <a:extLst>
               <a:ext uri="{FF2B5EF4-FFF2-40B4-BE49-F238E27FC236}">
+                <a16:creationId xmlns:a16="http://schemas.microsoft.com/office/drawing/2014/main" id="{D818D1DB-68EC-47CA-8ADC-095DEBBCA6CB}"/>
+              </a:ext>
+            </a:extLst>
+          </p:cNvPr>
+          <p:cNvSpPr>
+            <a:spLocks noGrp="1"/>
+          </p:cNvSpPr>
+          <p:nvPr>
+            <p:ph type="title"/>
+          </p:nvPr>
+        </p:nvSpPr>
+        <p:spPr/>
+        <p:txBody>
+          <a:bodyPr/>
+          <a:lstStyle/>
+          <a:p>
+            <a:pPr algn="r" rtl="1"/>
+            <a:r>
+              <a:rPr lang="he-IL" dirty="0"/>
+              <a:t>מידע בעולם העסקי</a:t>
+            </a:r>
+            <a:endParaRPr lang="en-US" dirty="0"/>
+          </a:p>
+        </p:txBody>
+      </p:sp>
+      <p:sp>
+        <p:nvSpPr>
+          <p:cNvPr id="3" name="Content Placeholder 2">
+            <a:extLst>
+              <a:ext uri="{FF2B5EF4-FFF2-40B4-BE49-F238E27FC236}">
+                <a16:creationId xmlns:a16="http://schemas.microsoft.com/office/drawing/2014/main" id="{C3FA2253-7A70-4E86-A8E8-305787C02827}"/>
+              </a:ext>
+            </a:extLst>
+          </p:cNvPr>
+          <p:cNvSpPr>
+            <a:spLocks noGrp="1"/>
+          </p:cNvSpPr>
+          <p:nvPr>
+            <p:ph idx="1"/>
+          </p:nvPr>
+        </p:nvSpPr>
+        <p:spPr/>
+        <p:txBody>
+          <a:bodyPr>
+            <a:normAutofit/>
+          </a:bodyPr>
+          <a:lstStyle/>
+          <a:p>
+            <a:pPr algn="r" rtl="1"/>
+            <a:r>
+              <a:rPr lang="he-IL" sz="2000" dirty="0"/>
+              <a:t>שימוש במידע לקבלת החלטות עסקיות</a:t>
+            </a:r>
+          </a:p>
+          <a:p>
+            <a:pPr algn="r" rtl="1"/>
+            <a:r>
+              <a:rPr lang="he-IL" sz="2000" dirty="0"/>
+              <a:t>קריטי בעידן האינטרנט</a:t>
+            </a:r>
+          </a:p>
+          <a:p>
+            <a:pPr algn="r" rtl="1"/>
+            <a:r>
+              <a:rPr lang="he-IL" sz="2000" dirty="0"/>
+              <a:t>כריית מידע - מאיפה הם מקבלים מידע</a:t>
+            </a:r>
+            <a:endParaRPr lang="en-US" sz="2000" dirty="0"/>
+          </a:p>
+          <a:p>
+            <a:pPr algn="r" rtl="1"/>
+            <a:r>
+              <a:rPr lang="he-IL" sz="2000" dirty="0"/>
+              <a:t>למי זה חשוב</a:t>
+            </a:r>
+          </a:p>
+          <a:p>
+            <a:pPr lvl="1" algn="r" rtl="1"/>
+            <a:r>
+              <a:rPr lang="he-IL" sz="1800" dirty="0"/>
+              <a:t>חנויות</a:t>
+            </a:r>
+          </a:p>
+          <a:p>
+            <a:pPr lvl="1" algn="r" rtl="1"/>
+            <a:r>
+              <a:rPr lang="he-IL" sz="1800" dirty="0"/>
+              <a:t>בנקים, חברות השקעה</a:t>
+            </a:r>
+          </a:p>
+          <a:p>
+            <a:pPr lvl="1" algn="r" rtl="1"/>
+            <a:r>
+              <a:rPr lang="he-IL" sz="1800" dirty="0"/>
+              <a:t>ביטוח</a:t>
+            </a:r>
+            <a:endParaRPr lang="en-US" sz="1800" dirty="0"/>
+          </a:p>
+        </p:txBody>
+      </p:sp>
+    </p:spTree>
+    <p:extLst>
+      <p:ext uri="{BB962C8B-B14F-4D97-AF65-F5344CB8AC3E}">
+        <p14:creationId xmlns:p14="http://schemas.microsoft.com/office/powerpoint/2010/main" val="3267244820"/>
+      </p:ext>
+    </p:extLst>
+  </p:cSld>
+  <p:clrMapOvr>
+    <a:masterClrMapping/>
+  </p:clrMapOvr>
+</p:sld>
+</file>
+
+<file path=ppt/slides/slide5.xml><?xml version="1.0" encoding="utf-8"?>
+<p:sld xmlns:a="http://schemas.openxmlformats.org/drawingml/2006/main" xmlns:r="http://schemas.openxmlformats.org/officeDocument/2006/relationships" xmlns:p="http://schemas.openxmlformats.org/presentationml/2006/main">
+  <p:cSld>
+    <p:spTree>
+      <p:nvGrpSpPr>
+        <p:cNvPr id="1" name=""/>
+        <p:cNvGrpSpPr/>
+        <p:nvPr/>
+      </p:nvGrpSpPr>
+      <p:grpSpPr>
+        <a:xfrm>
+          <a:off x="0" y="0"/>
+          <a:ext cx="0" cy="0"/>
+          <a:chOff x="0" y="0"/>
+          <a:chExt cx="0" cy="0"/>
+        </a:xfrm>
+      </p:grpSpPr>
+      <p:sp>
+        <p:nvSpPr>
+          <p:cNvPr id="2" name="Title 1">
+            <a:extLst>
+              <a:ext uri="{FF2B5EF4-FFF2-40B4-BE49-F238E27FC236}">
                 <a16:creationId xmlns:a16="http://schemas.microsoft.com/office/drawing/2014/main" id="{9C63BE03-D0AF-4B90-AA77-518AE155B624}"/>
               </a:ext>
             </a:extLst>
@@ -5423,28 +7841,84 @@
         </p:nvSpPr>
         <p:spPr/>
         <p:txBody>
-          <a:bodyPr/>
+          <a:bodyPr>
+            <a:normAutofit/>
+          </a:bodyPr>
           <a:lstStyle/>
           <a:p>
             <a:pPr algn="r" rtl="1"/>
             <a:r>
-              <a:rPr lang="en-US" dirty="0"/>
-              <a:t>SaaS</a:t>
-            </a:r>
-          </a:p>
-          <a:p>
-            <a:pPr algn="r" rtl="1"/>
-            <a:r>
-              <a:rPr lang="en-US" dirty="0"/>
-              <a:t>PaaS</a:t>
-            </a:r>
-          </a:p>
-          <a:p>
-            <a:pPr algn="r" rtl="1"/>
-            <a:r>
-              <a:rPr lang="en-US" dirty="0"/>
-              <a:t>IaaS</a:t>
-            </a:r>
+              <a:rPr lang="en-US" sz="2000" dirty="0"/>
+              <a:t>Cloud Computing</a:t>
+            </a:r>
+            <a:endParaRPr lang="he-IL" sz="2000" dirty="0"/>
+          </a:p>
+          <a:p>
+            <a:pPr algn="r" rtl="1"/>
+            <a:r>
+              <a:rPr lang="he-IL" sz="2000" dirty="0"/>
+              <a:t>רמות אבסטרקציה</a:t>
+            </a:r>
+            <a:endParaRPr lang="en-US" sz="2000" dirty="0"/>
+          </a:p>
+          <a:p>
+            <a:pPr lvl="1" algn="r" rtl="1"/>
+            <a:r>
+              <a:rPr lang="he-IL" sz="1800" dirty="0"/>
+              <a:t>תשתית</a:t>
+            </a:r>
+            <a:endParaRPr lang="en-US" sz="1800" dirty="0"/>
+          </a:p>
+          <a:p>
+            <a:pPr lvl="1" algn="r" rtl="1"/>
+            <a:r>
+              <a:rPr lang="he-IL" sz="1800" dirty="0"/>
+              <a:t>פלטפורמה</a:t>
+            </a:r>
+            <a:endParaRPr lang="en-US" sz="1800" dirty="0"/>
+          </a:p>
+          <a:p>
+            <a:pPr lvl="1" algn="r" rtl="1"/>
+            <a:r>
+              <a:rPr lang="he-IL" sz="1800" dirty="0"/>
+              <a:t>תוכנה</a:t>
+            </a:r>
+          </a:p>
+          <a:p>
+            <a:pPr algn="r" rtl="1"/>
+            <a:r>
+              <a:rPr lang="he-IL" sz="2000" dirty="0"/>
+              <a:t>ארכיטקטורה קלאסית</a:t>
+            </a:r>
+          </a:p>
+          <a:p>
+            <a:pPr lvl="1" algn="r" rtl="1"/>
+            <a:r>
+              <a:rPr lang="he-IL" sz="1800" dirty="0"/>
+              <a:t>אחסון קבצים</a:t>
+            </a:r>
+          </a:p>
+          <a:p>
+            <a:pPr lvl="1" algn="r" rtl="1"/>
+            <a:r>
+              <a:rPr lang="he-IL" sz="1800" dirty="0"/>
+              <a:t>ניהול מידע</a:t>
+            </a:r>
+          </a:p>
+          <a:p>
+            <a:pPr lvl="1" algn="r" rtl="1"/>
+            <a:r>
+              <a:rPr lang="he-IL" sz="1800" dirty="0"/>
+              <a:t>ביצוע פעולות</a:t>
+            </a:r>
+          </a:p>
+          <a:p>
+            <a:pPr lvl="1" algn="r" rtl="1"/>
+            <a:r>
+              <a:rPr lang="he-IL" sz="1800" dirty="0"/>
+              <a:t>שליפת תוצאות</a:t>
+            </a:r>
+            <a:endParaRPr lang="en-US" sz="1800" dirty="0"/>
           </a:p>
         </p:txBody>
       </p:sp>
@@ -5463,7 +7937,7 @@
           <p:nvPr/>
         </p:nvPicPr>
         <p:blipFill>
-          <a:blip r:embed="rId2"/>
+          <a:blip r:embed="rId3"/>
           <a:stretch>
             <a:fillRect/>
           </a:stretch>
@@ -5491,124 +7965,6 @@
 </p:sld>
 </file>
 
-<file path=ppt/slides/slide5.xml><?xml version="1.0" encoding="utf-8"?>
-<p:sld xmlns:a="http://schemas.openxmlformats.org/drawingml/2006/main" xmlns:r="http://schemas.openxmlformats.org/officeDocument/2006/relationships" xmlns:p="http://schemas.openxmlformats.org/presentationml/2006/main">
-  <p:cSld>
-    <p:spTree>
-      <p:nvGrpSpPr>
-        <p:cNvPr id="1" name=""/>
-        <p:cNvGrpSpPr/>
-        <p:nvPr/>
-      </p:nvGrpSpPr>
-      <p:grpSpPr>
-        <a:xfrm>
-          <a:off x="0" y="0"/>
-          <a:ext cx="0" cy="0"/>
-          <a:chOff x="0" y="0"/>
-          <a:chExt cx="0" cy="0"/>
-        </a:xfrm>
-      </p:grpSpPr>
-      <p:sp>
-        <p:nvSpPr>
-          <p:cNvPr id="2" name="Title 1">
-            <a:extLst>
-              <a:ext uri="{FF2B5EF4-FFF2-40B4-BE49-F238E27FC236}">
-                <a16:creationId xmlns:a16="http://schemas.microsoft.com/office/drawing/2014/main" id="{F6907D97-5BAD-42C9-8455-26AE52AC4006}"/>
-              </a:ext>
-            </a:extLst>
-          </p:cNvPr>
-          <p:cNvSpPr>
-            <a:spLocks noGrp="1"/>
-          </p:cNvSpPr>
-          <p:nvPr>
-            <p:ph type="title"/>
-          </p:nvPr>
-        </p:nvSpPr>
-        <p:spPr/>
-        <p:txBody>
-          <a:bodyPr/>
-          <a:lstStyle/>
-          <a:p>
-            <a:pPr algn="r" rtl="1"/>
-            <a:r>
-              <a:rPr lang="he-IL" dirty="0"/>
-              <a:t>אחסון מידע - </a:t>
-            </a:r>
-            <a:r>
-              <a:rPr lang="en-US" dirty="0"/>
-              <a:t>HDFS</a:t>
-            </a:r>
-          </a:p>
-        </p:txBody>
-      </p:sp>
-      <p:sp>
-        <p:nvSpPr>
-          <p:cNvPr id="3" name="Content Placeholder 2">
-            <a:extLst>
-              <a:ext uri="{FF2B5EF4-FFF2-40B4-BE49-F238E27FC236}">
-                <a16:creationId xmlns:a16="http://schemas.microsoft.com/office/drawing/2014/main" id="{42C601F1-0B90-4B5B-A3BB-4A1C6E46F1CE}"/>
-              </a:ext>
-            </a:extLst>
-          </p:cNvPr>
-          <p:cNvSpPr>
-            <a:spLocks noGrp="1"/>
-          </p:cNvSpPr>
-          <p:nvPr>
-            <p:ph idx="1"/>
-          </p:nvPr>
-        </p:nvSpPr>
-        <p:spPr/>
-        <p:txBody>
-          <a:bodyPr/>
-          <a:lstStyle/>
-          <a:p>
-            <a:pPr algn="r" rtl="1"/>
-            <a:endParaRPr lang="en-US" dirty="0"/>
-          </a:p>
-        </p:txBody>
-      </p:sp>
-      <p:pic>
-        <p:nvPicPr>
-          <p:cNvPr id="4" name="Picture 3">
-            <a:extLst>
-              <a:ext uri="{FF2B5EF4-FFF2-40B4-BE49-F238E27FC236}">
-                <a16:creationId xmlns:a16="http://schemas.microsoft.com/office/drawing/2014/main" id="{9E674E42-B26F-40F7-A94D-8E00FE6BD4BF}"/>
-              </a:ext>
-            </a:extLst>
-          </p:cNvPr>
-          <p:cNvPicPr>
-            <a:picLocks noChangeAspect="1"/>
-          </p:cNvPicPr>
-          <p:nvPr/>
-        </p:nvPicPr>
-        <p:blipFill rotWithShape="1">
-          <a:blip r:embed="rId2"/>
-          <a:srcRect r="6850"/>
-          <a:stretch/>
-        </p:blipFill>
-        <p:spPr>
-          <a:xfrm>
-            <a:off x="781410" y="1493393"/>
-            <a:ext cx="5572737" cy="4039164"/>
-          </a:xfrm>
-          <a:prstGeom prst="rect">
-            <a:avLst/>
-          </a:prstGeom>
-        </p:spPr>
-      </p:pic>
-    </p:spTree>
-    <p:extLst>
-      <p:ext uri="{BB962C8B-B14F-4D97-AF65-F5344CB8AC3E}">
-        <p14:creationId xmlns:p14="http://schemas.microsoft.com/office/powerpoint/2010/main" val="833326277"/>
-      </p:ext>
-    </p:extLst>
-  </p:cSld>
-  <p:clrMapOvr>
-    <a:masterClrMapping/>
-  </p:clrMapOvr>
-</p:sld>
-</file>
-
 <file path=ppt/slides/slide6.xml><?xml version="1.0" encoding="utf-8"?>
 <p:sld xmlns:a="http://schemas.openxmlformats.org/drawingml/2006/main" xmlns:r="http://schemas.openxmlformats.org/officeDocument/2006/relationships" xmlns:p="http://schemas.openxmlformats.org/presentationml/2006/main">
   <p:cSld>
@@ -5631,7 +7987,7 @@
           <p:cNvPr id="2" name="Title 1">
             <a:extLst>
               <a:ext uri="{FF2B5EF4-FFF2-40B4-BE49-F238E27FC236}">
-                <a16:creationId xmlns:a16="http://schemas.microsoft.com/office/drawing/2014/main" id="{94031490-B4DD-4687-AD30-BE4739A60267}"/>
+                <a16:creationId xmlns:a16="http://schemas.microsoft.com/office/drawing/2014/main" id="{F6907D97-5BAD-42C9-8455-26AE52AC4006}"/>
               </a:ext>
             </a:extLst>
           </p:cNvPr>
@@ -5650,45 +8006,234 @@
             <a:pPr algn="r" rtl="1"/>
             <a:r>
               <a:rPr lang="he-IL" dirty="0"/>
-              <a:t>ניהול מידע - </a:t>
+              <a:t>אחסון מידע - </a:t>
             </a:r>
             <a:r>
               <a:rPr lang="en-US" dirty="0"/>
-              <a:t>NoSQL</a:t>
-            </a:r>
-          </a:p>
-        </p:txBody>
-      </p:sp>
-      <p:sp>
-        <p:nvSpPr>
-          <p:cNvPr id="3" name="Content Placeholder 2">
+              <a:t>HDFS</a:t>
+            </a:r>
+          </a:p>
+        </p:txBody>
+      </p:sp>
+      <mc:AlternateContent xmlns:mc="http://schemas.openxmlformats.org/markup-compatibility/2006">
+        <mc:Choice xmlns:a14="http://schemas.microsoft.com/office/drawing/2010/main" Requires="a14">
+          <p:sp>
+            <p:nvSpPr>
+              <p:cNvPr id="3" name="Content Placeholder 2">
+                <a:extLst>
+                  <a:ext uri="{FF2B5EF4-FFF2-40B4-BE49-F238E27FC236}">
+                    <a16:creationId xmlns:a16="http://schemas.microsoft.com/office/drawing/2014/main" id="{42C601F1-0B90-4B5B-A3BB-4A1C6E46F1CE}"/>
+                  </a:ext>
+                </a:extLst>
+              </p:cNvPr>
+              <p:cNvSpPr>
+                <a:spLocks noGrp="1"/>
+              </p:cNvSpPr>
+              <p:nvPr>
+                <p:ph idx="1"/>
+              </p:nvPr>
+            </p:nvSpPr>
+            <p:spPr>
+              <a:xfrm>
+                <a:off x="1066800" y="2103120"/>
+                <a:ext cx="10058400" cy="3849624"/>
+              </a:xfrm>
+            </p:spPr>
+            <p:txBody>
+              <a:bodyPr>
+                <a:normAutofit/>
+              </a:bodyPr>
+              <a:lstStyle/>
+              <a:p>
+                <a:pPr algn="r" rtl="1"/>
+                <a:r>
+                  <a:rPr lang="he-IL" sz="2000" dirty="0"/>
+                  <a:t>אחסון מבוזר</a:t>
+                </a:r>
+              </a:p>
+              <a:p>
+                <a:pPr algn="r" rtl="1"/>
+                <a:r>
+                  <a:rPr lang="he-IL" sz="2000" dirty="0"/>
+                  <a:t>מעט קבצים גדולים</a:t>
+                </a:r>
+              </a:p>
+              <a:p>
+                <a:pPr algn="r" rtl="1"/>
+                <a:r>
+                  <a:rPr lang="he-IL" sz="2000" dirty="0"/>
+                  <a:t>מבנה</a:t>
+                </a:r>
+              </a:p>
+              <a:p>
+                <a:pPr lvl="1" algn="r" rtl="1"/>
+                <a:r>
+                  <a:rPr lang="en-US" sz="1800" dirty="0"/>
+                  <a:t>Name Node</a:t>
+                </a:r>
+                <a:r>
+                  <a:rPr lang="he-IL" sz="1800" dirty="0"/>
+                  <a:t> – יחיד</a:t>
+                </a:r>
+              </a:p>
+              <a:p>
+                <a:pPr lvl="1" algn="r" rtl="1"/>
+                <a:r>
+                  <a:rPr lang="en-US" sz="1800" dirty="0"/>
+                  <a:t>Data Nodes</a:t>
+                </a:r>
+                <a:r>
+                  <a:rPr lang="he-IL" sz="1800" dirty="0"/>
+                  <a:t> – רבים</a:t>
+                </a:r>
+              </a:p>
+              <a:p>
+                <a:pPr algn="r" rtl="1"/>
+                <a:r>
+                  <a:rPr lang="he-IL" sz="2000" dirty="0"/>
+                  <a:t>קובץ מקסימלי - </a:t>
+                </a:r>
+                <a14:m>
+                  <m:oMath xmlns:m="http://schemas.openxmlformats.org/officeDocument/2006/math">
+                    <m:sSup>
+                      <m:sSupPr>
+                        <m:ctrlPr>
+                          <a:rPr lang="en-US" sz="2000" b="0" i="1" smtClean="0">
+                            <a:latin typeface="Cambria Math" panose="02040503050406030204" pitchFamily="18" charset="0"/>
+                          </a:rPr>
+                        </m:ctrlPr>
+                      </m:sSupPr>
+                      <m:e>
+                        <m:r>
+                          <a:rPr lang="en-US" sz="2000" b="0" i="1" smtClean="0">
+                            <a:latin typeface="Cambria Math" panose="02040503050406030204" pitchFamily="18" charset="0"/>
+                          </a:rPr>
+                          <m:t>10</m:t>
+                        </m:r>
+                      </m:e>
+                      <m:sup>
+                        <m:r>
+                          <a:rPr lang="en-US" sz="2000" b="0" i="1" smtClean="0">
+                            <a:latin typeface="Cambria Math" panose="02040503050406030204" pitchFamily="18" charset="0"/>
+                          </a:rPr>
+                          <m:t>12</m:t>
+                        </m:r>
+                      </m:sup>
+                    </m:sSup>
+                    <m:r>
+                      <a:rPr lang="en-US" sz="2000" b="0" i="0" smtClean="0">
+                        <a:latin typeface="Cambria Math" panose="02040503050406030204" pitchFamily="18" charset="0"/>
+                      </a:rPr>
+                      <m:t> </m:t>
+                    </m:r>
+                    <m:r>
+                      <m:rPr>
+                        <m:sty m:val="p"/>
+                      </m:rPr>
+                      <a:rPr lang="en-US" sz="2000" b="0" i="0" smtClean="0">
+                        <a:latin typeface="Cambria Math" panose="02040503050406030204" pitchFamily="18" charset="0"/>
+                      </a:rPr>
+                      <m:t>PB</m:t>
+                    </m:r>
+                  </m:oMath>
+                </a14:m>
+                <a:endParaRPr lang="en-US" sz="2000" dirty="0"/>
+              </a:p>
+              <a:p>
+                <a:pPr algn="r" rtl="1"/>
+                <a:r>
+                  <a:rPr lang="he-IL" sz="2000" dirty="0"/>
+                  <a:t>שמירה על מהימנות המידע ע"י גיבוי</a:t>
+                </a:r>
+              </a:p>
+              <a:p>
+                <a:pPr algn="r" rtl="1"/>
+                <a:endParaRPr lang="he-IL" sz="2000" dirty="0"/>
+              </a:p>
+              <a:p>
+                <a:pPr algn="r" rtl="1"/>
+                <a:endParaRPr lang="en-US" sz="2000" dirty="0"/>
+              </a:p>
+            </p:txBody>
+          </p:sp>
+        </mc:Choice>
+        <mc:Fallback>
+          <p:sp>
+            <p:nvSpPr>
+              <p:cNvPr id="3" name="Content Placeholder 2">
+                <a:extLst>
+                  <a:ext uri="{FF2B5EF4-FFF2-40B4-BE49-F238E27FC236}">
+                    <a16:creationId xmlns:a16="http://schemas.microsoft.com/office/drawing/2014/main" id="{42C601F1-0B90-4B5B-A3BB-4A1C6E46F1CE}"/>
+                  </a:ext>
+                </a:extLst>
+              </p:cNvPr>
+              <p:cNvSpPr>
+                <a:spLocks noGrp="1" noRot="1" noChangeAspect="1" noMove="1" noResize="1" noEditPoints="1" noAdjustHandles="1" noChangeArrowheads="1" noChangeShapeType="1" noTextEdit="1"/>
+              </p:cNvSpPr>
+              <p:nvPr>
+                <p:ph idx="1"/>
+              </p:nvPr>
+            </p:nvSpPr>
+            <p:spPr>
+              <a:xfrm>
+                <a:off x="1066800" y="2103120"/>
+                <a:ext cx="10058400" cy="3849624"/>
+              </a:xfrm>
+              <a:blipFill>
+                <a:blip r:embed="rId3"/>
+                <a:stretch>
+                  <a:fillRect t="-633" r="-606"/>
+                </a:stretch>
+              </a:blipFill>
+            </p:spPr>
+            <p:txBody>
+              <a:bodyPr/>
+              <a:lstStyle/>
+              <a:p>
+                <a:r>
+                  <a:rPr lang="en-US">
+                    <a:noFill/>
+                  </a:rPr>
+                  <a:t> </a:t>
+                </a:r>
+              </a:p>
+            </p:txBody>
+          </p:sp>
+        </mc:Fallback>
+      </mc:AlternateContent>
+      <p:pic>
+        <p:nvPicPr>
+          <p:cNvPr id="4" name="Picture 3">
             <a:extLst>
               <a:ext uri="{FF2B5EF4-FFF2-40B4-BE49-F238E27FC236}">
-                <a16:creationId xmlns:a16="http://schemas.microsoft.com/office/drawing/2014/main" id="{8D1276E9-7921-4965-B3A8-4CFBCC2099C2}"/>
+                <a16:creationId xmlns:a16="http://schemas.microsoft.com/office/drawing/2014/main" id="{9E674E42-B26F-40F7-A94D-8E00FE6BD4BF}"/>
               </a:ext>
             </a:extLst>
           </p:cNvPr>
-          <p:cNvSpPr>
-            <a:spLocks noGrp="1"/>
-          </p:cNvSpPr>
-          <p:nvPr>
-            <p:ph idx="1"/>
-          </p:nvPr>
-        </p:nvSpPr>
-        <p:spPr/>
-        <p:txBody>
-          <a:bodyPr/>
-          <a:lstStyle/>
-          <a:p>
-            <a:pPr algn="r" rtl="1"/>
-            <a:endParaRPr lang="en-US"/>
-          </a:p>
-        </p:txBody>
-      </p:sp>
+          <p:cNvPicPr>
+            <a:picLocks noChangeAspect="1"/>
+          </p:cNvPicPr>
+          <p:nvPr/>
+        </p:nvPicPr>
+        <p:blipFill rotWithShape="1">
+          <a:blip r:embed="rId4"/>
+          <a:srcRect r="6850"/>
+          <a:stretch/>
+        </p:blipFill>
+        <p:spPr>
+          <a:xfrm>
+            <a:off x="633593" y="1727345"/>
+            <a:ext cx="4695465" cy="3403310"/>
+          </a:xfrm>
+          <a:prstGeom prst="rect">
+            <a:avLst/>
+          </a:prstGeom>
+        </p:spPr>
+      </p:pic>
     </p:spTree>
     <p:extLst>
       <p:ext uri="{BB962C8B-B14F-4D97-AF65-F5344CB8AC3E}">
-        <p14:creationId xmlns:p14="http://schemas.microsoft.com/office/powerpoint/2010/main" val="1039593608"/>
+        <p14:creationId xmlns:p14="http://schemas.microsoft.com/office/powerpoint/2010/main" val="833326277"/>
       </p:ext>
     </p:extLst>
   </p:cSld>
@@ -5720,6 +8265,153 @@
           <p:cNvPr id="2" name="Title 1">
             <a:extLst>
               <a:ext uri="{FF2B5EF4-FFF2-40B4-BE49-F238E27FC236}">
+                <a16:creationId xmlns:a16="http://schemas.microsoft.com/office/drawing/2014/main" id="{94031490-B4DD-4687-AD30-BE4739A60267}"/>
+              </a:ext>
+            </a:extLst>
+          </p:cNvPr>
+          <p:cNvSpPr>
+            <a:spLocks noGrp="1"/>
+          </p:cNvSpPr>
+          <p:nvPr>
+            <p:ph type="title"/>
+          </p:nvPr>
+        </p:nvSpPr>
+        <p:spPr/>
+        <p:txBody>
+          <a:bodyPr/>
+          <a:lstStyle/>
+          <a:p>
+            <a:pPr algn="r" rtl="1"/>
+            <a:r>
+              <a:rPr lang="he-IL" dirty="0"/>
+              <a:t>ניהול מידע - </a:t>
+            </a:r>
+            <a:r>
+              <a:rPr lang="en-US" dirty="0"/>
+              <a:t>NoSQL</a:t>
+            </a:r>
+          </a:p>
+        </p:txBody>
+      </p:sp>
+      <p:sp>
+        <p:nvSpPr>
+          <p:cNvPr id="3" name="Content Placeholder 2">
+            <a:extLst>
+              <a:ext uri="{FF2B5EF4-FFF2-40B4-BE49-F238E27FC236}">
+                <a16:creationId xmlns:a16="http://schemas.microsoft.com/office/drawing/2014/main" id="{8D1276E9-7921-4965-B3A8-4CFBCC2099C2}"/>
+              </a:ext>
+            </a:extLst>
+          </p:cNvPr>
+          <p:cNvSpPr>
+            <a:spLocks noGrp="1"/>
+          </p:cNvSpPr>
+          <p:nvPr>
+            <p:ph idx="1"/>
+          </p:nvPr>
+        </p:nvSpPr>
+        <p:spPr/>
+        <p:txBody>
+          <a:bodyPr>
+            <a:normAutofit/>
+          </a:bodyPr>
+          <a:lstStyle/>
+          <a:p>
+            <a:pPr algn="r" rtl="1"/>
+            <a:r>
+              <a:rPr lang="he-IL" sz="2000" dirty="0"/>
+              <a:t>מסדי נתונים יחסיים מתקשים בעיבוד מידע רב ומבוזר בין שרתים</a:t>
+            </a:r>
+          </a:p>
+          <a:p>
+            <a:pPr algn="r" rtl="1"/>
+            <a:r>
+              <a:rPr lang="he-IL" sz="2000" dirty="0"/>
+              <a:t>שימוש בשפה דומה ל-</a:t>
+            </a:r>
+            <a:r>
+              <a:rPr lang="en-US" sz="2000" dirty="0"/>
+              <a:t>SQL</a:t>
+            </a:r>
+            <a:r>
+              <a:rPr lang="he-IL" sz="2000" dirty="0"/>
+              <a:t> אך ללא תמיכה בפעולות מסוג </a:t>
+            </a:r>
+            <a:r>
+              <a:rPr lang="en-US" sz="2000" dirty="0"/>
+              <a:t>JOIN</a:t>
+            </a:r>
+            <a:endParaRPr lang="he-IL" sz="2000" dirty="0"/>
+          </a:p>
+          <a:p>
+            <a:pPr algn="r" rtl="1"/>
+            <a:r>
+              <a:rPr lang="he-IL" sz="2000" dirty="0"/>
+              <a:t>תמיכה בהרחבה קלה בעקבות ביזור המידע</a:t>
+            </a:r>
+          </a:p>
+          <a:p>
+            <a:pPr algn="r" rtl="1"/>
+            <a:r>
+              <a:rPr lang="he-IL" sz="2000" dirty="0"/>
+              <a:t>מותאם במיוחד לשליפה והוספה על כמות מסיבית של מידע</a:t>
+            </a:r>
+          </a:p>
+          <a:p>
+            <a:pPr algn="r" rtl="1"/>
+            <a:r>
+              <a:rPr lang="he-IL" sz="2000" dirty="0"/>
+              <a:t>ללא מבנה קבוע לטבלה</a:t>
+            </a:r>
+          </a:p>
+          <a:p>
+            <a:pPr algn="r" rtl="1"/>
+            <a:endParaRPr lang="he-IL" sz="2000" dirty="0"/>
+          </a:p>
+          <a:p>
+            <a:pPr algn="r" rtl="1"/>
+            <a:endParaRPr lang="he-IL" sz="2000" dirty="0"/>
+          </a:p>
+          <a:p>
+            <a:pPr algn="r" rtl="1"/>
+            <a:endParaRPr lang="en-US" sz="2000" dirty="0"/>
+          </a:p>
+        </p:txBody>
+      </p:sp>
+    </p:spTree>
+    <p:extLst>
+      <p:ext uri="{BB962C8B-B14F-4D97-AF65-F5344CB8AC3E}">
+        <p14:creationId xmlns:p14="http://schemas.microsoft.com/office/powerpoint/2010/main" val="1039593608"/>
+      </p:ext>
+    </p:extLst>
+  </p:cSld>
+  <p:clrMapOvr>
+    <a:masterClrMapping/>
+  </p:clrMapOvr>
+</p:sld>
+</file>
+
+<file path=ppt/slides/slide8.xml><?xml version="1.0" encoding="utf-8"?>
+<p:sld xmlns:a="http://schemas.openxmlformats.org/drawingml/2006/main" xmlns:r="http://schemas.openxmlformats.org/officeDocument/2006/relationships" xmlns:p="http://schemas.openxmlformats.org/presentationml/2006/main">
+  <p:cSld>
+    <p:spTree>
+      <p:nvGrpSpPr>
+        <p:cNvPr id="1" name=""/>
+        <p:cNvGrpSpPr/>
+        <p:nvPr/>
+      </p:nvGrpSpPr>
+      <p:grpSpPr>
+        <a:xfrm>
+          <a:off x="0" y="0"/>
+          <a:ext cx="0" cy="0"/>
+          <a:chOff x="0" y="0"/>
+          <a:chExt cx="0" cy="0"/>
+        </a:xfrm>
+      </p:grpSpPr>
+      <p:sp>
+        <p:nvSpPr>
+          <p:cNvPr id="2" name="Title 1">
+            <a:extLst>
+              <a:ext uri="{FF2B5EF4-FFF2-40B4-BE49-F238E27FC236}">
                 <a16:creationId xmlns:a16="http://schemas.microsoft.com/office/drawing/2014/main" id="{3D093E1F-0137-490A-8A7B-EDE195F238FC}"/>
               </a:ext>
             </a:extLst>
@@ -5743,7 +8435,7 @@
             </a:r>
             <a:r>
               <a:rPr lang="en-US" dirty="0"/>
-              <a:t>Map &amp; Reduce</a:t>
+              <a:t>MapReduce</a:t>
             </a:r>
           </a:p>
         </p:txBody>
@@ -5766,11 +8458,88 @@
         </p:nvSpPr>
         <p:spPr/>
         <p:txBody>
-          <a:bodyPr/>
+          <a:bodyPr>
+            <a:normAutofit/>
+          </a:bodyPr>
           <a:lstStyle/>
           <a:p>
             <a:pPr algn="r" rtl="1"/>
-            <a:endParaRPr lang="en-US"/>
+            <a:r>
+              <a:rPr lang="he-IL" sz="2000" dirty="0"/>
+              <a:t>מתאים במיוחד ל-</a:t>
+            </a:r>
+            <a:r>
+              <a:rPr lang="en-US" sz="2000" dirty="0"/>
+              <a:t>Cloud</a:t>
+            </a:r>
+            <a:endParaRPr lang="he-IL" sz="2000" dirty="0"/>
+          </a:p>
+          <a:p>
+            <a:pPr algn="r" rtl="1"/>
+            <a:r>
+              <a:rPr lang="he-IL" sz="2000" dirty="0"/>
+              <a:t>הסביבה המוכרת ביותר</a:t>
+            </a:r>
+          </a:p>
+          <a:p>
+            <a:pPr lvl="1" algn="r" rtl="1"/>
+            <a:r>
+              <a:rPr lang="en-US" sz="1800" dirty="0"/>
+              <a:t>MapReduce</a:t>
+            </a:r>
+          </a:p>
+          <a:p>
+            <a:pPr lvl="1" algn="r" rtl="1"/>
+            <a:r>
+              <a:rPr lang="he-IL" sz="1800" dirty="0"/>
+              <a:t>נוצרה ע"י </a:t>
+            </a:r>
+            <a:r>
+              <a:rPr lang="en-US" sz="1800" dirty="0"/>
+              <a:t>Google</a:t>
+            </a:r>
+            <a:r>
+              <a:rPr lang="he-IL" sz="1800" dirty="0"/>
+              <a:t> ב-</a:t>
+            </a:r>
+            <a:r>
+              <a:rPr lang="en-US" sz="1800" dirty="0"/>
+              <a:t>2004</a:t>
+            </a:r>
+            <a:endParaRPr lang="he-IL" sz="1800" dirty="0"/>
+          </a:p>
+          <a:p>
+            <a:pPr algn="r" rtl="1"/>
+            <a:r>
+              <a:rPr lang="he-IL" sz="2000" dirty="0"/>
+              <a:t>מכוונת לספק גמישות</a:t>
+            </a:r>
+          </a:p>
+          <a:p>
+            <a:pPr lvl="1" algn="r" rtl="1"/>
+            <a:r>
+              <a:rPr lang="he-IL" sz="1800" dirty="0"/>
+              <a:t>הקצאת משאבים</a:t>
+            </a:r>
+          </a:p>
+          <a:p>
+            <a:pPr lvl="1" algn="r" rtl="1"/>
+            <a:r>
+              <a:rPr lang="he-IL" sz="1800" dirty="0"/>
+              <a:t>טיפול בשגיאות</a:t>
+            </a:r>
+          </a:p>
+          <a:p>
+            <a:pPr lvl="1" algn="r" rtl="1"/>
+            <a:r>
+              <a:rPr lang="en-US" sz="1800" dirty="0"/>
+              <a:t>Scalability</a:t>
+            </a:r>
+            <a:endParaRPr lang="he-IL" sz="1800" dirty="0"/>
+          </a:p>
+          <a:p>
+            <a:pPr algn="r" rtl="1"/>
+            <a:endParaRPr lang="en-US" sz="2000" dirty="0"/>
           </a:p>
         </p:txBody>
       </p:sp>
@@ -5789,7 +8558,7 @@
           <p:nvPr/>
         </p:nvPicPr>
         <p:blipFill>
-          <a:blip r:embed="rId2"/>
+          <a:blip r:embed="rId3"/>
           <a:stretch>
             <a:fillRect/>
           </a:stretch>
@@ -5817,102 +8586,6 @@
 </p:sld>
 </file>
 
-<file path=ppt/slides/slide8.xml><?xml version="1.0" encoding="utf-8"?>
-<p:sld xmlns:a="http://schemas.openxmlformats.org/drawingml/2006/main" xmlns:r="http://schemas.openxmlformats.org/officeDocument/2006/relationships" xmlns:p="http://schemas.openxmlformats.org/presentationml/2006/main">
-  <p:cSld>
-    <p:spTree>
-      <p:nvGrpSpPr>
-        <p:cNvPr id="1" name=""/>
-        <p:cNvGrpSpPr/>
-        <p:nvPr/>
-      </p:nvGrpSpPr>
-      <p:grpSpPr>
-        <a:xfrm>
-          <a:off x="0" y="0"/>
-          <a:ext cx="0" cy="0"/>
-          <a:chOff x="0" y="0"/>
-          <a:chExt cx="0" cy="0"/>
-        </a:xfrm>
-      </p:grpSpPr>
-      <p:sp>
-        <p:nvSpPr>
-          <p:cNvPr id="2" name="Title 1">
-            <a:extLst>
-              <a:ext uri="{FF2B5EF4-FFF2-40B4-BE49-F238E27FC236}">
-                <a16:creationId xmlns:a16="http://schemas.microsoft.com/office/drawing/2014/main" id="{D18B9566-7AB7-408C-BBB4-81836248CC83}"/>
-              </a:ext>
-            </a:extLst>
-          </p:cNvPr>
-          <p:cNvSpPr>
-            <a:spLocks noGrp="1"/>
-          </p:cNvSpPr>
-          <p:nvPr>
-            <p:ph type="title"/>
-          </p:nvPr>
-        </p:nvSpPr>
-        <p:spPr/>
-        <p:txBody>
-          <a:bodyPr/>
-          <a:lstStyle/>
-          <a:p>
-            <a:pPr algn="r" rtl="1"/>
-            <a:r>
-              <a:rPr lang="he-IL" dirty="0"/>
-              <a:t>תשאול תוצרים</a:t>
-            </a:r>
-            <a:endParaRPr lang="en-US" dirty="0"/>
-          </a:p>
-        </p:txBody>
-      </p:sp>
-      <p:sp>
-        <p:nvSpPr>
-          <p:cNvPr id="3" name="Content Placeholder 2">
-            <a:extLst>
-              <a:ext uri="{FF2B5EF4-FFF2-40B4-BE49-F238E27FC236}">
-                <a16:creationId xmlns:a16="http://schemas.microsoft.com/office/drawing/2014/main" id="{72DC0D36-56E5-4392-B981-86CF76109C1A}"/>
-              </a:ext>
-            </a:extLst>
-          </p:cNvPr>
-          <p:cNvSpPr>
-            <a:spLocks noGrp="1"/>
-          </p:cNvSpPr>
-          <p:nvPr>
-            <p:ph idx="1"/>
-          </p:nvPr>
-        </p:nvSpPr>
-        <p:spPr/>
-        <p:txBody>
-          <a:bodyPr/>
-          <a:lstStyle/>
-          <a:p>
-            <a:pPr algn="r" rtl="1"/>
-            <a:r>
-              <a:rPr lang="he-IL" dirty="0"/>
-              <a:t>הממשק למשתמש</a:t>
-            </a:r>
-          </a:p>
-          <a:p>
-            <a:pPr algn="r" rtl="1"/>
-            <a:r>
-              <a:rPr lang="en-US" dirty="0"/>
-              <a:t>Hive, Pig, JAQL, Dremel, Scope</a:t>
-            </a:r>
-          </a:p>
-        </p:txBody>
-      </p:sp>
-    </p:spTree>
-    <p:extLst>
-      <p:ext uri="{BB962C8B-B14F-4D97-AF65-F5344CB8AC3E}">
-        <p14:creationId xmlns:p14="http://schemas.microsoft.com/office/powerpoint/2010/main" val="835255526"/>
-      </p:ext>
-    </p:extLst>
-  </p:cSld>
-  <p:clrMapOvr>
-    <a:masterClrMapping/>
-  </p:clrMapOvr>
-</p:sld>
-</file>
-
 <file path=ppt/slides/slide9.xml><?xml version="1.0" encoding="utf-8"?>
 <p:sld xmlns:a="http://schemas.openxmlformats.org/drawingml/2006/main" xmlns:r="http://schemas.openxmlformats.org/officeDocument/2006/relationships" xmlns:p="http://schemas.openxmlformats.org/presentationml/2006/main">
   <p:cSld>
@@ -5935,7 +8608,7 @@
           <p:cNvPr id="2" name="Title 1">
             <a:extLst>
               <a:ext uri="{FF2B5EF4-FFF2-40B4-BE49-F238E27FC236}">
-                <a16:creationId xmlns:a16="http://schemas.microsoft.com/office/drawing/2014/main" id="{0FC1436D-5EEE-4E9D-AC23-E5A4DACB4155}"/>
+                <a16:creationId xmlns:a16="http://schemas.microsoft.com/office/drawing/2014/main" id="{D18B9566-7AB7-408C-BBB4-81836248CC83}"/>
               </a:ext>
             </a:extLst>
           </p:cNvPr>
@@ -5953,9 +8626,10 @@
           <a:p>
             <a:pPr algn="r" rtl="1"/>
             <a:r>
-              <a:rPr lang="en-US" dirty="0"/>
-              <a:t>MapReduce Framework</a:t>
-            </a:r>
+              <a:rPr lang="he-IL" dirty="0"/>
+              <a:t>תשאול תוצרים</a:t>
+            </a:r>
+            <a:endParaRPr lang="en-US" dirty="0"/>
           </a:p>
         </p:txBody>
       </p:sp>
@@ -5964,7 +8638,7 @@
           <p:cNvPr id="3" name="Content Placeholder 2">
             <a:extLst>
               <a:ext uri="{FF2B5EF4-FFF2-40B4-BE49-F238E27FC236}">
-                <a16:creationId xmlns:a16="http://schemas.microsoft.com/office/drawing/2014/main" id="{7A536F9D-DF6A-4B33-9937-7CF7F0B107AC}"/>
+                <a16:creationId xmlns:a16="http://schemas.microsoft.com/office/drawing/2014/main" id="{72DC0D36-56E5-4392-B981-86CF76109C1A}"/>
               </a:ext>
             </a:extLst>
           </p:cNvPr>
@@ -5977,18 +8651,64 @@
         </p:nvSpPr>
         <p:spPr/>
         <p:txBody>
-          <a:bodyPr/>
+          <a:bodyPr>
+            <a:normAutofit/>
+          </a:bodyPr>
           <a:lstStyle/>
           <a:p>
             <a:pPr algn="r" rtl="1"/>
-            <a:endParaRPr lang="en-US"/>
+            <a:r>
+              <a:rPr lang="he-IL" sz="2000" dirty="0"/>
+              <a:t>הממשק למשתמש אל מול שאר השכבות</a:t>
+            </a:r>
+          </a:p>
+          <a:p>
+            <a:pPr algn="r" rtl="1"/>
+            <a:r>
+              <a:rPr lang="he-IL" sz="2000" dirty="0"/>
+              <a:t>שימוש בקונספט </a:t>
+            </a:r>
+            <a:r>
+              <a:rPr lang="en-US" sz="2000" dirty="0"/>
+              <a:t>MapReduce</a:t>
+            </a:r>
+            <a:r>
+              <a:rPr lang="he-IL" sz="2000" dirty="0"/>
+              <a:t> לביצוע שאילתה וקבלת התוצר</a:t>
+            </a:r>
+          </a:p>
+          <a:p>
+            <a:pPr algn="r" rtl="1"/>
+            <a:r>
+              <a:rPr lang="he-IL" sz="2000" dirty="0"/>
+              <a:t>הצגת התוצר הסופי לאחר ביצוע פעולות כמו </a:t>
+            </a:r>
+            <a:r>
+              <a:rPr lang="en-US" sz="2000" dirty="0"/>
+              <a:t>Join</a:t>
+            </a:r>
+            <a:endParaRPr lang="he-IL" sz="2000" dirty="0"/>
+          </a:p>
+          <a:p>
+            <a:pPr algn="r" rtl="1"/>
+            <a:r>
+              <a:rPr lang="he-IL" sz="2000" dirty="0"/>
+              <a:t>המטרה – לספק פתרון משולב של השפה "ההצהרתית" לבין הביצוע "הפרוצדורלי"</a:t>
+            </a:r>
+          </a:p>
+          <a:p>
+            <a:pPr algn="r" rtl="1"/>
+            <a:r>
+              <a:rPr lang="en-US" sz="2000" dirty="0"/>
+              <a:t>Hive, Pig, JAQL, Dremel, Scope</a:t>
+            </a:r>
           </a:p>
         </p:txBody>
       </p:sp>
     </p:spTree>
     <p:extLst>
       <p:ext uri="{BB962C8B-B14F-4D97-AF65-F5344CB8AC3E}">
-        <p14:creationId xmlns:p14="http://schemas.microsoft.com/office/powerpoint/2010/main" val="2559828672"/>
+        <p14:creationId xmlns:p14="http://schemas.microsoft.com/office/powerpoint/2010/main" val="835255526"/>
       </p:ext>
     </p:extLst>
   </p:cSld>
@@ -6272,4 +8992,299 @@
     </a:ext>
   </a:extLst>
 </a:theme>
+</file>
+
+<file path=ppt/theme/theme2.xml><?xml version="1.0" encoding="utf-8"?>
+<a:theme xmlns:a="http://schemas.openxmlformats.org/drawingml/2006/main" name="Office Theme">
+  <a:themeElements>
+    <a:clrScheme name="Office">
+      <a:dk1>
+        <a:sysClr val="windowText" lastClr="000000"/>
+      </a:dk1>
+      <a:lt1>
+        <a:sysClr val="window" lastClr="FFFFFF"/>
+      </a:lt1>
+      <a:dk2>
+        <a:srgbClr val="44546A"/>
+      </a:dk2>
+      <a:lt2>
+        <a:srgbClr val="E7E6E6"/>
+      </a:lt2>
+      <a:accent1>
+        <a:srgbClr val="4472C4"/>
+      </a:accent1>
+      <a:accent2>
+        <a:srgbClr val="ED7D31"/>
+      </a:accent2>
+      <a:accent3>
+        <a:srgbClr val="A5A5A5"/>
+      </a:accent3>
+      <a:accent4>
+        <a:srgbClr val="FFC000"/>
+      </a:accent4>
+      <a:accent5>
+        <a:srgbClr val="5B9BD5"/>
+      </a:accent5>
+      <a:accent6>
+        <a:srgbClr val="70AD47"/>
+      </a:accent6>
+      <a:hlink>
+        <a:srgbClr val="0563C1"/>
+      </a:hlink>
+      <a:folHlink>
+        <a:srgbClr val="954F72"/>
+      </a:folHlink>
+    </a:clrScheme>
+    <a:fontScheme name="Office">
+      <a:majorFont>
+        <a:latin typeface="Calibri Light" panose="020F0302020204030204"/>
+        <a:ea typeface=""/>
+        <a:cs typeface=""/>
+        <a:font script="Jpan" typeface="游ゴシック Light"/>
+        <a:font script="Hang" typeface="맑은 고딕"/>
+        <a:font script="Hans" typeface="等线 Light"/>
+        <a:font script="Hant" typeface="新細明體"/>
+        <a:font script="Arab" typeface="Times New Roman"/>
+        <a:font script="Hebr" typeface="Times New Roman"/>
+        <a:font script="Thai" typeface="Angsana New"/>
+        <a:font script="Ethi" typeface="Nyala"/>
+        <a:font script="Beng" typeface="Vrinda"/>
+        <a:font script="Gujr" typeface="Shruti"/>
+        <a:font script="Khmr" typeface="MoolBoran"/>
+        <a:font script="Knda" typeface="Tunga"/>
+        <a:font script="Guru" typeface="Raavi"/>
+        <a:font script="Cans" typeface="Euphemia"/>
+        <a:font script="Cher" typeface="Plantagenet Cherokee"/>
+        <a:font script="Yiii" typeface="Microsoft Yi Baiti"/>
+        <a:font script="Tibt" typeface="Microsoft Himalaya"/>
+        <a:font script="Thaa" typeface="MV Boli"/>
+        <a:font script="Deva" typeface="Mangal"/>
+        <a:font script="Telu" typeface="Gautami"/>
+        <a:font script="Taml" typeface="Latha"/>
+        <a:font script="Syrc" typeface="Estrangelo Edessa"/>
+        <a:font script="Orya" typeface="Kalinga"/>
+        <a:font script="Mlym" typeface="Kartika"/>
+        <a:font script="Laoo" typeface="DokChampa"/>
+        <a:font script="Sinh" typeface="Iskoola Pota"/>
+        <a:font script="Mong" typeface="Mongolian Baiti"/>
+        <a:font script="Viet" typeface="Times New Roman"/>
+        <a:font script="Uigh" typeface="Microsoft Uighur"/>
+        <a:font script="Geor" typeface="Sylfaen"/>
+        <a:font script="Armn" typeface="Arial"/>
+        <a:font script="Bugi" typeface="Leelawadee UI"/>
+        <a:font script="Bopo" typeface="Microsoft JhengHei"/>
+        <a:font script="Java" typeface="Javanese Text"/>
+        <a:font script="Lisu" typeface="Segoe UI"/>
+        <a:font script="Mymr" typeface="Myanmar Text"/>
+        <a:font script="Nkoo" typeface="Ebrima"/>
+        <a:font script="Olck" typeface="Nirmala UI"/>
+        <a:font script="Osma" typeface="Ebrima"/>
+        <a:font script="Phag" typeface="Phagspa"/>
+        <a:font script="Syrn" typeface="Estrangelo Edessa"/>
+        <a:font script="Syrj" typeface="Estrangelo Edessa"/>
+        <a:font script="Syre" typeface="Estrangelo Edessa"/>
+        <a:font script="Sora" typeface="Nirmala UI"/>
+        <a:font script="Tale" typeface="Microsoft Tai Le"/>
+        <a:font script="Talu" typeface="Microsoft New Tai Lue"/>
+        <a:font script="Tfng" typeface="Ebrima"/>
+      </a:majorFont>
+      <a:minorFont>
+        <a:latin typeface="Calibri" panose="020F0502020204030204"/>
+        <a:ea typeface=""/>
+        <a:cs typeface=""/>
+        <a:font script="Jpan" typeface="游ゴシック"/>
+        <a:font script="Hang" typeface="맑은 고딕"/>
+        <a:font script="Hans" typeface="等线"/>
+        <a:font script="Hant" typeface="新細明體"/>
+        <a:font script="Arab" typeface="Arial"/>
+        <a:font script="Hebr" typeface="Arial"/>
+        <a:font script="Thai" typeface="Cordia New"/>
+        <a:font script="Ethi" typeface="Nyala"/>
+        <a:font script="Beng" typeface="Vrinda"/>
+        <a:font script="Gujr" typeface="Shruti"/>
+        <a:font script="Khmr" typeface="DaunPenh"/>
+        <a:font script="Knda" typeface="Tunga"/>
+        <a:font script="Guru" typeface="Raavi"/>
+        <a:font script="Cans" typeface="Euphemia"/>
+        <a:font script="Cher" typeface="Plantagenet Cherokee"/>
+        <a:font script="Yiii" typeface="Microsoft Yi Baiti"/>
+        <a:font script="Tibt" typeface="Microsoft Himalaya"/>
+        <a:font script="Thaa" typeface="MV Boli"/>
+        <a:font script="Deva" typeface="Mangal"/>
+        <a:font script="Telu" typeface="Gautami"/>
+        <a:font script="Taml" typeface="Latha"/>
+        <a:font script="Syrc" typeface="Estrangelo Edessa"/>
+        <a:font script="Orya" typeface="Kalinga"/>
+        <a:font script="Mlym" typeface="Kartika"/>
+        <a:font script="Laoo" typeface="DokChampa"/>
+        <a:font script="Sinh" typeface="Iskoola Pota"/>
+        <a:font script="Mong" typeface="Mongolian Baiti"/>
+        <a:font script="Viet" typeface="Arial"/>
+        <a:font script="Uigh" typeface="Microsoft Uighur"/>
+        <a:font script="Geor" typeface="Sylfaen"/>
+        <a:font script="Armn" typeface="Arial"/>
+        <a:font script="Bugi" typeface="Leelawadee UI"/>
+        <a:font script="Bopo" typeface="Microsoft JhengHei"/>
+        <a:font script="Java" typeface="Javanese Text"/>
+        <a:font script="Lisu" typeface="Segoe UI"/>
+        <a:font script="Mymr" typeface="Myanmar Text"/>
+        <a:font script="Nkoo" typeface="Ebrima"/>
+        <a:font script="Olck" typeface="Nirmala UI"/>
+        <a:font script="Osma" typeface="Ebrima"/>
+        <a:font script="Phag" typeface="Phagspa"/>
+        <a:font script="Syrn" typeface="Estrangelo Edessa"/>
+        <a:font script="Syrj" typeface="Estrangelo Edessa"/>
+        <a:font script="Syre" typeface="Estrangelo Edessa"/>
+        <a:font script="Sora" typeface="Nirmala UI"/>
+        <a:font script="Tale" typeface="Microsoft Tai Le"/>
+        <a:font script="Talu" typeface="Microsoft New Tai Lue"/>
+        <a:font script="Tfng" typeface="Ebrima"/>
+      </a:minorFont>
+    </a:fontScheme>
+    <a:fmtScheme name="Office">
+      <a:fillStyleLst>
+        <a:solidFill>
+          <a:schemeClr val="phClr"/>
+        </a:solidFill>
+        <a:gradFill rotWithShape="1">
+          <a:gsLst>
+            <a:gs pos="0">
+              <a:schemeClr val="phClr">
+                <a:lumMod val="110000"/>
+                <a:satMod val="105000"/>
+                <a:tint val="67000"/>
+              </a:schemeClr>
+            </a:gs>
+            <a:gs pos="50000">
+              <a:schemeClr val="phClr">
+                <a:lumMod val="105000"/>
+                <a:satMod val="103000"/>
+                <a:tint val="73000"/>
+              </a:schemeClr>
+            </a:gs>
+            <a:gs pos="100000">
+              <a:schemeClr val="phClr">
+                <a:lumMod val="105000"/>
+                <a:satMod val="109000"/>
+                <a:tint val="81000"/>
+              </a:schemeClr>
+            </a:gs>
+          </a:gsLst>
+          <a:lin ang="5400000" scaled="0"/>
+        </a:gradFill>
+        <a:gradFill rotWithShape="1">
+          <a:gsLst>
+            <a:gs pos="0">
+              <a:schemeClr val="phClr">
+                <a:satMod val="103000"/>
+                <a:lumMod val="102000"/>
+                <a:tint val="94000"/>
+              </a:schemeClr>
+            </a:gs>
+            <a:gs pos="50000">
+              <a:schemeClr val="phClr">
+                <a:satMod val="110000"/>
+                <a:lumMod val="100000"/>
+                <a:shade val="100000"/>
+              </a:schemeClr>
+            </a:gs>
+            <a:gs pos="100000">
+              <a:schemeClr val="phClr">
+                <a:lumMod val="99000"/>
+                <a:satMod val="120000"/>
+                <a:shade val="78000"/>
+              </a:schemeClr>
+            </a:gs>
+          </a:gsLst>
+          <a:lin ang="5400000" scaled="0"/>
+        </a:gradFill>
+      </a:fillStyleLst>
+      <a:lnStyleLst>
+        <a:ln w="6350" cap="flat" cmpd="sng" algn="ctr">
+          <a:solidFill>
+            <a:schemeClr val="phClr"/>
+          </a:solidFill>
+          <a:prstDash val="solid"/>
+          <a:miter lim="800000"/>
+        </a:ln>
+        <a:ln w="12700" cap="flat" cmpd="sng" algn="ctr">
+          <a:solidFill>
+            <a:schemeClr val="phClr"/>
+          </a:solidFill>
+          <a:prstDash val="solid"/>
+          <a:miter lim="800000"/>
+        </a:ln>
+        <a:ln w="19050" cap="flat" cmpd="sng" algn="ctr">
+          <a:solidFill>
+            <a:schemeClr val="phClr"/>
+          </a:solidFill>
+          <a:prstDash val="solid"/>
+          <a:miter lim="800000"/>
+        </a:ln>
+      </a:lnStyleLst>
+      <a:effectStyleLst>
+        <a:effectStyle>
+          <a:effectLst/>
+        </a:effectStyle>
+        <a:effectStyle>
+          <a:effectLst/>
+        </a:effectStyle>
+        <a:effectStyle>
+          <a:effectLst>
+            <a:outerShdw blurRad="57150" dist="19050" dir="5400000" algn="ctr" rotWithShape="0">
+              <a:srgbClr val="000000">
+                <a:alpha val="63000"/>
+              </a:srgbClr>
+            </a:outerShdw>
+          </a:effectLst>
+        </a:effectStyle>
+      </a:effectStyleLst>
+      <a:bgFillStyleLst>
+        <a:solidFill>
+          <a:schemeClr val="phClr"/>
+        </a:solidFill>
+        <a:solidFill>
+          <a:schemeClr val="phClr">
+            <a:tint val="95000"/>
+            <a:satMod val="170000"/>
+          </a:schemeClr>
+        </a:solidFill>
+        <a:gradFill rotWithShape="1">
+          <a:gsLst>
+            <a:gs pos="0">
+              <a:schemeClr val="phClr">
+                <a:tint val="93000"/>
+                <a:satMod val="150000"/>
+                <a:shade val="98000"/>
+                <a:lumMod val="102000"/>
+              </a:schemeClr>
+            </a:gs>
+            <a:gs pos="50000">
+              <a:schemeClr val="phClr">
+                <a:tint val="98000"/>
+                <a:satMod val="130000"/>
+                <a:shade val="90000"/>
+                <a:lumMod val="103000"/>
+              </a:schemeClr>
+            </a:gs>
+            <a:gs pos="100000">
+              <a:schemeClr val="phClr">
+                <a:shade val="63000"/>
+                <a:satMod val="120000"/>
+              </a:schemeClr>
+            </a:gs>
+          </a:gsLst>
+          <a:lin ang="5400000" scaled="0"/>
+        </a:gradFill>
+      </a:bgFillStyleLst>
+    </a:fmtScheme>
+  </a:themeElements>
+  <a:objectDefaults/>
+  <a:extraClrSchemeLst/>
+  <a:extLst>
+    <a:ext uri="{05A4C25C-085E-4340-85A3-A5531E510DB2}">
+      <thm15:themeFamily xmlns:thm15="http://schemas.microsoft.com/office/thememl/2012/main" name="Office Theme" id="{62F939B6-93AF-4DB8-9C6B-D6C7DFDC589F}" vid="{4A3C46E8-61CC-4603-A589-7422A47A8E4A}"/>
+    </a:ext>
+  </a:extLst>
+</a:theme>
 </file>
</xml_diff>

<commit_message>
Added the authors of the article
</commit_message>
<xml_diff>
--- a/Lecture/Big Data with Cloud Computing.pptx
+++ b/Lecture/Big Data with Cloud Computing.pptx
@@ -6645,7 +6645,7 @@
         <p:spPr>
           <a:xfrm>
             <a:off x="477980" y="1680507"/>
-            <a:ext cx="9057905" cy="1470630"/>
+            <a:ext cx="9057905" cy="2288820"/>
           </a:xfrm>
         </p:spPr>
         <p:txBody>
@@ -6666,7 +6666,22 @@
               <a:rPr lang="en-US" sz="2500" b="1" dirty="0"/>
               <a:t>an insight on the computing environment, MapReduce, and programming framework</a:t>
             </a:r>
-            <a:endParaRPr lang="en-US" sz="2500" dirty="0"/>
+            <a:br>
+              <a:rPr lang="en-US" sz="2500" b="1" dirty="0"/>
+            </a:br>
+            <a:r>
+              <a:rPr lang="en-US" sz="1400" i="1" dirty="0"/>
+              <a:t>Alberto Fernández, Sara del Río, Victoria López, Abdullah </a:t>
+            </a:r>
+            <a:r>
+              <a:rPr lang="en-US" sz="1400" i="1" dirty="0" err="1"/>
+              <a:t>Bawakid</a:t>
+            </a:r>
+            <a:r>
+              <a:rPr lang="en-US" sz="1400" i="1" dirty="0"/>
+              <a:t>, María J. del Jesus, José M. Benítez2 and Francisco Herrera</a:t>
+            </a:r>
+            <a:endParaRPr lang="en-US" sz="2500" i="1" dirty="0"/>
           </a:p>
         </p:txBody>
       </p:sp>
@@ -8015,8 +8030,8 @@
           </a:p>
         </p:txBody>
       </p:sp>
-      <mc:AlternateContent xmlns:mc="http://schemas.openxmlformats.org/markup-compatibility/2006">
-        <mc:Choice xmlns:a14="http://schemas.microsoft.com/office/drawing/2010/main" Requires="a14">
+      <mc:AlternateContent xmlns:mc="http://schemas.openxmlformats.org/markup-compatibility/2006" xmlns:a14="http://schemas.microsoft.com/office/drawing/2010/main">
+        <mc:Choice Requires="a14">
           <p:sp>
             <p:nvSpPr>
               <p:cNvPr id="3" name="Content Placeholder 2">
@@ -8157,7 +8172,7 @@
             </p:txBody>
           </p:sp>
         </mc:Choice>
-        <mc:Fallback>
+        <mc:Fallback xmlns="">
           <p:sp>
             <p:nvSpPr>
               <p:cNvPr id="3" name="Content Placeholder 2">

</xml_diff>

<commit_message>
added DM algorithms slide
</commit_message>
<xml_diff>
--- a/Lecture/Big Data with Cloud Computing.pptx
+++ b/Lecture/Big Data with Cloud Computing.pptx
@@ -19663,7 +19663,7 @@
           </a:bodyPr>
           <a:lstStyle/>
           <a:p>
-            <a:pPr indent="-182880" lvl="0" marL="182880" rtl="1" algn="r">
+            <a:pPr indent="-214630" lvl="0" marL="182880" rtl="1" algn="r">
               <a:lnSpc>
                 <a:spcPct val="110000"/>
               </a:lnSpc>
@@ -19673,14 +19673,182 @@
               <a:spcAft>
                 <a:spcPts val="0"/>
               </a:spcAft>
-              <a:buSzPts val="1500"/>
+              <a:buSzPts val="2000"/>
               <a:buChar char="◦"/>
             </a:pPr>
             <a:r>
-              <a:rPr lang="iw-IL"/>
-              <a:t>רשימה של אלגו</a:t>
+              <a:rPr lang="iw-IL" sz="2000"/>
+              <a:t>קללת המימדים, טעינת נתונים לזיכרון</a:t>
             </a:r>
-            <a:endParaRPr/>
+            <a:endParaRPr sz="2000"/>
+          </a:p>
+          <a:p>
+            <a:pPr indent="-214630" lvl="0" marL="182880" rtl="1" algn="r">
+              <a:lnSpc>
+                <a:spcPct val="110000"/>
+              </a:lnSpc>
+              <a:spcBef>
+                <a:spcPts val="0"/>
+              </a:spcBef>
+              <a:spcAft>
+                <a:spcPts val="0"/>
+              </a:spcAft>
+              <a:buSzPts val="2000"/>
+              <a:buChar char="◦"/>
+            </a:pPr>
+            <a:r>
+              <a:rPr lang="iw-IL" sz="2000"/>
+              <a:t>סוגי אלגוריתמים:</a:t>
+            </a:r>
+            <a:endParaRPr sz="2000"/>
+          </a:p>
+          <a:p>
+            <a:pPr indent="-195580" lvl="1" marL="457200" rtl="1" algn="r">
+              <a:lnSpc>
+                <a:spcPct val="110000"/>
+              </a:lnSpc>
+              <a:spcBef>
+                <a:spcPts val="0"/>
+              </a:spcBef>
+              <a:spcAft>
+                <a:spcPts val="0"/>
+              </a:spcAft>
+              <a:buSzPts val="2000"/>
+              <a:buChar char="◦"/>
+            </a:pPr>
+            <a:r>
+              <a:rPr lang="iw-IL" sz="2000"/>
+              <a:t>סיווג</a:t>
+            </a:r>
+            <a:endParaRPr sz="2000"/>
+          </a:p>
+          <a:p>
+            <a:pPr indent="-195580" lvl="1" marL="457200" rtl="1" algn="r">
+              <a:lnSpc>
+                <a:spcPct val="110000"/>
+              </a:lnSpc>
+              <a:spcBef>
+                <a:spcPts val="0"/>
+              </a:spcBef>
+              <a:spcAft>
+                <a:spcPts val="0"/>
+              </a:spcAft>
+              <a:buSzPts val="2000"/>
+              <a:buChar char="◦"/>
+            </a:pPr>
+            <a:r>
+              <a:rPr lang="iw-IL" sz="2000"/>
+              <a:t>כריית תבניות תכופות</a:t>
+            </a:r>
+            <a:endParaRPr sz="2000"/>
+          </a:p>
+          <a:p>
+            <a:pPr indent="-195580" lvl="1" marL="457200" rtl="1" algn="r">
+              <a:lnSpc>
+                <a:spcPct val="110000"/>
+              </a:lnSpc>
+              <a:spcBef>
+                <a:spcPts val="0"/>
+              </a:spcBef>
+              <a:spcAft>
+                <a:spcPts val="0"/>
+              </a:spcAft>
+              <a:buSzPts val="2000"/>
+              <a:buChar char="◦"/>
+            </a:pPr>
+            <a:r>
+              <a:rPr lang="iw-IL" sz="2000"/>
+              <a:t>אשכול</a:t>
+            </a:r>
+            <a:endParaRPr sz="2000"/>
+          </a:p>
+          <a:p>
+            <a:pPr indent="-195580" lvl="1" marL="457200" rtl="1" algn="r">
+              <a:lnSpc>
+                <a:spcPct val="110000"/>
+              </a:lnSpc>
+              <a:spcBef>
+                <a:spcPts val="0"/>
+              </a:spcBef>
+              <a:spcAft>
+                <a:spcPts val="0"/>
+              </a:spcAft>
+              <a:buSzPts val="2000"/>
+              <a:buChar char="◦"/>
+            </a:pPr>
+            <a:r>
+              <a:rPr lang="iw-IL" sz="2000"/>
+              <a:t>מערכות המלצה</a:t>
+            </a:r>
+            <a:endParaRPr sz="2000"/>
+          </a:p>
+          <a:p>
+            <a:pPr indent="-195580" lvl="0" marL="182880" rtl="1" algn="r">
+              <a:lnSpc>
+                <a:spcPct val="110000"/>
+              </a:lnSpc>
+              <a:spcBef>
+                <a:spcPts val="0"/>
+              </a:spcBef>
+              <a:spcAft>
+                <a:spcPts val="0"/>
+              </a:spcAft>
+              <a:buSzPts val="2000"/>
+              <a:buChar char="◦"/>
+            </a:pPr>
+            <a:r>
+              <a:rPr lang="iw-IL" sz="2000"/>
+              <a:t>Mahout ML lib: אין </a:t>
+            </a:r>
+            <a:r>
+              <a:rPr lang="iw-IL" sz="2000"/>
+              <a:t>UI, </a:t>
+            </a:r>
+            <a:r>
+              <a:rPr lang="iw-IL" sz="2000"/>
+              <a:t>עדיין בפיתוח, כבר לא עובדים עם MR</a:t>
+            </a:r>
+            <a:endParaRPr sz="2000"/>
+          </a:p>
+          <a:p>
+            <a:pPr indent="-195580" lvl="0" marL="182880" rtl="1" algn="r">
+              <a:lnSpc>
+                <a:spcPct val="110000"/>
+              </a:lnSpc>
+              <a:spcBef>
+                <a:spcPts val="0"/>
+              </a:spcBef>
+              <a:spcAft>
+                <a:spcPts val="0"/>
+              </a:spcAft>
+              <a:buSzPts val="2000"/>
+              <a:buChar char="◦"/>
+            </a:pPr>
+            <a:r>
+              <a:rPr lang="iw-IL" sz="2000"/>
+              <a:t>NIMBLE, SystemML: מריצות על MR</a:t>
+            </a:r>
+            <a:endParaRPr sz="2000"/>
+          </a:p>
+          <a:p>
+            <a:pPr indent="-195580" lvl="0" marL="182880" rtl="1" algn="r">
+              <a:lnSpc>
+                <a:spcPct val="110000"/>
+              </a:lnSpc>
+              <a:spcBef>
+                <a:spcPts val="0"/>
+              </a:spcBef>
+              <a:spcAft>
+                <a:spcPts val="0"/>
+              </a:spcAft>
+              <a:buSzPts val="2000"/>
+              <a:buChar char="◦"/>
+            </a:pPr>
+            <a:r>
+              <a:rPr lang="iw-IL" sz="2000"/>
+              <a:t>Ricardo, Rhipe: רצות מעל HADOOP, התכנות ב R</a:t>
+            </a:r>
+            <a:endParaRPr sz="2000"/>
           </a:p>
         </p:txBody>
       </p:sp>
@@ -22105,9 +22273,9 @@
 </file>
 
 <file path=ppt/theme/theme1.xml><?xml version="1.0" encoding="utf-8"?>
-<a:theme xmlns:a="http://schemas.openxmlformats.org/drawingml/2006/main" xmlns:r="http://schemas.openxmlformats.org/officeDocument/2006/relationships" name="Office Theme">
+<a:theme xmlns:a="http://schemas.openxmlformats.org/drawingml/2006/main" xmlns:r="http://schemas.openxmlformats.org/officeDocument/2006/relationships" name="SavonVTI">
   <a:themeElements>
-    <a:clrScheme name="Office">
+    <a:clrScheme name="AnalogousFromRegularSeed_2SEEDS">
       <a:dk1>
         <a:srgbClr val="000000"/>
       </a:dk1>
@@ -22115,34 +22283,34 @@
         <a:srgbClr val="FFFFFF"/>
       </a:lt1>
       <a:dk2>
-        <a:srgbClr val="44546A"/>
+        <a:srgbClr val="24412B"/>
       </a:dk2>
       <a:lt2>
-        <a:srgbClr val="E7E6E6"/>
+        <a:srgbClr val="E2E8E6"/>
       </a:lt2>
       <a:accent1>
-        <a:srgbClr val="4472C4"/>
+        <a:srgbClr val="B6395D"/>
       </a:accent1>
       <a:accent2>
-        <a:srgbClr val="ED7D31"/>
+        <a:srgbClr val="C749A2"/>
       </a:accent2>
       <a:accent3>
-        <a:srgbClr val="A5A5A5"/>
+        <a:srgbClr val="C75949"/>
       </a:accent3>
       <a:accent4>
-        <a:srgbClr val="FFC000"/>
+        <a:srgbClr val="37B542"/>
       </a:accent4>
       <a:accent5>
-        <a:srgbClr val="5B9BD5"/>
+        <a:srgbClr val="43B87F"/>
       </a:accent5>
       <a:accent6>
-        <a:srgbClr val="70AD47"/>
+        <a:srgbClr val="37B5AC"/>
       </a:accent6>
       <a:hlink>
-        <a:srgbClr val="0563C1"/>
+        <a:srgbClr val="319377"/>
       </a:hlink>
       <a:folHlink>
-        <a:srgbClr val="954F72"/>
+        <a:srgbClr val="848484"/>
       </a:folHlink>
     </a:clrScheme>
     <a:fontScheme name="Office">
@@ -22384,9 +22552,9 @@
 </file>
 
 <file path=ppt/theme/theme2.xml><?xml version="1.0" encoding="utf-8"?>
-<a:theme xmlns:a="http://schemas.openxmlformats.org/drawingml/2006/main" xmlns:r="http://schemas.openxmlformats.org/officeDocument/2006/relationships" name="SavonVTI">
+<a:theme xmlns:a="http://schemas.openxmlformats.org/drawingml/2006/main" xmlns:r="http://schemas.openxmlformats.org/officeDocument/2006/relationships" name="Office Theme">
   <a:themeElements>
-    <a:clrScheme name="AnalogousFromRegularSeed_2SEEDS">
+    <a:clrScheme name="Office">
       <a:dk1>
         <a:srgbClr val="000000"/>
       </a:dk1>
@@ -22394,34 +22562,34 @@
         <a:srgbClr val="FFFFFF"/>
       </a:lt1>
       <a:dk2>
-        <a:srgbClr val="24412B"/>
+        <a:srgbClr val="44546A"/>
       </a:dk2>
       <a:lt2>
-        <a:srgbClr val="E2E8E6"/>
+        <a:srgbClr val="E7E6E6"/>
       </a:lt2>
       <a:accent1>
-        <a:srgbClr val="B6395D"/>
+        <a:srgbClr val="4472C4"/>
       </a:accent1>
       <a:accent2>
-        <a:srgbClr val="C749A2"/>
+        <a:srgbClr val="ED7D31"/>
       </a:accent2>
       <a:accent3>
-        <a:srgbClr val="C75949"/>
+        <a:srgbClr val="A5A5A5"/>
       </a:accent3>
       <a:accent4>
-        <a:srgbClr val="37B542"/>
+        <a:srgbClr val="FFC000"/>
       </a:accent4>
       <a:accent5>
-        <a:srgbClr val="43B87F"/>
+        <a:srgbClr val="5B9BD5"/>
       </a:accent5>
       <a:accent6>
-        <a:srgbClr val="37B5AC"/>
+        <a:srgbClr val="70AD47"/>
       </a:accent6>
       <a:hlink>
-        <a:srgbClr val="319377"/>
+        <a:srgbClr val="0563C1"/>
       </a:hlink>
       <a:folHlink>
-        <a:srgbClr val="848484"/>
+        <a:srgbClr val="954F72"/>
       </a:folHlink>
     </a:clrScheme>
     <a:fontScheme name="Office">

</xml_diff>

<commit_message>
adding MapReduce 2.0 slide
</commit_message>
<xml_diff>
--- a/Lecture/Big Data with Cloud Computing.pptx
+++ b/Lecture/Big Data with Cloud Computing.pptx
@@ -274,7 +274,7 @@
   </p:defaultTextStyle>
   <p:extLst>
     <p:ext uri="http://customooxmlschemas.google.com/">
-      <go:slidesCustomData xmlns:go="http://customooxmlschemas.google.com/" r:id="rId29" roundtripDataSignature="AMtx7miPuic1GdmDQBnaTB90ZenlZK+zeQ=="/>
+      <go:slidesCustomData xmlns:go="http://customooxmlschemas.google.com/" r:id="rId29" roundtripDataSignature="AMtx7miPBxICYay0rbn1SQ9irIuixZ2CaA=="/>
     </p:ext>
   </p:extLst>
 </p:presentation>
@@ -2047,7 +2047,7 @@
   <p:cSld>
     <p:spTree>
       <p:nvGrpSpPr>
-        <p:cNvPr id="227" name="Shape 227"/>
+        <p:cNvPr id="228" name="Shape 228"/>
         <p:cNvGrpSpPr/>
         <p:nvPr/>
       </p:nvGrpSpPr>
@@ -2061,7 +2061,7 @@
       </p:grpSpPr>
       <p:sp>
         <p:nvSpPr>
-          <p:cNvPr id="228" name="Google Shape;228;p15:notes"/>
+          <p:cNvPr id="229" name="Google Shape;229;p15:notes"/>
           <p:cNvSpPr txBox="1"/>
           <p:nvPr>
             <p:ph idx="1" type="body"/>
@@ -2100,7 +2100,7 @@
       </p:sp>
       <p:sp>
         <p:nvSpPr>
-          <p:cNvPr id="229" name="Google Shape;229;p15:notes"/>
+          <p:cNvPr id="230" name="Google Shape;230;p15:notes"/>
           <p:cNvSpPr/>
           <p:nvPr>
             <p:ph idx="2" type="sldImg"/>
@@ -20194,9 +20194,37 @@
           </a:p>
         </p:txBody>
       </p:sp>
+      <p:pic>
+        <p:nvPicPr>
+          <p:cNvPr id="226" name="Google Shape;226;p14"/>
+          <p:cNvPicPr preferRelativeResize="0"/>
+          <p:nvPr/>
+        </p:nvPicPr>
+        <p:blipFill>
+          <a:blip r:embed="rId3">
+            <a:alphaModFix/>
+          </a:blip>
+          <a:stretch>
+            <a:fillRect/>
+          </a:stretch>
+        </p:blipFill>
+        <p:spPr>
+          <a:xfrm>
+            <a:off x="457200" y="471723"/>
+            <a:ext cx="6747875" cy="4975000"/>
+          </a:xfrm>
+          <a:prstGeom prst="rect">
+            <a:avLst/>
+          </a:prstGeom>
+          <a:noFill/>
+          <a:ln>
+            <a:noFill/>
+          </a:ln>
+        </p:spPr>
+      </p:pic>
       <p:sp>
         <p:nvSpPr>
-          <p:cNvPr id="226" name="Google Shape;226;p14"/>
+          <p:cNvPr id="227" name="Google Shape;227;p14"/>
           <p:cNvSpPr txBox="1"/>
           <p:nvPr>
             <p:ph idx="1" type="body"/>
@@ -20221,7 +20249,7 @@
           </a:bodyPr>
           <a:lstStyle/>
           <a:p>
-            <a:pPr indent="-87629" lvl="0" marL="182880" rtl="1" algn="r">
+            <a:pPr indent="-355600" lvl="0" marL="457200" rtl="1" algn="r">
               <a:lnSpc>
                 <a:spcPct val="110000"/>
               </a:lnSpc>
@@ -20231,13 +20259,182 @@
               <a:spcAft>
                 <a:spcPts val="0"/>
               </a:spcAft>
-              <a:buSzPts val="1500"/>
-              <a:buNone/>
-            </a:pPr>
-            <a:r>
-              <a:t/>
-            </a:r>
-            <a:endParaRPr/>
+              <a:buSzPts val="2000"/>
+              <a:buChar char="◦"/>
+            </a:pPr>
+            <a:r>
+              <a:rPr lang="iw-IL" sz="2000"/>
+              <a:t>DAG</a:t>
+            </a:r>
+            <a:endParaRPr sz="2000"/>
+          </a:p>
+          <a:p>
+            <a:pPr indent="-355600" lvl="0" marL="457200" rtl="1" algn="r">
+              <a:lnSpc>
+                <a:spcPct val="110000"/>
+              </a:lnSpc>
+              <a:spcBef>
+                <a:spcPts val="0"/>
+              </a:spcBef>
+              <a:spcAft>
+                <a:spcPts val="0"/>
+              </a:spcAft>
+              <a:buSzPts val="2000"/>
+              <a:buChar char="◦"/>
+            </a:pPr>
+            <a:r>
+              <a:rPr lang="iw-IL" sz="2000"/>
+              <a:t>Itrative MR</a:t>
+            </a:r>
+            <a:endParaRPr sz="2000"/>
+          </a:p>
+          <a:p>
+            <a:pPr indent="-355600" lvl="1" marL="914400" rtl="1" algn="r">
+              <a:lnSpc>
+                <a:spcPct val="110000"/>
+              </a:lnSpc>
+              <a:spcBef>
+                <a:spcPts val="0"/>
+              </a:spcBef>
+              <a:spcAft>
+                <a:spcPts val="0"/>
+              </a:spcAft>
+              <a:buSzPts val="2000"/>
+              <a:buChar char="◦"/>
+            </a:pPr>
+            <a:r>
+              <a:rPr lang="iw-IL" sz="2000"/>
+              <a:t>Haloop, Twis</a:t>
+            </a:r>
+            <a:r>
+              <a:rPr lang="iw-IL" sz="2000"/>
+              <a:t>ter, </a:t>
+            </a:r>
+            <a:r>
+              <a:rPr lang="iw-IL" sz="2000"/>
+              <a:t>Spark</a:t>
+            </a:r>
+            <a:endParaRPr sz="2000"/>
+          </a:p>
+          <a:p>
+            <a:pPr indent="-355600" lvl="0" marL="457200" rtl="1" algn="r">
+              <a:lnSpc>
+                <a:spcPct val="110000"/>
+              </a:lnSpc>
+              <a:spcBef>
+                <a:spcPts val="0"/>
+              </a:spcBef>
+              <a:spcAft>
+                <a:spcPts val="0"/>
+              </a:spcAft>
+              <a:buSzPts val="2000"/>
+              <a:buChar char="◦"/>
+            </a:pPr>
+            <a:r>
+              <a:rPr lang="iw-IL" sz="2000"/>
+              <a:t>BSP/Graph</a:t>
+            </a:r>
+            <a:endParaRPr sz="2000"/>
+          </a:p>
+          <a:p>
+            <a:pPr indent="-355600" lvl="1" marL="914400" rtl="1" algn="r">
+              <a:lnSpc>
+                <a:spcPct val="110000"/>
+              </a:lnSpc>
+              <a:spcBef>
+                <a:spcPts val="0"/>
+              </a:spcBef>
+              <a:spcAft>
+                <a:spcPts val="0"/>
+              </a:spcAft>
+              <a:buSzPts val="2000"/>
+              <a:buChar char="◦"/>
+            </a:pPr>
+            <a:r>
+              <a:rPr lang="iw-IL" sz="2000"/>
+              <a:t>Pregel, Giraph, GraphX, GraphLab</a:t>
+            </a:r>
+            <a:endParaRPr sz="2000"/>
+          </a:p>
+          <a:p>
+            <a:pPr indent="-355600" lvl="0" marL="457200" rtl="1" algn="r">
+              <a:lnSpc>
+                <a:spcPct val="110000"/>
+              </a:lnSpc>
+              <a:spcBef>
+                <a:spcPts val="0"/>
+              </a:spcBef>
+              <a:spcAft>
+                <a:spcPts val="0"/>
+              </a:spcAft>
+              <a:buSzPts val="2000"/>
+              <a:buChar char="◦"/>
+            </a:pPr>
+            <a:r>
+              <a:rPr lang="iw-IL" sz="2000"/>
+              <a:t>Stream Processing</a:t>
+            </a:r>
+            <a:endParaRPr sz="2000"/>
+          </a:p>
+          <a:p>
+            <a:pPr indent="-355600" lvl="1" marL="914400" rtl="1" algn="r">
+              <a:lnSpc>
+                <a:spcPct val="110000"/>
+              </a:lnSpc>
+              <a:spcBef>
+                <a:spcPts val="0"/>
+              </a:spcBef>
+              <a:spcAft>
+                <a:spcPts val="0"/>
+              </a:spcAft>
+              <a:buSzPts val="2000"/>
+              <a:buChar char="◦"/>
+            </a:pPr>
+            <a:r>
+              <a:rPr lang="iw-IL" sz="2000"/>
+              <a:t>Storm, S4, Spark Streaming</a:t>
+            </a:r>
+            <a:endParaRPr sz="2000"/>
+          </a:p>
+          <a:p>
+            <a:pPr indent="-355600" lvl="0" marL="457200" rtl="1" algn="r">
+              <a:lnSpc>
+                <a:spcPct val="110000"/>
+              </a:lnSpc>
+              <a:spcBef>
+                <a:spcPts val="0"/>
+              </a:spcBef>
+              <a:spcAft>
+                <a:spcPts val="0"/>
+              </a:spcAft>
+              <a:buSzPts val="2000"/>
+              <a:buChar char="◦"/>
+            </a:pPr>
+            <a:r>
+              <a:rPr lang="iw-IL" sz="2000"/>
+              <a:t>MR GPU</a:t>
+            </a:r>
+            <a:endParaRPr sz="2000"/>
+          </a:p>
+          <a:p>
+            <a:pPr indent="-355600" lvl="1" marL="914400" rtl="1" algn="r">
+              <a:lnSpc>
+                <a:spcPct val="110000"/>
+              </a:lnSpc>
+              <a:spcBef>
+                <a:spcPts val="0"/>
+              </a:spcBef>
+              <a:spcAft>
+                <a:spcPts val="0"/>
+              </a:spcAft>
+              <a:buSzPts val="2000"/>
+              <a:buChar char="◦"/>
+            </a:pPr>
+            <a:r>
+              <a:rPr lang="iw-IL" sz="2000"/>
+              <a:t>Pheonix, MARS, GPMR, GREX</a:t>
+            </a:r>
+            <a:endParaRPr sz="2000"/>
           </a:p>
         </p:txBody>
       </p:sp>
@@ -20254,7 +20451,7 @@
   <p:cSld>
     <p:spTree>
       <p:nvGrpSpPr>
-        <p:cNvPr id="230" name="Shape 230"/>
+        <p:cNvPr id="231" name="Shape 231"/>
         <p:cNvGrpSpPr/>
         <p:nvPr/>
       </p:nvGrpSpPr>
@@ -20268,7 +20465,7 @@
       </p:grpSpPr>
       <p:sp>
         <p:nvSpPr>
-          <p:cNvPr id="231" name="Google Shape;231;p15"/>
+          <p:cNvPr id="232" name="Google Shape;232;p15"/>
           <p:cNvSpPr txBox="1"/>
           <p:nvPr>
             <p:ph type="title"/>
@@ -20320,7 +20517,7 @@
       </p:sp>
       <p:sp>
         <p:nvSpPr>
-          <p:cNvPr id="232" name="Google Shape;232;p15"/>
+          <p:cNvPr id="233" name="Google Shape;233;p15"/>
           <p:cNvSpPr txBox="1"/>
           <p:nvPr>
             <p:ph idx="1" type="body"/>
@@ -22693,6 +22890,285 @@
 </file>
 
 <file path=ppt/theme/theme2.xml><?xml version="1.0" encoding="utf-8"?>
+<a:theme xmlns:a="http://schemas.openxmlformats.org/drawingml/2006/main" xmlns:r="http://schemas.openxmlformats.org/officeDocument/2006/relationships" name="Office Theme">
+  <a:themeElements>
+    <a:clrScheme name="Office">
+      <a:dk1>
+        <a:srgbClr val="000000"/>
+      </a:dk1>
+      <a:lt1>
+        <a:srgbClr val="FFFFFF"/>
+      </a:lt1>
+      <a:dk2>
+        <a:srgbClr val="44546A"/>
+      </a:dk2>
+      <a:lt2>
+        <a:srgbClr val="E7E6E6"/>
+      </a:lt2>
+      <a:accent1>
+        <a:srgbClr val="4472C4"/>
+      </a:accent1>
+      <a:accent2>
+        <a:srgbClr val="ED7D31"/>
+      </a:accent2>
+      <a:accent3>
+        <a:srgbClr val="A5A5A5"/>
+      </a:accent3>
+      <a:accent4>
+        <a:srgbClr val="FFC000"/>
+      </a:accent4>
+      <a:accent5>
+        <a:srgbClr val="5B9BD5"/>
+      </a:accent5>
+      <a:accent6>
+        <a:srgbClr val="70AD47"/>
+      </a:accent6>
+      <a:hlink>
+        <a:srgbClr val="0563C1"/>
+      </a:hlink>
+      <a:folHlink>
+        <a:srgbClr val="954F72"/>
+      </a:folHlink>
+    </a:clrScheme>
+    <a:fontScheme name="Office">
+      <a:majorFont>
+        <a:latin typeface="Arial"/>
+        <a:ea typeface=""/>
+        <a:cs typeface=""/>
+        <a:font script="Jpan" typeface="ＭＳ Ｐゴシック"/>
+        <a:font script="Hang" typeface="맑은 고딕"/>
+        <a:font script="Hans" typeface="宋体"/>
+        <a:font script="Hant" typeface="新細明體"/>
+        <a:font script="Arab" typeface="Times New Roman"/>
+        <a:font script="Hebr" typeface="Times New Roman"/>
+        <a:font script="Thai" typeface="Angsana New"/>
+        <a:font script="Ethi" typeface="Nyala"/>
+        <a:font script="Beng" typeface="Vrinda"/>
+        <a:font script="Gujr" typeface="Shruti"/>
+        <a:font script="Khmr" typeface="MoolBoran"/>
+        <a:font script="Knda" typeface="Tunga"/>
+        <a:font script="Guru" typeface="Raavi"/>
+        <a:font script="Cans" typeface="Euphemia"/>
+        <a:font script="Cher" typeface="Plantagenet Cherokee"/>
+        <a:font script="Yiii" typeface="Microsoft Yi Baiti"/>
+        <a:font script="Tibt" typeface="Microsoft Himalaya"/>
+        <a:font script="Thaa" typeface="MV Boli"/>
+        <a:font script="Deva" typeface="Mangal"/>
+        <a:font script="Telu" typeface="Gautami"/>
+        <a:font script="Taml" typeface="Latha"/>
+        <a:font script="Syrc" typeface="Estrangelo Edessa"/>
+        <a:font script="Orya" typeface="Kalinga"/>
+        <a:font script="Mlym" typeface="Kartika"/>
+        <a:font script="Laoo" typeface="DokChampa"/>
+        <a:font script="Sinh" typeface="Iskoola Pota"/>
+        <a:font script="Mong" typeface="Mongolian Baiti"/>
+        <a:font script="Viet" typeface="Times New Roman"/>
+        <a:font script="Uigh" typeface="Microsoft Uighur"/>
+        <a:font script="Geor" typeface="Sylfaen"/>
+      </a:majorFont>
+      <a:minorFont>
+        <a:latin typeface="Arial"/>
+        <a:ea typeface=""/>
+        <a:cs typeface=""/>
+        <a:font script="Jpan" typeface="ＭＳ Ｐゴシック"/>
+        <a:font script="Hang" typeface="맑은 고딕"/>
+        <a:font script="Hans" typeface="宋体"/>
+        <a:font script="Hant" typeface="新細明體"/>
+        <a:font script="Arab" typeface="Arial"/>
+        <a:font script="Hebr" typeface="Arial"/>
+        <a:font script="Thai" typeface="Cordia New"/>
+        <a:font script="Ethi" typeface="Nyala"/>
+        <a:font script="Beng" typeface="Vrinda"/>
+        <a:font script="Gujr" typeface="Shruti"/>
+        <a:font script="Khmr" typeface="DaunPenh"/>
+        <a:font script="Knda" typeface="Tunga"/>
+        <a:font script="Guru" typeface="Raavi"/>
+        <a:font script="Cans" typeface="Euphemia"/>
+        <a:font script="Cher" typeface="Plantagenet Cherokee"/>
+        <a:font script="Yiii" typeface="Microsoft Yi Baiti"/>
+        <a:font script="Tibt" typeface="Microsoft Himalaya"/>
+        <a:font script="Thaa" typeface="MV Boli"/>
+        <a:font script="Deva" typeface="Mangal"/>
+        <a:font script="Telu" typeface="Gautami"/>
+        <a:font script="Taml" typeface="Latha"/>
+        <a:font script="Syrc" typeface="Estrangelo Edessa"/>
+        <a:font script="Orya" typeface="Kalinga"/>
+        <a:font script="Mlym" typeface="Kartika"/>
+        <a:font script="Laoo" typeface="DokChampa"/>
+        <a:font script="Sinh" typeface="Iskoola Pota"/>
+        <a:font script="Mong" typeface="Mongolian Baiti"/>
+        <a:font script="Viet" typeface="Arial"/>
+        <a:font script="Uigh" typeface="Microsoft Uighur"/>
+        <a:font script="Geor" typeface="Sylfaen"/>
+      </a:minorFont>
+    </a:fontScheme>
+    <a:fmtScheme name="Office">
+      <a:fillStyleLst>
+        <a:solidFill>
+          <a:schemeClr val="phClr"/>
+        </a:solidFill>
+        <a:gradFill rotWithShape="1">
+          <a:gsLst>
+            <a:gs pos="0">
+              <a:schemeClr val="phClr">
+                <a:tint val="50000"/>
+                <a:satMod val="300000"/>
+              </a:schemeClr>
+            </a:gs>
+            <a:gs pos="35000">
+              <a:schemeClr val="phClr">
+                <a:tint val="37000"/>
+                <a:satMod val="300000"/>
+              </a:schemeClr>
+            </a:gs>
+            <a:gs pos="100000">
+              <a:schemeClr val="phClr">
+                <a:tint val="15000"/>
+                <a:satMod val="350000"/>
+              </a:schemeClr>
+            </a:gs>
+          </a:gsLst>
+          <a:lin ang="16200000" scaled="1"/>
+        </a:gradFill>
+        <a:gradFill rotWithShape="1">
+          <a:gsLst>
+            <a:gs pos="0">
+              <a:schemeClr val="phClr">
+                <a:tint val="100000"/>
+                <a:shade val="100000"/>
+                <a:satMod val="130000"/>
+              </a:schemeClr>
+            </a:gs>
+            <a:gs pos="100000">
+              <a:schemeClr val="phClr">
+                <a:tint val="50000"/>
+                <a:shade val="100000"/>
+                <a:satMod val="350000"/>
+              </a:schemeClr>
+            </a:gs>
+          </a:gsLst>
+          <a:lin ang="16200000" scaled="0"/>
+        </a:gradFill>
+      </a:fillStyleLst>
+      <a:lnStyleLst>
+        <a:ln w="9525" cap="flat" cmpd="sng" algn="ctr">
+          <a:solidFill>
+            <a:schemeClr val="phClr">
+              <a:shade val="95000"/>
+              <a:satMod val="105000"/>
+            </a:schemeClr>
+          </a:solidFill>
+          <a:prstDash val="solid"/>
+        </a:ln>
+        <a:ln w="25400" cap="flat" cmpd="sng" algn="ctr">
+          <a:solidFill>
+            <a:schemeClr val="phClr"/>
+          </a:solidFill>
+          <a:prstDash val="solid"/>
+        </a:ln>
+        <a:ln w="38100" cap="flat" cmpd="sng" algn="ctr">
+          <a:solidFill>
+            <a:schemeClr val="phClr"/>
+          </a:solidFill>
+          <a:prstDash val="solid"/>
+        </a:ln>
+      </a:lnStyleLst>
+      <a:effectStyleLst>
+        <a:effectStyle>
+          <a:effectLst>
+            <a:outerShdw blurRad="40000" dist="20000" dir="5400000" rotWithShape="0">
+              <a:srgbClr val="000000">
+                <a:alpha val="38000"/>
+              </a:srgbClr>
+            </a:outerShdw>
+          </a:effectLst>
+        </a:effectStyle>
+        <a:effectStyle>
+          <a:effectLst>
+            <a:outerShdw blurRad="40000" dist="23000" dir="5400000" rotWithShape="0">
+              <a:srgbClr val="000000">
+                <a:alpha val="35000"/>
+              </a:srgbClr>
+            </a:outerShdw>
+          </a:effectLst>
+        </a:effectStyle>
+        <a:effectStyle>
+          <a:effectLst>
+            <a:outerShdw blurRad="40000" dist="23000" dir="5400000" rotWithShape="0">
+              <a:srgbClr val="000000">
+                <a:alpha val="35000"/>
+              </a:srgbClr>
+            </a:outerShdw>
+          </a:effectLst>
+          <a:scene3d>
+            <a:camera prst="orthographicFront">
+              <a:rot lat="0" lon="0" rev="0"/>
+            </a:camera>
+            <a:lightRig rig="threePt" dir="t">
+              <a:rot lat="0" lon="0" rev="1200000"/>
+            </a:lightRig>
+          </a:scene3d>
+          <a:sp3d>
+            <a:bevelT w="63500" h="25400"/>
+          </a:sp3d>
+        </a:effectStyle>
+      </a:effectStyleLst>
+      <a:bgFillStyleLst>
+        <a:solidFill>
+          <a:schemeClr val="phClr"/>
+        </a:solidFill>
+        <a:gradFill rotWithShape="1">
+          <a:gsLst>
+            <a:gs pos="0">
+              <a:schemeClr val="phClr">
+                <a:tint val="40000"/>
+                <a:satMod val="350000"/>
+              </a:schemeClr>
+            </a:gs>
+            <a:gs pos="40000">
+              <a:schemeClr val="phClr">
+                <a:tint val="45000"/>
+                <a:shade val="99000"/>
+                <a:satMod val="350000"/>
+              </a:schemeClr>
+            </a:gs>
+            <a:gs pos="100000">
+              <a:schemeClr val="phClr">
+                <a:shade val="20000"/>
+                <a:satMod val="255000"/>
+              </a:schemeClr>
+            </a:gs>
+          </a:gsLst>
+          <a:path path="circle">
+            <a:fillToRect l="50000" t="-80000" r="50000" b="180000"/>
+          </a:path>
+        </a:gradFill>
+        <a:gradFill rotWithShape="1">
+          <a:gsLst>
+            <a:gs pos="0">
+              <a:schemeClr val="phClr">
+                <a:tint val="80000"/>
+                <a:satMod val="300000"/>
+              </a:schemeClr>
+            </a:gs>
+            <a:gs pos="100000">
+              <a:schemeClr val="phClr">
+                <a:shade val="30000"/>
+                <a:satMod val="200000"/>
+              </a:schemeClr>
+            </a:gs>
+          </a:gsLst>
+          <a:path path="circle">
+            <a:fillToRect l="50000" t="50000" r="50000" b="50000"/>
+          </a:path>
+        </a:gradFill>
+      </a:bgFillStyleLst>
+    </a:fmtScheme>
+  </a:themeElements>
+</a:theme>
+</file>
+
+<file path=ppt/theme/theme3.xml><?xml version="1.0" encoding="utf-8"?>
 <a:theme xmlns:a="http://schemas.openxmlformats.org/drawingml/2006/main" xmlns:r="http://schemas.openxmlformats.org/officeDocument/2006/relationships" name="SavonVTI">
   <a:themeElements>
     <a:clrScheme name="AnalogousFromRegularSeed_2SEEDS">
@@ -22969,283 +23445,4 @@
     </a:fmtScheme>
   </a:themeElements>
 </a:theme>
-</file>
-
-<file path=ppt/theme/theme3.xml><?xml version="1.0" encoding="utf-8"?>
-<a:theme xmlns:a="http://schemas.openxmlformats.org/drawingml/2006/main" xmlns:r="http://schemas.openxmlformats.org/officeDocument/2006/relationships" name="Office Theme">
-  <a:themeElements>
-    <a:clrScheme name="Office">
-      <a:dk1>
-        <a:srgbClr val="000000"/>
-      </a:dk1>
-      <a:lt1>
-        <a:srgbClr val="FFFFFF"/>
-      </a:lt1>
-      <a:dk2>
-        <a:srgbClr val="44546A"/>
-      </a:dk2>
-      <a:lt2>
-        <a:srgbClr val="E7E6E6"/>
-      </a:lt2>
-      <a:accent1>
-        <a:srgbClr val="4472C4"/>
-      </a:accent1>
-      <a:accent2>
-        <a:srgbClr val="ED7D31"/>
-      </a:accent2>
-      <a:accent3>
-        <a:srgbClr val="A5A5A5"/>
-      </a:accent3>
-      <a:accent4>
-        <a:srgbClr val="FFC000"/>
-      </a:accent4>
-      <a:accent5>
-        <a:srgbClr val="5B9BD5"/>
-      </a:accent5>
-      <a:accent6>
-        <a:srgbClr val="70AD47"/>
-      </a:accent6>
-      <a:hlink>
-        <a:srgbClr val="0563C1"/>
-      </a:hlink>
-      <a:folHlink>
-        <a:srgbClr val="954F72"/>
-      </a:folHlink>
-    </a:clrScheme>
-    <a:fontScheme name="Office">
-      <a:majorFont>
-        <a:latin typeface="Arial"/>
-        <a:ea typeface=""/>
-        <a:cs typeface=""/>
-        <a:font script="Jpan" typeface="ＭＳ Ｐゴシック"/>
-        <a:font script="Hang" typeface="맑은 고딕"/>
-        <a:font script="Hans" typeface="宋体"/>
-        <a:font script="Hant" typeface="新細明體"/>
-        <a:font script="Arab" typeface="Times New Roman"/>
-        <a:font script="Hebr" typeface="Times New Roman"/>
-        <a:font script="Thai" typeface="Angsana New"/>
-        <a:font script="Ethi" typeface="Nyala"/>
-        <a:font script="Beng" typeface="Vrinda"/>
-        <a:font script="Gujr" typeface="Shruti"/>
-        <a:font script="Khmr" typeface="MoolBoran"/>
-        <a:font script="Knda" typeface="Tunga"/>
-        <a:font script="Guru" typeface="Raavi"/>
-        <a:font script="Cans" typeface="Euphemia"/>
-        <a:font script="Cher" typeface="Plantagenet Cherokee"/>
-        <a:font script="Yiii" typeface="Microsoft Yi Baiti"/>
-        <a:font script="Tibt" typeface="Microsoft Himalaya"/>
-        <a:font script="Thaa" typeface="MV Boli"/>
-        <a:font script="Deva" typeface="Mangal"/>
-        <a:font script="Telu" typeface="Gautami"/>
-        <a:font script="Taml" typeface="Latha"/>
-        <a:font script="Syrc" typeface="Estrangelo Edessa"/>
-        <a:font script="Orya" typeface="Kalinga"/>
-        <a:font script="Mlym" typeface="Kartika"/>
-        <a:font script="Laoo" typeface="DokChampa"/>
-        <a:font script="Sinh" typeface="Iskoola Pota"/>
-        <a:font script="Mong" typeface="Mongolian Baiti"/>
-        <a:font script="Viet" typeface="Times New Roman"/>
-        <a:font script="Uigh" typeface="Microsoft Uighur"/>
-        <a:font script="Geor" typeface="Sylfaen"/>
-      </a:majorFont>
-      <a:minorFont>
-        <a:latin typeface="Arial"/>
-        <a:ea typeface=""/>
-        <a:cs typeface=""/>
-        <a:font script="Jpan" typeface="ＭＳ Ｐゴシック"/>
-        <a:font script="Hang" typeface="맑은 고딕"/>
-        <a:font script="Hans" typeface="宋体"/>
-        <a:font script="Hant" typeface="新細明體"/>
-        <a:font script="Arab" typeface="Arial"/>
-        <a:font script="Hebr" typeface="Arial"/>
-        <a:font script="Thai" typeface="Cordia New"/>
-        <a:font script="Ethi" typeface="Nyala"/>
-        <a:font script="Beng" typeface="Vrinda"/>
-        <a:font script="Gujr" typeface="Shruti"/>
-        <a:font script="Khmr" typeface="DaunPenh"/>
-        <a:font script="Knda" typeface="Tunga"/>
-        <a:font script="Guru" typeface="Raavi"/>
-        <a:font script="Cans" typeface="Euphemia"/>
-        <a:font script="Cher" typeface="Plantagenet Cherokee"/>
-        <a:font script="Yiii" typeface="Microsoft Yi Baiti"/>
-        <a:font script="Tibt" typeface="Microsoft Himalaya"/>
-        <a:font script="Thaa" typeface="MV Boli"/>
-        <a:font script="Deva" typeface="Mangal"/>
-        <a:font script="Telu" typeface="Gautami"/>
-        <a:font script="Taml" typeface="Latha"/>
-        <a:font script="Syrc" typeface="Estrangelo Edessa"/>
-        <a:font script="Orya" typeface="Kalinga"/>
-        <a:font script="Mlym" typeface="Kartika"/>
-        <a:font script="Laoo" typeface="DokChampa"/>
-        <a:font script="Sinh" typeface="Iskoola Pota"/>
-        <a:font script="Mong" typeface="Mongolian Baiti"/>
-        <a:font script="Viet" typeface="Arial"/>
-        <a:font script="Uigh" typeface="Microsoft Uighur"/>
-        <a:font script="Geor" typeface="Sylfaen"/>
-      </a:minorFont>
-    </a:fontScheme>
-    <a:fmtScheme name="Office">
-      <a:fillStyleLst>
-        <a:solidFill>
-          <a:schemeClr val="phClr"/>
-        </a:solidFill>
-        <a:gradFill rotWithShape="1">
-          <a:gsLst>
-            <a:gs pos="0">
-              <a:schemeClr val="phClr">
-                <a:tint val="50000"/>
-                <a:satMod val="300000"/>
-              </a:schemeClr>
-            </a:gs>
-            <a:gs pos="35000">
-              <a:schemeClr val="phClr">
-                <a:tint val="37000"/>
-                <a:satMod val="300000"/>
-              </a:schemeClr>
-            </a:gs>
-            <a:gs pos="100000">
-              <a:schemeClr val="phClr">
-                <a:tint val="15000"/>
-                <a:satMod val="350000"/>
-              </a:schemeClr>
-            </a:gs>
-          </a:gsLst>
-          <a:lin ang="16200000" scaled="1"/>
-        </a:gradFill>
-        <a:gradFill rotWithShape="1">
-          <a:gsLst>
-            <a:gs pos="0">
-              <a:schemeClr val="phClr">
-                <a:tint val="100000"/>
-                <a:shade val="100000"/>
-                <a:satMod val="130000"/>
-              </a:schemeClr>
-            </a:gs>
-            <a:gs pos="100000">
-              <a:schemeClr val="phClr">
-                <a:tint val="50000"/>
-                <a:shade val="100000"/>
-                <a:satMod val="350000"/>
-              </a:schemeClr>
-            </a:gs>
-          </a:gsLst>
-          <a:lin ang="16200000" scaled="0"/>
-        </a:gradFill>
-      </a:fillStyleLst>
-      <a:lnStyleLst>
-        <a:ln w="9525" cap="flat" cmpd="sng" algn="ctr">
-          <a:solidFill>
-            <a:schemeClr val="phClr">
-              <a:shade val="95000"/>
-              <a:satMod val="105000"/>
-            </a:schemeClr>
-          </a:solidFill>
-          <a:prstDash val="solid"/>
-        </a:ln>
-        <a:ln w="25400" cap="flat" cmpd="sng" algn="ctr">
-          <a:solidFill>
-            <a:schemeClr val="phClr"/>
-          </a:solidFill>
-          <a:prstDash val="solid"/>
-        </a:ln>
-        <a:ln w="38100" cap="flat" cmpd="sng" algn="ctr">
-          <a:solidFill>
-            <a:schemeClr val="phClr"/>
-          </a:solidFill>
-          <a:prstDash val="solid"/>
-        </a:ln>
-      </a:lnStyleLst>
-      <a:effectStyleLst>
-        <a:effectStyle>
-          <a:effectLst>
-            <a:outerShdw blurRad="40000" dist="20000" dir="5400000" rotWithShape="0">
-              <a:srgbClr val="000000">
-                <a:alpha val="38000"/>
-              </a:srgbClr>
-            </a:outerShdw>
-          </a:effectLst>
-        </a:effectStyle>
-        <a:effectStyle>
-          <a:effectLst>
-            <a:outerShdw blurRad="40000" dist="23000" dir="5400000" rotWithShape="0">
-              <a:srgbClr val="000000">
-                <a:alpha val="35000"/>
-              </a:srgbClr>
-            </a:outerShdw>
-          </a:effectLst>
-        </a:effectStyle>
-        <a:effectStyle>
-          <a:effectLst>
-            <a:outerShdw blurRad="40000" dist="23000" dir="5400000" rotWithShape="0">
-              <a:srgbClr val="000000">
-                <a:alpha val="35000"/>
-              </a:srgbClr>
-            </a:outerShdw>
-          </a:effectLst>
-          <a:scene3d>
-            <a:camera prst="orthographicFront">
-              <a:rot lat="0" lon="0" rev="0"/>
-            </a:camera>
-            <a:lightRig rig="threePt" dir="t">
-              <a:rot lat="0" lon="0" rev="1200000"/>
-            </a:lightRig>
-          </a:scene3d>
-          <a:sp3d>
-            <a:bevelT w="63500" h="25400"/>
-          </a:sp3d>
-        </a:effectStyle>
-      </a:effectStyleLst>
-      <a:bgFillStyleLst>
-        <a:solidFill>
-          <a:schemeClr val="phClr"/>
-        </a:solidFill>
-        <a:gradFill rotWithShape="1">
-          <a:gsLst>
-            <a:gs pos="0">
-              <a:schemeClr val="phClr">
-                <a:tint val="40000"/>
-                <a:satMod val="350000"/>
-              </a:schemeClr>
-            </a:gs>
-            <a:gs pos="40000">
-              <a:schemeClr val="phClr">
-                <a:tint val="45000"/>
-                <a:shade val="99000"/>
-                <a:satMod val="350000"/>
-              </a:schemeClr>
-            </a:gs>
-            <a:gs pos="100000">
-              <a:schemeClr val="phClr">
-                <a:shade val="20000"/>
-                <a:satMod val="255000"/>
-              </a:schemeClr>
-            </a:gs>
-          </a:gsLst>
-          <a:path path="circle">
-            <a:fillToRect l="50000" t="-80000" r="50000" b="180000"/>
-          </a:path>
-        </a:gradFill>
-        <a:gradFill rotWithShape="1">
-          <a:gsLst>
-            <a:gs pos="0">
-              <a:schemeClr val="phClr">
-                <a:tint val="80000"/>
-                <a:satMod val="300000"/>
-              </a:schemeClr>
-            </a:gs>
-            <a:gs pos="100000">
-              <a:schemeClr val="phClr">
-                <a:shade val="30000"/>
-                <a:satMod val="200000"/>
-              </a:schemeClr>
-            </a:gs>
-          </a:gsLst>
-          <a:path path="circle">
-            <a:fillToRect l="50000" t="50000" r="50000" b="50000"/>
-          </a:path>
-        </a:gradFill>
-      </a:bgFillStyleLst>
-    </a:fmtScheme>
-  </a:themeElements>
-</a:theme>
 </file>
</xml_diff>

<commit_message>
added some images  - curse of dimentionality  - DAG  - MR vs Spark
</commit_message>
<xml_diff>
--- a/Lecture/Big Data with Cloud Computing.pptx
+++ b/Lecture/Big Data with Cloud Computing.pptx
@@ -275,7 +275,7 @@
   </p:defaultTextStyle>
   <p:extLst>
     <p:ext uri="http://customooxmlschemas.google.com/">
-      <go:slidesCustomData xmlns:go="http://customooxmlschemas.google.com/" r:id="rId30" roundtripDataSignature="AMtx7mjJNs1BGNvHPrueHVNGnatLYs7Xww=="/>
+      <go:slidesCustomData xmlns:go="http://customooxmlschemas.google.com/" r:id="rId30" roundtripDataSignature="AMtx7mhsxsiLPjKG4sS7p3lMkWDHH9vfzA=="/>
     </p:ext>
   </p:extLst>
 </p:presentation>
@@ -2067,7 +2067,7 @@
   <p:cSld>
     <p:spTree>
       <p:nvGrpSpPr>
-        <p:cNvPr id="216" name="Shape 216"/>
+        <p:cNvPr id="217" name="Shape 217"/>
         <p:cNvGrpSpPr/>
         <p:nvPr/>
       </p:nvGrpSpPr>
@@ -2081,7 +2081,7 @@
       </p:grpSpPr>
       <p:sp>
         <p:nvSpPr>
-          <p:cNvPr id="217" name="Google Shape;217;p13:notes"/>
+          <p:cNvPr id="218" name="Google Shape;218;p13:notes"/>
           <p:cNvSpPr txBox="1"/>
           <p:nvPr>
             <p:ph idx="1" type="body"/>
@@ -2121,7 +2121,7 @@
       </p:sp>
       <p:sp>
         <p:nvSpPr>
-          <p:cNvPr id="218" name="Google Shape;218;p13:notes"/>
+          <p:cNvPr id="219" name="Google Shape;219;p13:notes"/>
           <p:cNvSpPr/>
           <p:nvPr>
             <p:ph idx="2" type="sldImg"/>
@@ -2167,7 +2167,7 @@
   <p:cSld>
     <p:spTree>
       <p:nvGrpSpPr>
-        <p:cNvPr id="222" name="Shape 222"/>
+        <p:cNvPr id="223" name="Shape 223"/>
         <p:cNvGrpSpPr/>
         <p:nvPr/>
       </p:nvGrpSpPr>
@@ -2181,7 +2181,7 @@
       </p:grpSpPr>
       <p:sp>
         <p:nvSpPr>
-          <p:cNvPr id="223" name="Google Shape;223;p14:notes"/>
+          <p:cNvPr id="224" name="Google Shape;224;p14:notes"/>
           <p:cNvSpPr txBox="1"/>
           <p:nvPr>
             <p:ph idx="1" type="body"/>
@@ -2279,7 +2279,7 @@
       </p:sp>
       <p:sp>
         <p:nvSpPr>
-          <p:cNvPr id="224" name="Google Shape;224;p14:notes"/>
+          <p:cNvPr id="225" name="Google Shape;225;p14:notes"/>
           <p:cNvSpPr/>
           <p:nvPr>
             <p:ph idx="2" type="sldImg"/>
@@ -2325,7 +2325,7 @@
   <p:cSld>
     <p:spTree>
       <p:nvGrpSpPr>
-        <p:cNvPr id="229" name="Shape 229"/>
+        <p:cNvPr id="232" name="Shape 232"/>
         <p:cNvGrpSpPr/>
         <p:nvPr/>
       </p:nvGrpSpPr>
@@ -2339,7 +2339,7 @@
       </p:grpSpPr>
       <p:sp>
         <p:nvSpPr>
-          <p:cNvPr id="230" name="Google Shape;230;p15:notes"/>
+          <p:cNvPr id="233" name="Google Shape;233;p15:notes"/>
           <p:cNvSpPr txBox="1"/>
           <p:nvPr>
             <p:ph idx="1" type="body"/>
@@ -2389,7 +2389,7 @@
       </p:sp>
       <p:sp>
         <p:nvSpPr>
-          <p:cNvPr id="231" name="Google Shape;231;p15:notes"/>
+          <p:cNvPr id="234" name="Google Shape;234;p15:notes"/>
           <p:cNvSpPr/>
           <p:nvPr>
             <p:ph idx="2" type="sldImg"/>
@@ -2435,7 +2435,7 @@
   <p:cSld>
     <p:spTree>
       <p:nvGrpSpPr>
-        <p:cNvPr id="235" name="Shape 235"/>
+        <p:cNvPr id="238" name="Shape 238"/>
         <p:cNvGrpSpPr/>
         <p:nvPr/>
       </p:nvGrpSpPr>
@@ -2449,7 +2449,7 @@
       </p:grpSpPr>
       <p:sp>
         <p:nvSpPr>
-          <p:cNvPr id="236" name="Google Shape;236;g73383c9d6c_0_8:notes"/>
+          <p:cNvPr id="239" name="Google Shape;239;g73383c9d6c_0_8:notes"/>
           <p:cNvSpPr/>
           <p:nvPr>
             <p:ph idx="2" type="sldImg"/>
@@ -2484,7 +2484,7 @@
       </p:sp>
       <p:sp>
         <p:nvSpPr>
-          <p:cNvPr id="237" name="Google Shape;237;g73383c9d6c_0_8:notes"/>
+          <p:cNvPr id="240" name="Google Shape;240;g73383c9d6c_0_8:notes"/>
           <p:cNvSpPr txBox="1"/>
           <p:nvPr>
             <p:ph idx="1" type="body"/>
@@ -2523,7 +2523,7 @@
       </p:sp>
       <p:sp>
         <p:nvSpPr>
-          <p:cNvPr id="238" name="Google Shape;238;g73383c9d6c_0_8:notes"/>
+          <p:cNvPr id="241" name="Google Shape;241;g73383c9d6c_0_8:notes"/>
           <p:cNvSpPr txBox="1"/>
           <p:nvPr>
             <p:ph idx="12" type="sldNum"/>
@@ -20448,11 +20448,175 @@
           </a:p>
         </p:txBody>
       </p:sp>
+      <p:pic>
+        <p:nvPicPr>
+          <p:cNvPr id="216" name="Google Shape;216;p12"/>
+          <p:cNvPicPr preferRelativeResize="0"/>
+          <p:nvPr/>
+        </p:nvPicPr>
+        <p:blipFill>
+          <a:blip r:embed="rId3">
+            <a:alphaModFix/>
+          </a:blip>
+          <a:stretch>
+            <a:fillRect/>
+          </a:stretch>
+        </p:blipFill>
+        <p:spPr>
+          <a:xfrm>
+            <a:off x="2089150" y="1853750"/>
+            <a:ext cx="7478574" cy="2972250"/>
+          </a:xfrm>
+          <a:prstGeom prst="rect">
+            <a:avLst/>
+          </a:prstGeom>
+          <a:noFill/>
+          <a:ln>
+            <a:noFill/>
+          </a:ln>
+        </p:spPr>
+      </p:pic>
     </p:spTree>
   </p:cSld>
   <p:clrMapOvr>
     <a:masterClrMapping/>
   </p:clrMapOvr>
+  <p:timing>
+    <p:tnLst>
+      <p:par>
+        <p:cTn dur="indefinite" nodeType="tmRoot" restart="never">
+          <p:childTnLst>
+            <p:seq concurrent="1" nextAc="seek">
+              <p:cTn dur="indefinite" id="2" nodeType="mainSeq">
+                <p:childTnLst>
+                  <p:par>
+                    <p:cTn fill="hold">
+                      <p:stCondLst>
+                        <p:cond delay="indefinite"/>
+                      </p:stCondLst>
+                      <p:childTnLst>
+                        <p:par>
+                          <p:cTn fill="hold">
+                            <p:stCondLst>
+                              <p:cond delay="0"/>
+                            </p:stCondLst>
+                            <p:childTnLst>
+                              <p:par>
+                                <p:cTn fill="hold" nodeType="clickEffect" presetClass="entr" presetID="10" presetSubtype="0">
+                                  <p:stCondLst>
+                                    <p:cond delay="0"/>
+                                  </p:stCondLst>
+                                  <p:childTnLst>
+                                    <p:set>
+                                      <p:cBhvr>
+                                        <p:cTn dur="1" fill="hold">
+                                          <p:stCondLst>
+                                            <p:cond delay="0"/>
+                                          </p:stCondLst>
+                                        </p:cTn>
+                                        <p:tgtEl>
+                                          <p:spTgt spid="216"/>
+                                        </p:tgtEl>
+                                        <p:attrNameLst>
+                                          <p:attrName>style.visibility</p:attrName>
+                                        </p:attrNameLst>
+                                      </p:cBhvr>
+                                      <p:to>
+                                        <p:strVal val="visible"/>
+                                      </p:to>
+                                    </p:set>
+                                    <p:animEffect filter="fade" transition="in">
+                                      <p:cBhvr>
+                                        <p:cTn dur="1000"/>
+                                        <p:tgtEl>
+                                          <p:spTgt spid="216"/>
+                                        </p:tgtEl>
+                                      </p:cBhvr>
+                                    </p:animEffect>
+                                  </p:childTnLst>
+                                </p:cTn>
+                              </p:par>
+                            </p:childTnLst>
+                          </p:cTn>
+                        </p:par>
+                      </p:childTnLst>
+                    </p:cTn>
+                  </p:par>
+                  <p:par>
+                    <p:cTn fill="hold">
+                      <p:stCondLst>
+                        <p:cond delay="indefinite"/>
+                      </p:stCondLst>
+                      <p:childTnLst>
+                        <p:par>
+                          <p:cTn fill="hold">
+                            <p:stCondLst>
+                              <p:cond delay="0"/>
+                            </p:stCondLst>
+                            <p:childTnLst>
+                              <p:par>
+                                <p:cTn fill="hold" nodeType="clickEffect" presetClass="exit" presetID="10" presetSubtype="0">
+                                  <p:stCondLst>
+                                    <p:cond delay="0"/>
+                                  </p:stCondLst>
+                                  <p:childTnLst>
+                                    <p:animEffect filter="fade" transition="out">
+                                      <p:cBhvr>
+                                        <p:cTn dur="1000"/>
+                                        <p:tgtEl>
+                                          <p:spTgt spid="216"/>
+                                        </p:tgtEl>
+                                      </p:cBhvr>
+                                    </p:animEffect>
+                                    <p:set>
+                                      <p:cBhvr>
+                                        <p:cTn dur="1" fill="hold">
+                                          <p:stCondLst>
+                                            <p:cond delay="1000"/>
+                                          </p:stCondLst>
+                                        </p:cTn>
+                                        <p:tgtEl>
+                                          <p:spTgt spid="216"/>
+                                        </p:tgtEl>
+                                        <p:attrNameLst>
+                                          <p:attrName>style.visibility</p:attrName>
+                                        </p:attrNameLst>
+                                      </p:cBhvr>
+                                      <p:to>
+                                        <p:strVal val="hidden"/>
+                                      </p:to>
+                                    </p:set>
+                                  </p:childTnLst>
+                                </p:cTn>
+                              </p:par>
+                            </p:childTnLst>
+                          </p:cTn>
+                        </p:par>
+                      </p:childTnLst>
+                    </p:cTn>
+                  </p:par>
+                </p:childTnLst>
+              </p:cTn>
+              <p:prevCondLst>
+                <p:cond evt="onPrev">
+                  <p:tgtEl>
+                    <p:sldTgt/>
+                  </p:tgtEl>
+                </p:cond>
+              </p:prevCondLst>
+              <p:nextCondLst>
+                <p:cond evt="onNext">
+                  <p:tgtEl>
+                    <p:sldTgt/>
+                  </p:tgtEl>
+                </p:cond>
+              </p:nextCondLst>
+            </p:seq>
+          </p:childTnLst>
+        </p:cTn>
+      </p:par>
+    </p:tnLst>
+  </p:timing>
 </p:sld>
 </file>
 
@@ -20461,7 +20625,7 @@
   <p:cSld>
     <p:spTree>
       <p:nvGrpSpPr>
-        <p:cNvPr id="219" name="Shape 219"/>
+        <p:cNvPr id="220" name="Shape 220"/>
         <p:cNvGrpSpPr/>
         <p:nvPr/>
       </p:nvGrpSpPr>
@@ -20475,7 +20639,7 @@
       </p:grpSpPr>
       <p:sp>
         <p:nvSpPr>
-          <p:cNvPr id="220" name="Google Shape;220;p13"/>
+          <p:cNvPr id="221" name="Google Shape;221;p13"/>
           <p:cNvSpPr txBox="1"/>
           <p:nvPr>
             <p:ph type="title"/>
@@ -20527,7 +20691,7 @@
       </p:sp>
       <p:sp>
         <p:nvSpPr>
-          <p:cNvPr id="221" name="Google Shape;221;p13"/>
+          <p:cNvPr id="222" name="Google Shape;222;p13"/>
           <p:cNvSpPr txBox="1"/>
           <p:nvPr>
             <p:ph idx="1" type="body"/>
@@ -20726,7 +20890,7 @@
   <p:cSld>
     <p:spTree>
       <p:nvGrpSpPr>
-        <p:cNvPr id="225" name="Shape 225"/>
+        <p:cNvPr id="226" name="Shape 226"/>
         <p:cNvGrpSpPr/>
         <p:nvPr/>
       </p:nvGrpSpPr>
@@ -20740,7 +20904,7 @@
       </p:grpSpPr>
       <p:sp>
         <p:nvSpPr>
-          <p:cNvPr id="226" name="Google Shape;226;p14"/>
+          <p:cNvPr id="227" name="Google Shape;227;p14"/>
           <p:cNvSpPr txBox="1"/>
           <p:nvPr>
             <p:ph type="title"/>
@@ -20792,7 +20956,7 @@
       </p:sp>
       <p:pic>
         <p:nvPicPr>
-          <p:cNvPr id="227" name="Google Shape;227;p14"/>
+          <p:cNvPr id="228" name="Google Shape;228;p14"/>
           <p:cNvPicPr preferRelativeResize="0"/>
           <p:nvPr/>
         </p:nvPicPr>
@@ -20820,7 +20984,7 @@
       </p:pic>
       <p:sp>
         <p:nvSpPr>
-          <p:cNvPr id="228" name="Google Shape;228;p14"/>
+          <p:cNvPr id="229" name="Google Shape;229;p14"/>
           <p:cNvSpPr txBox="1"/>
           <p:nvPr>
             <p:ph idx="1" type="body"/>
@@ -21054,11 +21218,309 @@
           </a:p>
         </p:txBody>
       </p:sp>
+      <p:pic>
+        <p:nvPicPr>
+          <p:cNvPr id="230" name="Google Shape;230;p14"/>
+          <p:cNvPicPr preferRelativeResize="0"/>
+          <p:nvPr/>
+        </p:nvPicPr>
+        <p:blipFill>
+          <a:blip r:embed="rId4">
+            <a:alphaModFix/>
+          </a:blip>
+          <a:stretch>
+            <a:fillRect/>
+          </a:stretch>
+        </p:blipFill>
+        <p:spPr>
+          <a:xfrm>
+            <a:off x="3233050" y="716075"/>
+            <a:ext cx="5124450" cy="4486275"/>
+          </a:xfrm>
+          <a:prstGeom prst="rect">
+            <a:avLst/>
+          </a:prstGeom>
+          <a:noFill/>
+          <a:ln>
+            <a:noFill/>
+          </a:ln>
+        </p:spPr>
+      </p:pic>
+      <p:pic>
+        <p:nvPicPr>
+          <p:cNvPr id="231" name="Google Shape;231;p14"/>
+          <p:cNvPicPr preferRelativeResize="0"/>
+          <p:nvPr/>
+        </p:nvPicPr>
+        <p:blipFill>
+          <a:blip r:embed="rId5">
+            <a:alphaModFix/>
+          </a:blip>
+          <a:stretch>
+            <a:fillRect/>
+          </a:stretch>
+        </p:blipFill>
+        <p:spPr>
+          <a:xfrm>
+            <a:off x="2814638" y="1933575"/>
+            <a:ext cx="6562725" cy="2990850"/>
+          </a:xfrm>
+          <a:prstGeom prst="rect">
+            <a:avLst/>
+          </a:prstGeom>
+          <a:noFill/>
+          <a:ln>
+            <a:noFill/>
+          </a:ln>
+        </p:spPr>
+      </p:pic>
     </p:spTree>
   </p:cSld>
   <p:clrMapOvr>
     <a:masterClrMapping/>
   </p:clrMapOvr>
+  <p:timing>
+    <p:tnLst>
+      <p:par>
+        <p:cTn dur="indefinite" nodeType="tmRoot" restart="never">
+          <p:childTnLst>
+            <p:seq concurrent="1" nextAc="seek">
+              <p:cTn dur="indefinite" id="2" nodeType="mainSeq">
+                <p:childTnLst>
+                  <p:par>
+                    <p:cTn fill="hold">
+                      <p:stCondLst>
+                        <p:cond delay="indefinite"/>
+                      </p:stCondLst>
+                      <p:childTnLst>
+                        <p:par>
+                          <p:cTn fill="hold">
+                            <p:stCondLst>
+                              <p:cond delay="0"/>
+                            </p:stCondLst>
+                            <p:childTnLst>
+                              <p:par>
+                                <p:cTn fill="hold" nodeType="clickEffect" presetClass="entr" presetID="10" presetSubtype="0">
+                                  <p:stCondLst>
+                                    <p:cond delay="0"/>
+                                  </p:stCondLst>
+                                  <p:childTnLst>
+                                    <p:set>
+                                      <p:cBhvr>
+                                        <p:cTn dur="1" fill="hold">
+                                          <p:stCondLst>
+                                            <p:cond delay="0"/>
+                                          </p:stCondLst>
+                                        </p:cTn>
+                                        <p:tgtEl>
+                                          <p:spTgt spid="230"/>
+                                        </p:tgtEl>
+                                        <p:attrNameLst>
+                                          <p:attrName>style.visibility</p:attrName>
+                                        </p:attrNameLst>
+                                      </p:cBhvr>
+                                      <p:to>
+                                        <p:strVal val="visible"/>
+                                      </p:to>
+                                    </p:set>
+                                    <p:animEffect filter="fade" transition="in">
+                                      <p:cBhvr>
+                                        <p:cTn dur="1000"/>
+                                        <p:tgtEl>
+                                          <p:spTgt spid="230"/>
+                                        </p:tgtEl>
+                                      </p:cBhvr>
+                                    </p:animEffect>
+                                  </p:childTnLst>
+                                </p:cTn>
+                              </p:par>
+                            </p:childTnLst>
+                          </p:cTn>
+                        </p:par>
+                      </p:childTnLst>
+                    </p:cTn>
+                  </p:par>
+                  <p:par>
+                    <p:cTn fill="hold">
+                      <p:stCondLst>
+                        <p:cond delay="indefinite"/>
+                      </p:stCondLst>
+                      <p:childTnLst>
+                        <p:par>
+                          <p:cTn fill="hold">
+                            <p:stCondLst>
+                              <p:cond delay="0"/>
+                            </p:stCondLst>
+                            <p:childTnLst>
+                              <p:par>
+                                <p:cTn fill="hold" nodeType="clickEffect" presetClass="exit" presetID="10" presetSubtype="0">
+                                  <p:stCondLst>
+                                    <p:cond delay="0"/>
+                                  </p:stCondLst>
+                                  <p:childTnLst>
+                                    <p:animEffect filter="fade" transition="out">
+                                      <p:cBhvr>
+                                        <p:cTn dur="1000"/>
+                                        <p:tgtEl>
+                                          <p:spTgt spid="230"/>
+                                        </p:tgtEl>
+                                      </p:cBhvr>
+                                    </p:animEffect>
+                                    <p:set>
+                                      <p:cBhvr>
+                                        <p:cTn dur="1" fill="hold">
+                                          <p:stCondLst>
+                                            <p:cond delay="1000"/>
+                                          </p:stCondLst>
+                                        </p:cTn>
+                                        <p:tgtEl>
+                                          <p:spTgt spid="230"/>
+                                        </p:tgtEl>
+                                        <p:attrNameLst>
+                                          <p:attrName>style.visibility</p:attrName>
+                                        </p:attrNameLst>
+                                      </p:cBhvr>
+                                      <p:to>
+                                        <p:strVal val="hidden"/>
+                                      </p:to>
+                                    </p:set>
+                                  </p:childTnLst>
+                                </p:cTn>
+                              </p:par>
+                            </p:childTnLst>
+                          </p:cTn>
+                        </p:par>
+                      </p:childTnLst>
+                    </p:cTn>
+                  </p:par>
+                  <p:par>
+                    <p:cTn fill="hold">
+                      <p:stCondLst>
+                        <p:cond delay="indefinite"/>
+                      </p:stCondLst>
+                      <p:childTnLst>
+                        <p:par>
+                          <p:cTn fill="hold">
+                            <p:stCondLst>
+                              <p:cond delay="0"/>
+                            </p:stCondLst>
+                            <p:childTnLst>
+                              <p:par>
+                                <p:cTn fill="hold" nodeType="clickEffect" presetClass="entr" presetID="10" presetSubtype="0">
+                                  <p:stCondLst>
+                                    <p:cond delay="0"/>
+                                  </p:stCondLst>
+                                  <p:childTnLst>
+                                    <p:set>
+                                      <p:cBhvr>
+                                        <p:cTn dur="1" fill="hold">
+                                          <p:stCondLst>
+                                            <p:cond delay="0"/>
+                                          </p:stCondLst>
+                                        </p:cTn>
+                                        <p:tgtEl>
+                                          <p:spTgt spid="231"/>
+                                        </p:tgtEl>
+                                        <p:attrNameLst>
+                                          <p:attrName>style.visibility</p:attrName>
+                                        </p:attrNameLst>
+                                      </p:cBhvr>
+                                      <p:to>
+                                        <p:strVal val="visible"/>
+                                      </p:to>
+                                    </p:set>
+                                    <p:animEffect filter="fade" transition="in">
+                                      <p:cBhvr>
+                                        <p:cTn dur="1000"/>
+                                        <p:tgtEl>
+                                          <p:spTgt spid="231"/>
+                                        </p:tgtEl>
+                                      </p:cBhvr>
+                                    </p:animEffect>
+                                  </p:childTnLst>
+                                </p:cTn>
+                              </p:par>
+                            </p:childTnLst>
+                          </p:cTn>
+                        </p:par>
+                      </p:childTnLst>
+                    </p:cTn>
+                  </p:par>
+                  <p:par>
+                    <p:cTn fill="hold">
+                      <p:stCondLst>
+                        <p:cond delay="indefinite"/>
+                      </p:stCondLst>
+                      <p:childTnLst>
+                        <p:par>
+                          <p:cTn fill="hold">
+                            <p:stCondLst>
+                              <p:cond delay="0"/>
+                            </p:stCondLst>
+                            <p:childTnLst>
+                              <p:par>
+                                <p:cTn fill="hold" nodeType="clickEffect" presetClass="exit" presetID="10" presetSubtype="0">
+                                  <p:stCondLst>
+                                    <p:cond delay="0"/>
+                                  </p:stCondLst>
+                                  <p:childTnLst>
+                                    <p:animEffect filter="fade" transition="out">
+                                      <p:cBhvr>
+                                        <p:cTn dur="1000"/>
+                                        <p:tgtEl>
+                                          <p:spTgt spid="231"/>
+                                        </p:tgtEl>
+                                      </p:cBhvr>
+                                    </p:animEffect>
+                                    <p:set>
+                                      <p:cBhvr>
+                                        <p:cTn dur="1" fill="hold">
+                                          <p:stCondLst>
+                                            <p:cond delay="1000"/>
+                                          </p:stCondLst>
+                                        </p:cTn>
+                                        <p:tgtEl>
+                                          <p:spTgt spid="231"/>
+                                        </p:tgtEl>
+                                        <p:attrNameLst>
+                                          <p:attrName>style.visibility</p:attrName>
+                                        </p:attrNameLst>
+                                      </p:cBhvr>
+                                      <p:to>
+                                        <p:strVal val="hidden"/>
+                                      </p:to>
+                                    </p:set>
+                                  </p:childTnLst>
+                                </p:cTn>
+                              </p:par>
+                            </p:childTnLst>
+                          </p:cTn>
+                        </p:par>
+                      </p:childTnLst>
+                    </p:cTn>
+                  </p:par>
+                </p:childTnLst>
+              </p:cTn>
+              <p:prevCondLst>
+                <p:cond evt="onPrev">
+                  <p:tgtEl>
+                    <p:sldTgt/>
+                  </p:tgtEl>
+                </p:cond>
+              </p:prevCondLst>
+              <p:nextCondLst>
+                <p:cond evt="onNext">
+                  <p:tgtEl>
+                    <p:sldTgt/>
+                  </p:tgtEl>
+                </p:cond>
+              </p:nextCondLst>
+            </p:seq>
+          </p:childTnLst>
+        </p:cTn>
+      </p:par>
+    </p:tnLst>
+  </p:timing>
 </p:sld>
 </file>
 
@@ -21067,7 +21529,7 @@
   <p:cSld>
     <p:spTree>
       <p:nvGrpSpPr>
-        <p:cNvPr id="232" name="Shape 232"/>
+        <p:cNvPr id="235" name="Shape 235"/>
         <p:cNvGrpSpPr/>
         <p:nvPr/>
       </p:nvGrpSpPr>
@@ -21081,7 +21543,7 @@
       </p:grpSpPr>
       <p:sp>
         <p:nvSpPr>
-          <p:cNvPr id="233" name="Google Shape;233;p15"/>
+          <p:cNvPr id="236" name="Google Shape;236;p15"/>
           <p:cNvSpPr txBox="1"/>
           <p:nvPr>
             <p:ph type="title"/>
@@ -21133,7 +21595,7 @@
       </p:sp>
       <p:sp>
         <p:nvSpPr>
-          <p:cNvPr id="234" name="Google Shape;234;p15"/>
+          <p:cNvPr id="237" name="Google Shape;237;p15"/>
           <p:cNvSpPr txBox="1"/>
           <p:nvPr>
             <p:ph idx="1" type="body"/>
@@ -21256,7 +21718,7 @@
   <p:cSld>
     <p:spTree>
       <p:nvGrpSpPr>
-        <p:cNvPr id="239" name="Shape 239"/>
+        <p:cNvPr id="242" name="Shape 242"/>
         <p:cNvGrpSpPr/>
         <p:nvPr/>
       </p:nvGrpSpPr>
@@ -21270,7 +21732,7 @@
       </p:grpSpPr>
       <p:sp>
         <p:nvSpPr>
-          <p:cNvPr id="240" name="Google Shape;240;g73383c9d6c_0_8"/>
+          <p:cNvPr id="243" name="Google Shape;243;g73383c9d6c_0_8"/>
           <p:cNvSpPr txBox="1"/>
           <p:nvPr>
             <p:ph type="ctrTitle"/>
@@ -23636,6 +24098,285 @@
 </file>
 
 <file path=ppt/theme/theme2.xml><?xml version="1.0" encoding="utf-8"?>
+<a:theme xmlns:a="http://schemas.openxmlformats.org/drawingml/2006/main" xmlns:r="http://schemas.openxmlformats.org/officeDocument/2006/relationships" name="SavonVTI">
+  <a:themeElements>
+    <a:clrScheme name="AnalogousFromRegularSeed_2SEEDS">
+      <a:dk1>
+        <a:srgbClr val="000000"/>
+      </a:dk1>
+      <a:lt1>
+        <a:srgbClr val="FFFFFF"/>
+      </a:lt1>
+      <a:dk2>
+        <a:srgbClr val="24412B"/>
+      </a:dk2>
+      <a:lt2>
+        <a:srgbClr val="E2E8E6"/>
+      </a:lt2>
+      <a:accent1>
+        <a:srgbClr val="B6395D"/>
+      </a:accent1>
+      <a:accent2>
+        <a:srgbClr val="C749A2"/>
+      </a:accent2>
+      <a:accent3>
+        <a:srgbClr val="C75949"/>
+      </a:accent3>
+      <a:accent4>
+        <a:srgbClr val="37B542"/>
+      </a:accent4>
+      <a:accent5>
+        <a:srgbClr val="43B87F"/>
+      </a:accent5>
+      <a:accent6>
+        <a:srgbClr val="37B5AC"/>
+      </a:accent6>
+      <a:hlink>
+        <a:srgbClr val="319377"/>
+      </a:hlink>
+      <a:folHlink>
+        <a:srgbClr val="848484"/>
+      </a:folHlink>
+    </a:clrScheme>
+    <a:fontScheme name="Office">
+      <a:majorFont>
+        <a:latin typeface="Arial"/>
+        <a:ea typeface=""/>
+        <a:cs typeface=""/>
+        <a:font script="Jpan" typeface="ＭＳ Ｐゴシック"/>
+        <a:font script="Hang" typeface="맑은 고딕"/>
+        <a:font script="Hans" typeface="宋体"/>
+        <a:font script="Hant" typeface="新細明體"/>
+        <a:font script="Arab" typeface="Times New Roman"/>
+        <a:font script="Hebr" typeface="Times New Roman"/>
+        <a:font script="Thai" typeface="Angsana New"/>
+        <a:font script="Ethi" typeface="Nyala"/>
+        <a:font script="Beng" typeface="Vrinda"/>
+        <a:font script="Gujr" typeface="Shruti"/>
+        <a:font script="Khmr" typeface="MoolBoran"/>
+        <a:font script="Knda" typeface="Tunga"/>
+        <a:font script="Guru" typeface="Raavi"/>
+        <a:font script="Cans" typeface="Euphemia"/>
+        <a:font script="Cher" typeface="Plantagenet Cherokee"/>
+        <a:font script="Yiii" typeface="Microsoft Yi Baiti"/>
+        <a:font script="Tibt" typeface="Microsoft Himalaya"/>
+        <a:font script="Thaa" typeface="MV Boli"/>
+        <a:font script="Deva" typeface="Mangal"/>
+        <a:font script="Telu" typeface="Gautami"/>
+        <a:font script="Taml" typeface="Latha"/>
+        <a:font script="Syrc" typeface="Estrangelo Edessa"/>
+        <a:font script="Orya" typeface="Kalinga"/>
+        <a:font script="Mlym" typeface="Kartika"/>
+        <a:font script="Laoo" typeface="DokChampa"/>
+        <a:font script="Sinh" typeface="Iskoola Pota"/>
+        <a:font script="Mong" typeface="Mongolian Baiti"/>
+        <a:font script="Viet" typeface="Times New Roman"/>
+        <a:font script="Uigh" typeface="Microsoft Uighur"/>
+        <a:font script="Geor" typeface="Sylfaen"/>
+      </a:majorFont>
+      <a:minorFont>
+        <a:latin typeface="Arial"/>
+        <a:ea typeface=""/>
+        <a:cs typeface=""/>
+        <a:font script="Jpan" typeface="ＭＳ Ｐゴシック"/>
+        <a:font script="Hang" typeface="맑은 고딕"/>
+        <a:font script="Hans" typeface="宋体"/>
+        <a:font script="Hant" typeface="新細明體"/>
+        <a:font script="Arab" typeface="Arial"/>
+        <a:font script="Hebr" typeface="Arial"/>
+        <a:font script="Thai" typeface="Cordia New"/>
+        <a:font script="Ethi" typeface="Nyala"/>
+        <a:font script="Beng" typeface="Vrinda"/>
+        <a:font script="Gujr" typeface="Shruti"/>
+        <a:font script="Khmr" typeface="DaunPenh"/>
+        <a:font script="Knda" typeface="Tunga"/>
+        <a:font script="Guru" typeface="Raavi"/>
+        <a:font script="Cans" typeface="Euphemia"/>
+        <a:font script="Cher" typeface="Plantagenet Cherokee"/>
+        <a:font script="Yiii" typeface="Microsoft Yi Baiti"/>
+        <a:font script="Tibt" typeface="Microsoft Himalaya"/>
+        <a:font script="Thaa" typeface="MV Boli"/>
+        <a:font script="Deva" typeface="Mangal"/>
+        <a:font script="Telu" typeface="Gautami"/>
+        <a:font script="Taml" typeface="Latha"/>
+        <a:font script="Syrc" typeface="Estrangelo Edessa"/>
+        <a:font script="Orya" typeface="Kalinga"/>
+        <a:font script="Mlym" typeface="Kartika"/>
+        <a:font script="Laoo" typeface="DokChampa"/>
+        <a:font script="Sinh" typeface="Iskoola Pota"/>
+        <a:font script="Mong" typeface="Mongolian Baiti"/>
+        <a:font script="Viet" typeface="Arial"/>
+        <a:font script="Uigh" typeface="Microsoft Uighur"/>
+        <a:font script="Geor" typeface="Sylfaen"/>
+      </a:minorFont>
+    </a:fontScheme>
+    <a:fmtScheme name="Office">
+      <a:fillStyleLst>
+        <a:solidFill>
+          <a:schemeClr val="phClr"/>
+        </a:solidFill>
+        <a:gradFill rotWithShape="1">
+          <a:gsLst>
+            <a:gs pos="0">
+              <a:schemeClr val="phClr">
+                <a:tint val="50000"/>
+                <a:satMod val="300000"/>
+              </a:schemeClr>
+            </a:gs>
+            <a:gs pos="35000">
+              <a:schemeClr val="phClr">
+                <a:tint val="37000"/>
+                <a:satMod val="300000"/>
+              </a:schemeClr>
+            </a:gs>
+            <a:gs pos="100000">
+              <a:schemeClr val="phClr">
+                <a:tint val="15000"/>
+                <a:satMod val="350000"/>
+              </a:schemeClr>
+            </a:gs>
+          </a:gsLst>
+          <a:lin ang="16200000" scaled="1"/>
+        </a:gradFill>
+        <a:gradFill rotWithShape="1">
+          <a:gsLst>
+            <a:gs pos="0">
+              <a:schemeClr val="phClr">
+                <a:tint val="100000"/>
+                <a:shade val="100000"/>
+                <a:satMod val="130000"/>
+              </a:schemeClr>
+            </a:gs>
+            <a:gs pos="100000">
+              <a:schemeClr val="phClr">
+                <a:tint val="50000"/>
+                <a:shade val="100000"/>
+                <a:satMod val="350000"/>
+              </a:schemeClr>
+            </a:gs>
+          </a:gsLst>
+          <a:lin ang="16200000" scaled="0"/>
+        </a:gradFill>
+      </a:fillStyleLst>
+      <a:lnStyleLst>
+        <a:ln w="9525" cap="flat" cmpd="sng" algn="ctr">
+          <a:solidFill>
+            <a:schemeClr val="phClr">
+              <a:shade val="95000"/>
+              <a:satMod val="105000"/>
+            </a:schemeClr>
+          </a:solidFill>
+          <a:prstDash val="solid"/>
+        </a:ln>
+        <a:ln w="25400" cap="flat" cmpd="sng" algn="ctr">
+          <a:solidFill>
+            <a:schemeClr val="phClr"/>
+          </a:solidFill>
+          <a:prstDash val="solid"/>
+        </a:ln>
+        <a:ln w="38100" cap="flat" cmpd="sng" algn="ctr">
+          <a:solidFill>
+            <a:schemeClr val="phClr"/>
+          </a:solidFill>
+          <a:prstDash val="solid"/>
+        </a:ln>
+      </a:lnStyleLst>
+      <a:effectStyleLst>
+        <a:effectStyle>
+          <a:effectLst>
+            <a:outerShdw blurRad="40000" dist="20000" dir="5400000" rotWithShape="0">
+              <a:srgbClr val="000000">
+                <a:alpha val="38000"/>
+              </a:srgbClr>
+            </a:outerShdw>
+          </a:effectLst>
+        </a:effectStyle>
+        <a:effectStyle>
+          <a:effectLst>
+            <a:outerShdw blurRad="40000" dist="23000" dir="5400000" rotWithShape="0">
+              <a:srgbClr val="000000">
+                <a:alpha val="35000"/>
+              </a:srgbClr>
+            </a:outerShdw>
+          </a:effectLst>
+        </a:effectStyle>
+        <a:effectStyle>
+          <a:effectLst>
+            <a:outerShdw blurRad="40000" dist="23000" dir="5400000" rotWithShape="0">
+              <a:srgbClr val="000000">
+                <a:alpha val="35000"/>
+              </a:srgbClr>
+            </a:outerShdw>
+          </a:effectLst>
+          <a:scene3d>
+            <a:camera prst="orthographicFront">
+              <a:rot lat="0" lon="0" rev="0"/>
+            </a:camera>
+            <a:lightRig rig="threePt" dir="t">
+              <a:rot lat="0" lon="0" rev="1200000"/>
+            </a:lightRig>
+          </a:scene3d>
+          <a:sp3d>
+            <a:bevelT w="63500" h="25400"/>
+          </a:sp3d>
+        </a:effectStyle>
+      </a:effectStyleLst>
+      <a:bgFillStyleLst>
+        <a:solidFill>
+          <a:schemeClr val="phClr"/>
+        </a:solidFill>
+        <a:gradFill rotWithShape="1">
+          <a:gsLst>
+            <a:gs pos="0">
+              <a:schemeClr val="phClr">
+                <a:tint val="40000"/>
+                <a:satMod val="350000"/>
+              </a:schemeClr>
+            </a:gs>
+            <a:gs pos="40000">
+              <a:schemeClr val="phClr">
+                <a:tint val="45000"/>
+                <a:shade val="99000"/>
+                <a:satMod val="350000"/>
+              </a:schemeClr>
+            </a:gs>
+            <a:gs pos="100000">
+              <a:schemeClr val="phClr">
+                <a:shade val="20000"/>
+                <a:satMod val="255000"/>
+              </a:schemeClr>
+            </a:gs>
+          </a:gsLst>
+          <a:path path="circle">
+            <a:fillToRect l="50000" t="-80000" r="50000" b="180000"/>
+          </a:path>
+        </a:gradFill>
+        <a:gradFill rotWithShape="1">
+          <a:gsLst>
+            <a:gs pos="0">
+              <a:schemeClr val="phClr">
+                <a:tint val="80000"/>
+                <a:satMod val="300000"/>
+              </a:schemeClr>
+            </a:gs>
+            <a:gs pos="100000">
+              <a:schemeClr val="phClr">
+                <a:shade val="30000"/>
+                <a:satMod val="200000"/>
+              </a:schemeClr>
+            </a:gs>
+          </a:gsLst>
+          <a:path path="circle">
+            <a:fillToRect l="50000" t="50000" r="50000" b="50000"/>
+          </a:path>
+        </a:gradFill>
+      </a:bgFillStyleLst>
+    </a:fmtScheme>
+  </a:themeElements>
+</a:theme>
+</file>
+
+<file path=ppt/theme/theme3.xml><?xml version="1.0" encoding="utf-8"?>
 <a:theme xmlns:a="http://schemas.openxmlformats.org/drawingml/2006/main" xmlns:r="http://schemas.openxmlformats.org/officeDocument/2006/relationships" name="Office Theme">
   <a:themeElements>
     <a:clrScheme name="Office">
@@ -23912,283 +24653,4 @@
     </a:fmtScheme>
   </a:themeElements>
 </a:theme>
-</file>
-
-<file path=ppt/theme/theme3.xml><?xml version="1.0" encoding="utf-8"?>
-<a:theme xmlns:a="http://schemas.openxmlformats.org/drawingml/2006/main" xmlns:r="http://schemas.openxmlformats.org/officeDocument/2006/relationships" name="SavonVTI">
-  <a:themeElements>
-    <a:clrScheme name="AnalogousFromRegularSeed_2SEEDS">
-      <a:dk1>
-        <a:srgbClr val="000000"/>
-      </a:dk1>
-      <a:lt1>
-        <a:srgbClr val="FFFFFF"/>
-      </a:lt1>
-      <a:dk2>
-        <a:srgbClr val="24412B"/>
-      </a:dk2>
-      <a:lt2>
-        <a:srgbClr val="E2E8E6"/>
-      </a:lt2>
-      <a:accent1>
-        <a:srgbClr val="B6395D"/>
-      </a:accent1>
-      <a:accent2>
-        <a:srgbClr val="C749A2"/>
-      </a:accent2>
-      <a:accent3>
-        <a:srgbClr val="C75949"/>
-      </a:accent3>
-      <a:accent4>
-        <a:srgbClr val="37B542"/>
-      </a:accent4>
-      <a:accent5>
-        <a:srgbClr val="43B87F"/>
-      </a:accent5>
-      <a:accent6>
-        <a:srgbClr val="37B5AC"/>
-      </a:accent6>
-      <a:hlink>
-        <a:srgbClr val="319377"/>
-      </a:hlink>
-      <a:folHlink>
-        <a:srgbClr val="848484"/>
-      </a:folHlink>
-    </a:clrScheme>
-    <a:fontScheme name="Office">
-      <a:majorFont>
-        <a:latin typeface="Arial"/>
-        <a:ea typeface=""/>
-        <a:cs typeface=""/>
-        <a:font script="Jpan" typeface="ＭＳ Ｐゴシック"/>
-        <a:font script="Hang" typeface="맑은 고딕"/>
-        <a:font script="Hans" typeface="宋体"/>
-        <a:font script="Hant" typeface="新細明體"/>
-        <a:font script="Arab" typeface="Times New Roman"/>
-        <a:font script="Hebr" typeface="Times New Roman"/>
-        <a:font script="Thai" typeface="Angsana New"/>
-        <a:font script="Ethi" typeface="Nyala"/>
-        <a:font script="Beng" typeface="Vrinda"/>
-        <a:font script="Gujr" typeface="Shruti"/>
-        <a:font script="Khmr" typeface="MoolBoran"/>
-        <a:font script="Knda" typeface="Tunga"/>
-        <a:font script="Guru" typeface="Raavi"/>
-        <a:font script="Cans" typeface="Euphemia"/>
-        <a:font script="Cher" typeface="Plantagenet Cherokee"/>
-        <a:font script="Yiii" typeface="Microsoft Yi Baiti"/>
-        <a:font script="Tibt" typeface="Microsoft Himalaya"/>
-        <a:font script="Thaa" typeface="MV Boli"/>
-        <a:font script="Deva" typeface="Mangal"/>
-        <a:font script="Telu" typeface="Gautami"/>
-        <a:font script="Taml" typeface="Latha"/>
-        <a:font script="Syrc" typeface="Estrangelo Edessa"/>
-        <a:font script="Orya" typeface="Kalinga"/>
-        <a:font script="Mlym" typeface="Kartika"/>
-        <a:font script="Laoo" typeface="DokChampa"/>
-        <a:font script="Sinh" typeface="Iskoola Pota"/>
-        <a:font script="Mong" typeface="Mongolian Baiti"/>
-        <a:font script="Viet" typeface="Times New Roman"/>
-        <a:font script="Uigh" typeface="Microsoft Uighur"/>
-        <a:font script="Geor" typeface="Sylfaen"/>
-      </a:majorFont>
-      <a:minorFont>
-        <a:latin typeface="Arial"/>
-        <a:ea typeface=""/>
-        <a:cs typeface=""/>
-        <a:font script="Jpan" typeface="ＭＳ Ｐゴシック"/>
-        <a:font script="Hang" typeface="맑은 고딕"/>
-        <a:font script="Hans" typeface="宋体"/>
-        <a:font script="Hant" typeface="新細明體"/>
-        <a:font script="Arab" typeface="Arial"/>
-        <a:font script="Hebr" typeface="Arial"/>
-        <a:font script="Thai" typeface="Cordia New"/>
-        <a:font script="Ethi" typeface="Nyala"/>
-        <a:font script="Beng" typeface="Vrinda"/>
-        <a:font script="Gujr" typeface="Shruti"/>
-        <a:font script="Khmr" typeface="DaunPenh"/>
-        <a:font script="Knda" typeface="Tunga"/>
-        <a:font script="Guru" typeface="Raavi"/>
-        <a:font script="Cans" typeface="Euphemia"/>
-        <a:font script="Cher" typeface="Plantagenet Cherokee"/>
-        <a:font script="Yiii" typeface="Microsoft Yi Baiti"/>
-        <a:font script="Tibt" typeface="Microsoft Himalaya"/>
-        <a:font script="Thaa" typeface="MV Boli"/>
-        <a:font script="Deva" typeface="Mangal"/>
-        <a:font script="Telu" typeface="Gautami"/>
-        <a:font script="Taml" typeface="Latha"/>
-        <a:font script="Syrc" typeface="Estrangelo Edessa"/>
-        <a:font script="Orya" typeface="Kalinga"/>
-        <a:font script="Mlym" typeface="Kartika"/>
-        <a:font script="Laoo" typeface="DokChampa"/>
-        <a:font script="Sinh" typeface="Iskoola Pota"/>
-        <a:font script="Mong" typeface="Mongolian Baiti"/>
-        <a:font script="Viet" typeface="Arial"/>
-        <a:font script="Uigh" typeface="Microsoft Uighur"/>
-        <a:font script="Geor" typeface="Sylfaen"/>
-      </a:minorFont>
-    </a:fontScheme>
-    <a:fmtScheme name="Office">
-      <a:fillStyleLst>
-        <a:solidFill>
-          <a:schemeClr val="phClr"/>
-        </a:solidFill>
-        <a:gradFill rotWithShape="1">
-          <a:gsLst>
-            <a:gs pos="0">
-              <a:schemeClr val="phClr">
-                <a:tint val="50000"/>
-                <a:satMod val="300000"/>
-              </a:schemeClr>
-            </a:gs>
-            <a:gs pos="35000">
-              <a:schemeClr val="phClr">
-                <a:tint val="37000"/>
-                <a:satMod val="300000"/>
-              </a:schemeClr>
-            </a:gs>
-            <a:gs pos="100000">
-              <a:schemeClr val="phClr">
-                <a:tint val="15000"/>
-                <a:satMod val="350000"/>
-              </a:schemeClr>
-            </a:gs>
-          </a:gsLst>
-          <a:lin ang="16200000" scaled="1"/>
-        </a:gradFill>
-        <a:gradFill rotWithShape="1">
-          <a:gsLst>
-            <a:gs pos="0">
-              <a:schemeClr val="phClr">
-                <a:tint val="100000"/>
-                <a:shade val="100000"/>
-                <a:satMod val="130000"/>
-              </a:schemeClr>
-            </a:gs>
-            <a:gs pos="100000">
-              <a:schemeClr val="phClr">
-                <a:tint val="50000"/>
-                <a:shade val="100000"/>
-                <a:satMod val="350000"/>
-              </a:schemeClr>
-            </a:gs>
-          </a:gsLst>
-          <a:lin ang="16200000" scaled="0"/>
-        </a:gradFill>
-      </a:fillStyleLst>
-      <a:lnStyleLst>
-        <a:ln w="9525" cap="flat" cmpd="sng" algn="ctr">
-          <a:solidFill>
-            <a:schemeClr val="phClr">
-              <a:shade val="95000"/>
-              <a:satMod val="105000"/>
-            </a:schemeClr>
-          </a:solidFill>
-          <a:prstDash val="solid"/>
-        </a:ln>
-        <a:ln w="25400" cap="flat" cmpd="sng" algn="ctr">
-          <a:solidFill>
-            <a:schemeClr val="phClr"/>
-          </a:solidFill>
-          <a:prstDash val="solid"/>
-        </a:ln>
-        <a:ln w="38100" cap="flat" cmpd="sng" algn="ctr">
-          <a:solidFill>
-            <a:schemeClr val="phClr"/>
-          </a:solidFill>
-          <a:prstDash val="solid"/>
-        </a:ln>
-      </a:lnStyleLst>
-      <a:effectStyleLst>
-        <a:effectStyle>
-          <a:effectLst>
-            <a:outerShdw blurRad="40000" dist="20000" dir="5400000" rotWithShape="0">
-              <a:srgbClr val="000000">
-                <a:alpha val="38000"/>
-              </a:srgbClr>
-            </a:outerShdw>
-          </a:effectLst>
-        </a:effectStyle>
-        <a:effectStyle>
-          <a:effectLst>
-            <a:outerShdw blurRad="40000" dist="23000" dir="5400000" rotWithShape="0">
-              <a:srgbClr val="000000">
-                <a:alpha val="35000"/>
-              </a:srgbClr>
-            </a:outerShdw>
-          </a:effectLst>
-        </a:effectStyle>
-        <a:effectStyle>
-          <a:effectLst>
-            <a:outerShdw blurRad="40000" dist="23000" dir="5400000" rotWithShape="0">
-              <a:srgbClr val="000000">
-                <a:alpha val="35000"/>
-              </a:srgbClr>
-            </a:outerShdw>
-          </a:effectLst>
-          <a:scene3d>
-            <a:camera prst="orthographicFront">
-              <a:rot lat="0" lon="0" rev="0"/>
-            </a:camera>
-            <a:lightRig rig="threePt" dir="t">
-              <a:rot lat="0" lon="0" rev="1200000"/>
-            </a:lightRig>
-          </a:scene3d>
-          <a:sp3d>
-            <a:bevelT w="63500" h="25400"/>
-          </a:sp3d>
-        </a:effectStyle>
-      </a:effectStyleLst>
-      <a:bgFillStyleLst>
-        <a:solidFill>
-          <a:schemeClr val="phClr"/>
-        </a:solidFill>
-        <a:gradFill rotWithShape="1">
-          <a:gsLst>
-            <a:gs pos="0">
-              <a:schemeClr val="phClr">
-                <a:tint val="40000"/>
-                <a:satMod val="350000"/>
-              </a:schemeClr>
-            </a:gs>
-            <a:gs pos="40000">
-              <a:schemeClr val="phClr">
-                <a:tint val="45000"/>
-                <a:shade val="99000"/>
-                <a:satMod val="350000"/>
-              </a:schemeClr>
-            </a:gs>
-            <a:gs pos="100000">
-              <a:schemeClr val="phClr">
-                <a:shade val="20000"/>
-                <a:satMod val="255000"/>
-              </a:schemeClr>
-            </a:gs>
-          </a:gsLst>
-          <a:path path="circle">
-            <a:fillToRect l="50000" t="-80000" r="50000" b="180000"/>
-          </a:path>
-        </a:gradFill>
-        <a:gradFill rotWithShape="1">
-          <a:gsLst>
-            <a:gs pos="0">
-              <a:schemeClr val="phClr">
-                <a:tint val="80000"/>
-                <a:satMod val="300000"/>
-              </a:schemeClr>
-            </a:gs>
-            <a:gs pos="100000">
-              <a:schemeClr val="phClr">
-                <a:shade val="30000"/>
-                <a:satMod val="200000"/>
-              </a:schemeClr>
-            </a:gs>
-          </a:gsLst>
-          <a:path path="circle">
-            <a:fillToRect l="50000" t="50000" r="50000" b="50000"/>
-          </a:path>
-        </a:gradFill>
-      </a:bgFillStyleLst>
-    </a:fmtScheme>
-  </a:themeElements>
-</a:theme>
 </file>
</xml_diff>